<commit_message>
Presentation near to finalize
</commit_message>
<xml_diff>
--- a/Project-03/docs/saraf-yudhoatmojo_Presentation.pptx
+++ b/Project-03/docs/saraf-yudhoatmojo_Presentation.pptx
@@ -1,21 +1,30 @@
 
 <file path=ppt/presentation.xml><?xml version="1.0" encoding="utf-8"?>
-<p:presentation xmlns:a="http://schemas.openxmlformats.org/drawingml/2006/main" xmlns:r="http://schemas.openxmlformats.org/officeDocument/2006/relationships" xmlns:p="http://schemas.openxmlformats.org/presentationml/2006/main" saveSubsetFonts="1">
+<p:presentation xmlns:a="http://schemas.openxmlformats.org/drawingml/2006/main" xmlns:r="http://schemas.openxmlformats.org/officeDocument/2006/relationships" xmlns:p="http://schemas.openxmlformats.org/presentationml/2006/main" showSpecialPlsOnTitleSld="0" saveSubsetFonts="1">
   <p:sldMasterIdLst>
     <p:sldMasterId id="2147483684" r:id="rId1"/>
   </p:sldMasterIdLst>
   <p:notesMasterIdLst>
-    <p:notesMasterId r:id="rId10"/>
+    <p:notesMasterId r:id="rId16"/>
   </p:notesMasterIdLst>
+  <p:handoutMasterIdLst>
+    <p:handoutMasterId r:id="rId17"/>
+  </p:handoutMasterIdLst>
   <p:sldIdLst>
     <p:sldId id="272" r:id="rId2"/>
     <p:sldId id="273" r:id="rId3"/>
     <p:sldId id="274" r:id="rId4"/>
-    <p:sldId id="275" r:id="rId5"/>
-    <p:sldId id="276" r:id="rId6"/>
-    <p:sldId id="277" r:id="rId7"/>
-    <p:sldId id="278" r:id="rId8"/>
-    <p:sldId id="279" r:id="rId9"/>
+    <p:sldId id="287" r:id="rId5"/>
+    <p:sldId id="275" r:id="rId6"/>
+    <p:sldId id="276" r:id="rId7"/>
+    <p:sldId id="277" r:id="rId8"/>
+    <p:sldId id="278" r:id="rId9"/>
+    <p:sldId id="280" r:id="rId10"/>
+    <p:sldId id="281" r:id="rId11"/>
+    <p:sldId id="282" r:id="rId12"/>
+    <p:sldId id="283" r:id="rId13"/>
+    <p:sldId id="285" r:id="rId14"/>
+    <p:sldId id="286" r:id="rId15"/>
   </p:sldIdLst>
   <p:sldSz cx="12192000" cy="6858000"/>
   <p:notesSz cx="6858000" cy="9144000"/>
@@ -122,6 +131,180 @@
 </p:presentation>
 </file>
 
+<file path=ppt/handoutMasters/handoutMaster1.xml><?xml version="1.0" encoding="utf-8"?>
+<p:handoutMaster xmlns:a="http://schemas.openxmlformats.org/drawingml/2006/main" xmlns:r="http://schemas.openxmlformats.org/officeDocument/2006/relationships" xmlns:p="http://schemas.openxmlformats.org/presentationml/2006/main">
+  <p:cSld>
+    <p:bg>
+      <p:bgRef idx="1001">
+        <a:schemeClr val="bg1"/>
+      </p:bgRef>
+    </p:bg>
+    <p:spTree>
+      <p:nvGrpSpPr>
+        <p:cNvPr id="1" name=""/>
+        <p:cNvGrpSpPr/>
+        <p:nvPr/>
+      </p:nvGrpSpPr>
+      <p:grpSpPr>
+        <a:xfrm>
+          <a:off x="0" y="0"/>
+          <a:ext cx="0" cy="0"/>
+          <a:chOff x="0" y="0"/>
+          <a:chExt cx="0" cy="0"/>
+        </a:xfrm>
+      </p:grpSpPr>
+      <p:sp>
+        <p:nvSpPr>
+          <p:cNvPr id="2" name="Header Placeholder 1"/>
+          <p:cNvSpPr>
+            <a:spLocks noGrp="1"/>
+          </p:cNvSpPr>
+          <p:nvPr>
+            <p:ph type="hdr" sz="quarter"/>
+          </p:nvPr>
+        </p:nvSpPr>
+        <p:spPr>
+          <a:xfrm>
+            <a:off x="0" y="0"/>
+            <a:ext cx="2971800" cy="458788"/>
+          </a:xfrm>
+          <a:prstGeom prst="rect">
+            <a:avLst/>
+          </a:prstGeom>
+        </p:spPr>
+        <p:txBody>
+          <a:bodyPr vert="horz" lIns="91440" tIns="45720" rIns="91440" bIns="45720" rtlCol="0"/>
+          <a:lstStyle>
+            <a:lvl1pPr algn="l">
+              <a:defRPr sz="1200"/>
+            </a:lvl1pPr>
+          </a:lstStyle>
+          <a:p>
+            <a:r>
+              <a:rPr lang="da-DK" smtClean="0"/>
+              <a:t>CS532 - Database System Project - 3</a:t>
+            </a:r>
+            <a:endParaRPr lang="en-IN"/>
+          </a:p>
+        </p:txBody>
+      </p:sp>
+      <p:sp>
+        <p:nvSpPr>
+          <p:cNvPr id="3" name="Date Placeholder 2"/>
+          <p:cNvSpPr>
+            <a:spLocks noGrp="1"/>
+          </p:cNvSpPr>
+          <p:nvPr>
+            <p:ph type="dt" sz="quarter" idx="1"/>
+          </p:nvPr>
+        </p:nvSpPr>
+        <p:spPr>
+          <a:xfrm>
+            <a:off x="3884613" y="0"/>
+            <a:ext cx="2971800" cy="458788"/>
+          </a:xfrm>
+          <a:prstGeom prst="rect">
+            <a:avLst/>
+          </a:prstGeom>
+        </p:spPr>
+        <p:txBody>
+          <a:bodyPr vert="horz" lIns="91440" tIns="45720" rIns="91440" bIns="45720" rtlCol="0"/>
+          <a:lstStyle>
+            <a:lvl1pPr algn="r">
+              <a:defRPr sz="1200"/>
+            </a:lvl1pPr>
+          </a:lstStyle>
+          <a:p>
+            <a:fld id="{4F6186B4-3FB3-46D6-874B-58076C6098A9}" type="datetime1">
+              <a:rPr lang="en-US" smtClean="0"/>
+              <a:t>4/23/2020</a:t>
+            </a:fld>
+            <a:endParaRPr lang="en-IN"/>
+          </a:p>
+        </p:txBody>
+      </p:sp>
+      <p:sp>
+        <p:nvSpPr>
+          <p:cNvPr id="4" name="Footer Placeholder 3"/>
+          <p:cNvSpPr>
+            <a:spLocks noGrp="1"/>
+          </p:cNvSpPr>
+          <p:nvPr>
+            <p:ph type="ftr" sz="quarter" idx="2"/>
+          </p:nvPr>
+        </p:nvSpPr>
+        <p:spPr>
+          <a:xfrm>
+            <a:off x="0" y="8685213"/>
+            <a:ext cx="2971800" cy="458787"/>
+          </a:xfrm>
+          <a:prstGeom prst="rect">
+            <a:avLst/>
+          </a:prstGeom>
+        </p:spPr>
+        <p:txBody>
+          <a:bodyPr vert="horz" lIns="91440" tIns="45720" rIns="91440" bIns="45720" rtlCol="0" anchor="b"/>
+          <a:lstStyle>
+            <a:lvl1pPr algn="l">
+              <a:defRPr sz="1200"/>
+            </a:lvl1pPr>
+          </a:lstStyle>
+          <a:p>
+            <a:r>
+              <a:rPr lang="en-IN" smtClean="0"/>
+              <a:t>IMDB Data Analysis</a:t>
+            </a:r>
+            <a:endParaRPr lang="en-IN"/>
+          </a:p>
+        </p:txBody>
+      </p:sp>
+      <p:sp>
+        <p:nvSpPr>
+          <p:cNvPr id="5" name="Slide Number Placeholder 4"/>
+          <p:cNvSpPr>
+            <a:spLocks noGrp="1"/>
+          </p:cNvSpPr>
+          <p:nvPr>
+            <p:ph type="sldNum" sz="quarter" idx="3"/>
+          </p:nvPr>
+        </p:nvSpPr>
+        <p:spPr>
+          <a:xfrm>
+            <a:off x="3884613" y="8685213"/>
+            <a:ext cx="2971800" cy="458787"/>
+          </a:xfrm>
+          <a:prstGeom prst="rect">
+            <a:avLst/>
+          </a:prstGeom>
+        </p:spPr>
+        <p:txBody>
+          <a:bodyPr vert="horz" lIns="91440" tIns="45720" rIns="91440" bIns="45720" rtlCol="0" anchor="b"/>
+          <a:lstStyle>
+            <a:lvl1pPr algn="r">
+              <a:defRPr sz="1200"/>
+            </a:lvl1pPr>
+          </a:lstStyle>
+          <a:p>
+            <a:fld id="{2689C295-CAAA-42CE-BAC0-00AD4C01FEB4}" type="slidenum">
+              <a:rPr lang="en-IN" smtClean="0"/>
+              <a:t>‹#›</a:t>
+            </a:fld>
+            <a:endParaRPr lang="en-IN"/>
+          </a:p>
+        </p:txBody>
+      </p:sp>
+    </p:spTree>
+    <p:extLst>
+      <p:ext uri="{BB962C8B-B14F-4D97-AF65-F5344CB8AC3E}">
+        <p14:creationId xmlns:p14="http://schemas.microsoft.com/office/powerpoint/2010/main" val="1483279242"/>
+      </p:ext>
+    </p:extLst>
+  </p:cSld>
+  <p:clrMap bg1="lt1" tx1="dk1" bg2="lt2" tx2="dk2" accent1="accent1" accent2="accent2" accent3="accent3" accent4="accent4" accent5="accent5" accent6="accent6" hlink="hlink" folHlink="folHlink"/>
+  <p:hf sldNum="0" hdr="0" ftr="0" dt="0"/>
+</p:handoutMaster>
+</file>
+
 <file path=ppt/notesMasters/notesMaster1.xml><?xml version="1.0" encoding="utf-8"?>
 <p:notesMaster xmlns:a="http://schemas.openxmlformats.org/drawingml/2006/main" xmlns:r="http://schemas.openxmlformats.org/officeDocument/2006/relationships" xmlns:p="http://schemas.openxmlformats.org/presentationml/2006/main">
   <p:cSld>
@@ -171,6 +354,10 @@
             </a:lvl1pPr>
           </a:lstStyle>
           <a:p>
+            <a:r>
+              <a:rPr lang="da-DK" smtClean="0"/>
+              <a:t>CS532 - Database System Project - 3</a:t>
+            </a:r>
             <a:endParaRPr lang="en-US"/>
           </a:p>
         </p:txBody>
@@ -202,7 +389,7 @@
             </a:lvl1pPr>
           </a:lstStyle>
           <a:p>
-            <a:fld id="{71BD4573-58E7-4156-A133-2731F5F8D1A6}" type="datetimeFigureOut">
+            <a:fld id="{0665733B-B9B5-4E83-8951-1FFECEAB30DF}" type="datetime1">
               <a:rPr lang="en-US" smtClean="0"/>
               <a:t>4/23/2020</a:t>
             </a:fld>
@@ -330,6 +517,10 @@
             </a:lvl1pPr>
           </a:lstStyle>
           <a:p>
+            <a:r>
+              <a:rPr lang="en-US" smtClean="0"/>
+              <a:t>IMDB Data Analysis</a:t>
+            </a:r>
             <a:endParaRPr lang="en-US"/>
           </a:p>
         </p:txBody>
@@ -377,6 +568,7 @@
     </p:extLst>
   </p:cSld>
   <p:clrMap bg1="lt1" tx1="dk1" bg2="lt2" tx2="dk2" accent1="accent1" accent2="accent2" accent3="accent3" accent4="accent4" accent5="accent5" accent6="accent6" hlink="hlink" folHlink="folHlink"/>
+  <p:hf sldNum="0" hdr="0" ftr="0" dt="0"/>
   <p:notesStyle>
     <a:lvl1pPr marL="0" algn="l" defTabSz="914400" rtl="0" eaLnBrk="1" latinLnBrk="0" hangingPunct="1">
       <a:defRPr sz="1200" kern="1200">
@@ -520,33 +712,132 @@
           </a:p>
         </p:txBody>
       </p:sp>
-      <p:sp>
-        <p:nvSpPr>
-          <p:cNvPr id="4" name="Slide Number Placeholder 3"/>
-          <p:cNvSpPr>
-            <a:spLocks noGrp="1"/>
-          </p:cNvSpPr>
-          <p:nvPr>
-            <p:ph type="sldNum" sz="quarter" idx="10"/>
-          </p:nvPr>
-        </p:nvSpPr>
-        <p:spPr/>
-        <p:txBody>
-          <a:bodyPr/>
-          <a:lstStyle/>
-          <a:p>
-            <a:fld id="{893B0CF2-7F87-4E02-A248-870047730F99}" type="slidenum">
-              <a:rPr lang="en-US" smtClean="0"/>
-              <a:t>1</a:t>
-            </a:fld>
-            <a:endParaRPr lang="en-US"/>
-          </a:p>
-        </p:txBody>
-      </p:sp>
     </p:spTree>
     <p:extLst>
       <p:ext uri="{BB962C8B-B14F-4D97-AF65-F5344CB8AC3E}">
         <p14:creationId xmlns:p14="http://schemas.microsoft.com/office/powerpoint/2010/main" val="1495133884"/>
+      </p:ext>
+    </p:extLst>
+  </p:cSld>
+  <p:clrMapOvr>
+    <a:masterClrMapping/>
+  </p:clrMapOvr>
+</p:notes>
+</file>
+
+<file path=ppt/notesSlides/notesSlide2.xml><?xml version="1.0" encoding="utf-8"?>
+<p:notes xmlns:a="http://schemas.openxmlformats.org/drawingml/2006/main" xmlns:r="http://schemas.openxmlformats.org/officeDocument/2006/relationships" xmlns:p="http://schemas.openxmlformats.org/presentationml/2006/main">
+  <p:cSld>
+    <p:spTree>
+      <p:nvGrpSpPr>
+        <p:cNvPr id="1" name=""/>
+        <p:cNvGrpSpPr/>
+        <p:nvPr/>
+      </p:nvGrpSpPr>
+      <p:grpSpPr>
+        <a:xfrm>
+          <a:off x="0" y="0"/>
+          <a:ext cx="0" cy="0"/>
+          <a:chOff x="0" y="0"/>
+          <a:chExt cx="0" cy="0"/>
+        </a:xfrm>
+      </p:grpSpPr>
+      <p:sp>
+        <p:nvSpPr>
+          <p:cNvPr id="2" name="Slide Image Placeholder 1"/>
+          <p:cNvSpPr>
+            <a:spLocks noGrp="1" noRot="1" noChangeAspect="1"/>
+          </p:cNvSpPr>
+          <p:nvPr>
+            <p:ph type="sldImg"/>
+          </p:nvPr>
+        </p:nvSpPr>
+        <p:spPr/>
+      </p:sp>
+      <p:sp>
+        <p:nvSpPr>
+          <p:cNvPr id="3" name="Notes Placeholder 2"/>
+          <p:cNvSpPr>
+            <a:spLocks noGrp="1"/>
+          </p:cNvSpPr>
+          <p:nvPr>
+            <p:ph type="body" idx="1"/>
+          </p:nvPr>
+        </p:nvSpPr>
+        <p:spPr/>
+        <p:txBody>
+          <a:bodyPr/>
+          <a:lstStyle/>
+          <a:p>
+            <a:endParaRPr lang="en-IN"/>
+          </a:p>
+        </p:txBody>
+      </p:sp>
+    </p:spTree>
+    <p:extLst>
+      <p:ext uri="{BB962C8B-B14F-4D97-AF65-F5344CB8AC3E}">
+        <p14:creationId xmlns:p14="http://schemas.microsoft.com/office/powerpoint/2010/main" val="2842125264"/>
+      </p:ext>
+    </p:extLst>
+  </p:cSld>
+  <p:clrMapOvr>
+    <a:masterClrMapping/>
+  </p:clrMapOvr>
+</p:notes>
+</file>
+
+<file path=ppt/notesSlides/notesSlide3.xml><?xml version="1.0" encoding="utf-8"?>
+<p:notes xmlns:a="http://schemas.openxmlformats.org/drawingml/2006/main" xmlns:r="http://schemas.openxmlformats.org/officeDocument/2006/relationships" xmlns:p="http://schemas.openxmlformats.org/presentationml/2006/main">
+  <p:cSld>
+    <p:spTree>
+      <p:nvGrpSpPr>
+        <p:cNvPr id="1" name=""/>
+        <p:cNvGrpSpPr/>
+        <p:nvPr/>
+      </p:nvGrpSpPr>
+      <p:grpSpPr>
+        <a:xfrm>
+          <a:off x="0" y="0"/>
+          <a:ext cx="0" cy="0"/>
+          <a:chOff x="0" y="0"/>
+          <a:chExt cx="0" cy="0"/>
+        </a:xfrm>
+      </p:grpSpPr>
+      <p:sp>
+        <p:nvSpPr>
+          <p:cNvPr id="2" name="Slide Image Placeholder 1"/>
+          <p:cNvSpPr>
+            <a:spLocks noGrp="1" noRot="1" noChangeAspect="1"/>
+          </p:cNvSpPr>
+          <p:nvPr>
+            <p:ph type="sldImg"/>
+          </p:nvPr>
+        </p:nvSpPr>
+        <p:spPr/>
+      </p:sp>
+      <p:sp>
+        <p:nvSpPr>
+          <p:cNvPr id="3" name="Notes Placeholder 2"/>
+          <p:cNvSpPr>
+            <a:spLocks noGrp="1"/>
+          </p:cNvSpPr>
+          <p:nvPr>
+            <p:ph type="body" idx="1"/>
+          </p:nvPr>
+        </p:nvSpPr>
+        <p:spPr/>
+        <p:txBody>
+          <a:bodyPr/>
+          <a:lstStyle/>
+          <a:p>
+            <a:endParaRPr lang="en-IN"/>
+          </a:p>
+        </p:txBody>
+      </p:sp>
+    </p:spTree>
+    <p:extLst>
+      <p:ext uri="{BB962C8B-B14F-4D97-AF65-F5344CB8AC3E}">
+        <p14:creationId xmlns:p14="http://schemas.microsoft.com/office/powerpoint/2010/main" val="3460494446"/>
       </p:ext>
     </p:extLst>
   </p:cSld>
@@ -869,7 +1160,7 @@
           <a:bodyPr/>
           <a:lstStyle/>
           <a:p>
-            <a:fld id="{021A1D30-C0A0-4124-A783-34D9F15FA0FE}" type="datetime1">
+            <a:fld id="{6CE4C3DD-97B9-4138-A366-86632CAEDDA2}" type="datetime1">
               <a:rPr lang="en-US" smtClean="0"/>
               <a:t>4/23/2020</a:t>
             </a:fld>
@@ -893,8 +1184,8 @@
           <a:lstStyle/>
           <a:p>
             <a:r>
-              <a:rPr lang="en-US" dirty="0" smtClean="0"/>
-              <a:t>Add a footer</a:t>
+              <a:rPr lang="en-US" smtClean="0"/>
+              <a:t>CS532 - Database System Project - 3 | IMDB Data Analysis</a:t>
             </a:r>
             <a:endParaRPr lang="en-US" dirty="0"/>
           </a:p>
@@ -1055,7 +1346,7 @@
           <a:bodyPr/>
           <a:lstStyle/>
           <a:p>
-            <a:fld id="{8D2D5871-AB0F-4B3D-8861-97E78CB7B47E}" type="datetime1">
+            <a:fld id="{E2517C3C-F070-44A8-946E-C6396901C462}" type="datetime1">
               <a:rPr lang="en-US" smtClean="0"/>
               <a:t>4/23/2020</a:t>
             </a:fld>
@@ -1079,8 +1370,8 @@
           <a:lstStyle/>
           <a:p>
             <a:r>
-              <a:rPr lang="en-US" dirty="0" smtClean="0"/>
-              <a:t>Add a footer</a:t>
+              <a:rPr lang="en-US" smtClean="0"/>
+              <a:t>CS532 - Database System Project - 3 | IMDB Data Analysis</a:t>
             </a:r>
             <a:endParaRPr lang="en-US" dirty="0"/>
           </a:p>
@@ -1251,7 +1542,7 @@
           <a:bodyPr/>
           <a:lstStyle/>
           <a:p>
-            <a:fld id="{14418406-4C3F-4F3E-80BD-A22568EA37EB}" type="datetime1">
+            <a:fld id="{7262D093-5280-4C98-B2BE-CC44549F3693}" type="datetime1">
               <a:rPr lang="en-US" smtClean="0"/>
               <a:t>4/23/2020</a:t>
             </a:fld>
@@ -1275,8 +1566,8 @@
           <a:lstStyle/>
           <a:p>
             <a:r>
-              <a:rPr lang="en-US" dirty="0" smtClean="0"/>
-              <a:t>Add a footer</a:t>
+              <a:rPr lang="en-US" smtClean="0"/>
+              <a:t>CS532 - Database System Project - 3 | IMDB Data Analysis</a:t>
             </a:r>
             <a:endParaRPr lang="en-US" dirty="0"/>
           </a:p>
@@ -1437,7 +1728,7 @@
           <a:bodyPr/>
           <a:lstStyle/>
           <a:p>
-            <a:fld id="{65F28077-7188-48C5-8679-2287FAC952E9}" type="datetime1">
+            <a:fld id="{6962C5E1-6D18-4673-85A9-B84F9A603C62}" type="datetime1">
               <a:rPr lang="en-US" smtClean="0"/>
               <a:t>4/23/2020</a:t>
             </a:fld>
@@ -1461,8 +1752,8 @@
           <a:lstStyle/>
           <a:p>
             <a:r>
-              <a:rPr lang="en-US" dirty="0" smtClean="0"/>
-              <a:t>Add a footer</a:t>
+              <a:rPr lang="en-US" smtClean="0"/>
+              <a:t>CS532 - Database System Project - 3 | IMDB Data Analysis</a:t>
             </a:r>
             <a:endParaRPr lang="en-US" dirty="0"/>
           </a:p>
@@ -1686,7 +1977,7 @@
           <a:bodyPr/>
           <a:lstStyle/>
           <a:p>
-            <a:fld id="{D2DCB740-6776-4EE9-99FD-96D592FA5A23}" type="datetime1">
+            <a:fld id="{86793549-A632-40B5-96C9-0C750971BCAA}" type="datetime1">
               <a:rPr lang="en-US" smtClean="0"/>
               <a:t>4/23/2020</a:t>
             </a:fld>
@@ -1710,8 +2001,8 @@
           <a:lstStyle/>
           <a:p>
             <a:r>
-              <a:rPr lang="en-US" dirty="0" smtClean="0"/>
-              <a:t>Add a footer</a:t>
+              <a:rPr lang="en-US" smtClean="0"/>
+              <a:t>CS532 - Database System Project - 3 | IMDB Data Analysis</a:t>
             </a:r>
             <a:endParaRPr lang="en-US" dirty="0"/>
           </a:p>
@@ -1971,7 +2262,7 @@
           <a:bodyPr/>
           <a:lstStyle/>
           <a:p>
-            <a:fld id="{05F6BD99-6FFD-46C5-B5E2-43A34BDA2566}" type="datetime1">
+            <a:fld id="{2EA24BAE-6383-471E-8B81-672A765179C2}" type="datetime1">
               <a:rPr lang="en-US" smtClean="0"/>
               <a:t>4/23/2020</a:t>
             </a:fld>
@@ -1995,8 +2286,8 @@
           <a:lstStyle/>
           <a:p>
             <a:r>
-              <a:rPr lang="en-US" dirty="0" smtClean="0"/>
-              <a:t>Add a footer</a:t>
+              <a:rPr lang="en-US" smtClean="0"/>
+              <a:t>CS532 - Database System Project - 3 | IMDB Data Analysis</a:t>
             </a:r>
             <a:endParaRPr lang="en-US" dirty="0"/>
           </a:p>
@@ -2370,7 +2661,7 @@
           <a:bodyPr/>
           <a:lstStyle/>
           <a:p>
-            <a:fld id="{E022678E-214C-4CF8-97C7-95015FB02960}" type="datetime1">
+            <a:fld id="{76E09940-37DC-4CF8-A772-BD64FE784FF4}" type="datetime1">
               <a:rPr lang="en-US" smtClean="0"/>
               <a:t>4/23/2020</a:t>
             </a:fld>
@@ -2394,8 +2685,8 @@
           <a:lstStyle/>
           <a:p>
             <a:r>
-              <a:rPr lang="en-US" dirty="0" smtClean="0"/>
-              <a:t>Add a footer</a:t>
+              <a:rPr lang="en-US" smtClean="0"/>
+              <a:t>CS532 - Database System Project - 3 | IMDB Data Analysis</a:t>
             </a:r>
             <a:endParaRPr lang="en-US" dirty="0"/>
           </a:p>
@@ -2541,7 +2832,7 @@
           <a:bodyPr/>
           <a:lstStyle/>
           <a:p>
-            <a:fld id="{D55660E0-FA77-4473-A859-74127B089143}" type="datetime1">
+            <a:fld id="{ABE1DB6B-DF0A-4325-B455-629E4CD87C31}" type="datetime1">
               <a:rPr lang="en-US" smtClean="0"/>
               <a:t>4/23/2020</a:t>
             </a:fld>
@@ -2565,8 +2856,8 @@
           <a:lstStyle/>
           <a:p>
             <a:r>
-              <a:rPr lang="en-US" dirty="0" smtClean="0"/>
-              <a:t>Add a footer</a:t>
+              <a:rPr lang="en-US" smtClean="0"/>
+              <a:t>CS532 - Database System Project - 3 | IMDB Data Analysis</a:t>
             </a:r>
             <a:endParaRPr lang="en-US" dirty="0"/>
           </a:p>
@@ -2652,7 +2943,7 @@
           <a:bodyPr/>
           <a:lstStyle/>
           <a:p>
-            <a:fld id="{3188D7B8-9F07-4899-827D-5F3CFDDEB574}" type="datetime1">
+            <a:fld id="{3719A3C6-B4F5-49A1-AF08-3BFDA296AF9E}" type="datetime1">
               <a:rPr lang="en-US" smtClean="0"/>
               <a:t>4/23/2020</a:t>
             </a:fld>
@@ -2676,8 +2967,8 @@
           <a:lstStyle/>
           <a:p>
             <a:r>
-              <a:rPr lang="en-US" dirty="0" smtClean="0"/>
-              <a:t>Add a footer</a:t>
+              <a:rPr lang="en-US" smtClean="0"/>
+              <a:t>CS532 - Database System Project - 3 | IMDB Data Analysis</a:t>
             </a:r>
             <a:endParaRPr lang="en-US" dirty="0"/>
           </a:p>
@@ -2934,7 +3225,7 @@
           <a:bodyPr/>
           <a:lstStyle/>
           <a:p>
-            <a:fld id="{B5197C5C-1CD1-417D-A89C-14747F5222C7}" type="datetime1">
+            <a:fld id="{B6A54A73-FF84-46BD-9053-76AF7BE0A3C4}" type="datetime1">
               <a:rPr lang="en-US" smtClean="0"/>
               <a:t>4/23/2020</a:t>
             </a:fld>
@@ -2958,8 +3249,8 @@
           <a:lstStyle/>
           <a:p>
             <a:r>
-              <a:rPr lang="en-US" dirty="0" smtClean="0"/>
-              <a:t>Add a footer</a:t>
+              <a:rPr lang="en-US" smtClean="0"/>
+              <a:t>CS532 - Database System Project - 3 | IMDB Data Analysis</a:t>
             </a:r>
             <a:endParaRPr lang="en-US" dirty="0"/>
           </a:p>
@@ -3289,7 +3580,7 @@
           <a:bodyPr/>
           <a:lstStyle/>
           <a:p>
-            <a:fld id="{1359EFBB-CFA1-4AA8-9123-F0B52DBD84FE}" type="datetime1">
+            <a:fld id="{A5B3F7F0-CDEA-4047-BA01-11422AE57A1E}" type="datetime1">
               <a:rPr lang="en-US" smtClean="0"/>
               <a:t>4/23/2020</a:t>
             </a:fld>
@@ -3313,8 +3604,8 @@
           <a:lstStyle/>
           <a:p>
             <a:r>
-              <a:rPr lang="en-US" dirty="0" smtClean="0"/>
-              <a:t>Add a footer</a:t>
+              <a:rPr lang="en-US" smtClean="0"/>
+              <a:t>CS532 - Database System Project - 3 | IMDB Data Analysis</a:t>
             </a:r>
             <a:endParaRPr lang="en-US" dirty="0"/>
           </a:p>
@@ -4323,9 +4614,8 @@
             </a:lvl1pPr>
           </a:lstStyle>
           <a:p>
-            <a:fld id="{61146459-E3C3-4969-9224-5ED50B492D17}" type="datetime1">
-              <a:rPr lang="en-US" smtClean="0"/>
-              <a:pPr/>
+            <a:fld id="{58123F0E-BB49-4BB1-BF17-EC0E5060B3AB}" type="datetime1">
+              <a:rPr lang="en-US" smtClean="0"/>
               <a:t>4/23/2020</a:t>
             </a:fld>
             <a:endParaRPr lang="en-US" dirty="0"/>
@@ -4364,8 +4654,8 @@
           </a:lstStyle>
           <a:p>
             <a:r>
-              <a:rPr lang="en-US" dirty="0" smtClean="0"/>
-              <a:t>Add a footer</a:t>
+              <a:rPr lang="en-US" smtClean="0"/>
+              <a:t>CS532 - Database System Project - 3 | IMDB Data Analysis</a:t>
             </a:r>
             <a:endParaRPr lang="en-US" dirty="0"/>
           </a:p>
@@ -4451,7 +4741,7 @@
       </p:par>
     </p:tnLst>
   </p:timing>
-  <p:hf sldNum="0" hdr="0" ftr="0" dt="0"/>
+  <p:hf hdr="0"/>
   <p:txStyles>
     <p:titleStyle>
       <a:lvl1pPr algn="l" rtl="0" eaLnBrk="1" latinLnBrk="0" hangingPunct="1">
@@ -4788,7 +5078,11 @@
             <a:pPr algn="ctr"/>
             <a:r>
               <a:rPr lang="en-US" dirty="0" smtClean="0"/>
-              <a:t>IMDB Data Analysis</a:t>
+              <a:t>IMDB </a:t>
+            </a:r>
+            <a:r>
+              <a:rPr lang="en-US" dirty="0" smtClean="0"/>
+              <a:t>Data Analysis</a:t>
             </a:r>
             <a:endParaRPr lang="en-US" dirty="0"/>
           </a:p>
@@ -4829,7 +5123,6 @@
               <a:rPr lang="en-US" dirty="0" smtClean="0"/>
               <a:t> </a:t>
             </a:r>
-            <a:endParaRPr lang="en-US" dirty="0" smtClean="0"/>
           </a:p>
           <a:p>
             <a:endParaRPr lang="en-US" dirty="0"/>
@@ -4871,6 +5164,1524 @@
 </p:sld>
 </file>
 
+<file path=ppt/slides/slide10.xml><?xml version="1.0" encoding="utf-8"?>
+<p:sld xmlns:a="http://schemas.openxmlformats.org/drawingml/2006/main" xmlns:r="http://schemas.openxmlformats.org/officeDocument/2006/relationships" xmlns:p="http://schemas.openxmlformats.org/presentationml/2006/main">
+  <p:cSld>
+    <p:spTree>
+      <p:nvGrpSpPr>
+        <p:cNvPr id="1" name=""/>
+        <p:cNvGrpSpPr/>
+        <p:nvPr/>
+      </p:nvGrpSpPr>
+      <p:grpSpPr>
+        <a:xfrm>
+          <a:off x="0" y="0"/>
+          <a:ext cx="0" cy="0"/>
+          <a:chOff x="0" y="0"/>
+          <a:chExt cx="0" cy="0"/>
+        </a:xfrm>
+      </p:grpSpPr>
+      <p:sp>
+        <p:nvSpPr>
+          <p:cNvPr id="2" name="Title 1"/>
+          <p:cNvSpPr>
+            <a:spLocks noGrp="1"/>
+          </p:cNvSpPr>
+          <p:nvPr>
+            <p:ph type="title"/>
+          </p:nvPr>
+        </p:nvSpPr>
+        <p:spPr/>
+        <p:txBody>
+          <a:bodyPr>
+            <a:normAutofit/>
+          </a:bodyPr>
+          <a:lstStyle/>
+          <a:p>
+            <a:r>
+              <a:rPr lang="en-US" sz="2800" dirty="0"/>
+              <a:t>Query </a:t>
+            </a:r>
+            <a:r>
+              <a:rPr lang="en-US" sz="2800" dirty="0" smtClean="0"/>
+              <a:t>5:</a:t>
+            </a:r>
+            <a:r>
+              <a:rPr lang="en-US" sz="2800" dirty="0"/>
+              <a:t/>
+            </a:r>
+            <a:br>
+              <a:rPr lang="en-US" sz="2800" dirty="0"/>
+            </a:br>
+            <a:r>
+              <a:rPr lang="en-US" sz="2800" dirty="0"/>
+              <a:t>Correlation analysis between movie rating and movie revenue</a:t>
+            </a:r>
+            <a:endParaRPr lang="en-IN" sz="2800" dirty="0"/>
+          </a:p>
+        </p:txBody>
+      </p:sp>
+      <p:pic>
+        <p:nvPicPr>
+          <p:cNvPr id="7" name="Content Placeholder 6"/>
+          <p:cNvPicPr>
+            <a:picLocks noGrp="1" noChangeAspect="1"/>
+          </p:cNvPicPr>
+          <p:nvPr>
+            <p:ph sz="half" idx="2"/>
+          </p:nvPr>
+        </p:nvPicPr>
+        <p:blipFill>
+          <a:blip r:embed="rId2">
+            <a:extLst>
+              <a:ext uri="{28A0092B-C50C-407E-A947-70E740481C1C}">
+                <a14:useLocalDpi xmlns:a14="http://schemas.microsoft.com/office/drawing/2010/main" val="0"/>
+              </a:ext>
+            </a:extLst>
+          </a:blip>
+          <a:stretch>
+            <a:fillRect/>
+          </a:stretch>
+        </p:blipFill>
+        <p:spPr>
+          <a:xfrm>
+            <a:off x="6297768" y="1920875"/>
+            <a:ext cx="5284631" cy="4433888"/>
+          </a:xfrm>
+          <a:prstGeom prst="rect">
+            <a:avLst/>
+          </a:prstGeom>
+          <a:ln w="38100" cap="sq">
+            <a:solidFill>
+              <a:srgbClr val="000000"/>
+            </a:solidFill>
+            <a:prstDash val="solid"/>
+            <a:miter lim="800000"/>
+          </a:ln>
+          <a:effectLst>
+            <a:outerShdw blurRad="50800" dist="38100" dir="2700000" algn="tl" rotWithShape="0">
+              <a:srgbClr val="000000">
+                <a:alpha val="43000"/>
+              </a:srgbClr>
+            </a:outerShdw>
+          </a:effectLst>
+        </p:spPr>
+      </p:pic>
+      <p:sp>
+        <p:nvSpPr>
+          <p:cNvPr id="6" name="Content Placeholder 5"/>
+          <p:cNvSpPr>
+            <a:spLocks noGrp="1"/>
+          </p:cNvSpPr>
+          <p:nvPr>
+            <p:ph sz="half" idx="1"/>
+          </p:nvPr>
+        </p:nvSpPr>
+        <p:spPr/>
+        <p:txBody>
+          <a:bodyPr>
+            <a:normAutofit fontScale="77500" lnSpcReduction="20000"/>
+          </a:bodyPr>
+          <a:lstStyle/>
+          <a:p>
+            <a:pPr algn="just"/>
+            <a:r>
+              <a:rPr lang="en-US" dirty="0"/>
+              <a:t>This query help us to conclude or derive a relation for movie about how much has earned as compared to the IMDB rating given by the people. </a:t>
+            </a:r>
+            <a:endParaRPr lang="en-US" dirty="0" smtClean="0"/>
+          </a:p>
+          <a:p>
+            <a:pPr algn="just"/>
+            <a:r>
+              <a:rPr lang="en-US" dirty="0" smtClean="0"/>
+              <a:t>It </a:t>
+            </a:r>
+            <a:r>
+              <a:rPr lang="en-US" dirty="0"/>
+              <a:t>happens that the movie has not collected much revenue but based on the story and script makes the movie popular between </a:t>
+            </a:r>
+            <a:r>
+              <a:rPr lang="en-US" dirty="0" smtClean="0"/>
+              <a:t>the people </a:t>
+            </a:r>
+            <a:r>
+              <a:rPr lang="en-US" dirty="0"/>
+              <a:t>compelling them to give high IMDB Score. </a:t>
+            </a:r>
+            <a:endParaRPr lang="en-US" dirty="0" smtClean="0"/>
+          </a:p>
+          <a:p>
+            <a:pPr algn="just"/>
+            <a:r>
+              <a:rPr lang="en-US" dirty="0" smtClean="0"/>
+              <a:t>It is </a:t>
+            </a:r>
+            <a:r>
+              <a:rPr lang="en-US" dirty="0"/>
+              <a:t>also possible that movie collected a lot revenue </a:t>
+            </a:r>
+            <a:r>
+              <a:rPr lang="en-US" dirty="0" smtClean="0"/>
+              <a:t>due to </a:t>
+            </a:r>
+            <a:r>
+              <a:rPr lang="en-US" dirty="0"/>
+              <a:t>popularity of its actors but the actual story, script and other things are so-so, normal so it has low IMDB Score. </a:t>
+            </a:r>
+            <a:endParaRPr lang="en-US" dirty="0" smtClean="0"/>
+          </a:p>
+          <a:p>
+            <a:pPr algn="just"/>
+            <a:r>
+              <a:rPr lang="en-US" dirty="0" smtClean="0"/>
+              <a:t>Here </a:t>
+            </a:r>
+            <a:r>
+              <a:rPr lang="en-US" dirty="0"/>
+              <a:t>we take the “year” as the input from the year so generate the scenario for that particular year</a:t>
+            </a:r>
+            <a:r>
+              <a:rPr lang="en-US" dirty="0" smtClean="0"/>
+              <a:t>. </a:t>
+            </a:r>
+            <a:endParaRPr lang="en-IN" dirty="0"/>
+          </a:p>
+        </p:txBody>
+      </p:sp>
+      <p:sp>
+        <p:nvSpPr>
+          <p:cNvPr id="10" name="Footer Placeholder 9"/>
+          <p:cNvSpPr>
+            <a:spLocks noGrp="1"/>
+          </p:cNvSpPr>
+          <p:nvPr>
+            <p:ph type="ftr" sz="quarter" idx="11"/>
+          </p:nvPr>
+        </p:nvSpPr>
+        <p:spPr/>
+        <p:txBody>
+          <a:bodyPr/>
+          <a:lstStyle/>
+          <a:p>
+            <a:r>
+              <a:rPr lang="en-US" smtClean="0"/>
+              <a:t>CS532 - Database System Project - 3 | IMDB Data Analysis</a:t>
+            </a:r>
+            <a:endParaRPr lang="en-US" dirty="0"/>
+          </a:p>
+        </p:txBody>
+      </p:sp>
+      <p:sp>
+        <p:nvSpPr>
+          <p:cNvPr id="11" name="Slide Number Placeholder 10"/>
+          <p:cNvSpPr>
+            <a:spLocks noGrp="1"/>
+          </p:cNvSpPr>
+          <p:nvPr>
+            <p:ph type="sldNum" sz="quarter" idx="12"/>
+          </p:nvPr>
+        </p:nvSpPr>
+        <p:spPr/>
+        <p:txBody>
+          <a:bodyPr/>
+          <a:lstStyle/>
+          <a:p>
+            <a:fld id="{401CF334-2D5C-4859-84A6-CA7E6E43FAEB}" type="slidenum">
+              <a:rPr lang="en-US" smtClean="0"/>
+              <a:t>10</a:t>
+            </a:fld>
+            <a:endParaRPr lang="en-US"/>
+          </a:p>
+        </p:txBody>
+      </p:sp>
+      <p:sp>
+        <p:nvSpPr>
+          <p:cNvPr id="12" name="Date Placeholder 11"/>
+          <p:cNvSpPr>
+            <a:spLocks noGrp="1"/>
+          </p:cNvSpPr>
+          <p:nvPr>
+            <p:ph type="dt" sz="half" idx="10"/>
+          </p:nvPr>
+        </p:nvSpPr>
+        <p:spPr/>
+        <p:txBody>
+          <a:bodyPr/>
+          <a:lstStyle/>
+          <a:p>
+            <a:fld id="{A84F1356-C1B6-49A4-8E93-C2FFC393265B}" type="datetime1">
+              <a:rPr lang="en-US" smtClean="0"/>
+              <a:t>4/23/2020</a:t>
+            </a:fld>
+            <a:endParaRPr lang="en-US"/>
+          </a:p>
+        </p:txBody>
+      </p:sp>
+    </p:spTree>
+    <p:extLst>
+      <p:ext uri="{BB962C8B-B14F-4D97-AF65-F5344CB8AC3E}">
+        <p14:creationId xmlns:p14="http://schemas.microsoft.com/office/powerpoint/2010/main" val="3890798063"/>
+      </p:ext>
+    </p:extLst>
+  </p:cSld>
+  <p:clrMapOvr>
+    <a:masterClrMapping/>
+  </p:clrMapOvr>
+  <mc:AlternateContent xmlns:mc="http://schemas.openxmlformats.org/markup-compatibility/2006" xmlns:p14="http://schemas.microsoft.com/office/powerpoint/2010/main">
+    <mc:Choice Requires="p14">
+      <p:transition spd="med" p14:dur="700">
+        <p:fade/>
+      </p:transition>
+    </mc:Choice>
+    <mc:Fallback xmlns="">
+      <p:transition spd="med">
+        <p:fade/>
+      </p:transition>
+    </mc:Fallback>
+  </mc:AlternateContent>
+</p:sld>
+</file>
+
+<file path=ppt/slides/slide11.xml><?xml version="1.0" encoding="utf-8"?>
+<p:sld xmlns:a="http://schemas.openxmlformats.org/drawingml/2006/main" xmlns:r="http://schemas.openxmlformats.org/officeDocument/2006/relationships" xmlns:p="http://schemas.openxmlformats.org/presentationml/2006/main">
+  <p:cSld>
+    <p:spTree>
+      <p:nvGrpSpPr>
+        <p:cNvPr id="1" name=""/>
+        <p:cNvGrpSpPr/>
+        <p:nvPr/>
+      </p:nvGrpSpPr>
+      <p:grpSpPr>
+        <a:xfrm>
+          <a:off x="0" y="0"/>
+          <a:ext cx="0" cy="0"/>
+          <a:chOff x="0" y="0"/>
+          <a:chExt cx="0" cy="0"/>
+        </a:xfrm>
+      </p:grpSpPr>
+      <p:sp>
+        <p:nvSpPr>
+          <p:cNvPr id="2" name="Title 1"/>
+          <p:cNvSpPr>
+            <a:spLocks noGrp="1"/>
+          </p:cNvSpPr>
+          <p:nvPr>
+            <p:ph type="title"/>
+          </p:nvPr>
+        </p:nvSpPr>
+        <p:spPr/>
+        <p:txBody>
+          <a:bodyPr>
+            <a:normAutofit/>
+          </a:bodyPr>
+          <a:lstStyle/>
+          <a:p>
+            <a:r>
+              <a:rPr lang="en-US" sz="2800" dirty="0"/>
+              <a:t>Query </a:t>
+            </a:r>
+            <a:r>
+              <a:rPr lang="en-US" sz="2800" dirty="0" smtClean="0"/>
+              <a:t>6:</a:t>
+            </a:r>
+            <a:r>
+              <a:rPr lang="en-US" sz="2800" dirty="0"/>
+              <a:t/>
+            </a:r>
+            <a:br>
+              <a:rPr lang="en-US" sz="2800" dirty="0"/>
+            </a:br>
+            <a:r>
+              <a:rPr lang="en-US" sz="2800" dirty="0"/>
+              <a:t>Number of profit-loss movie revenue in each year</a:t>
+            </a:r>
+            <a:endParaRPr lang="en-IN" sz="2800" dirty="0"/>
+          </a:p>
+        </p:txBody>
+      </p:sp>
+      <p:sp>
+        <p:nvSpPr>
+          <p:cNvPr id="6" name="Content Placeholder 5"/>
+          <p:cNvSpPr>
+            <a:spLocks noGrp="1"/>
+          </p:cNvSpPr>
+          <p:nvPr>
+            <p:ph sz="half" idx="1"/>
+          </p:nvPr>
+        </p:nvSpPr>
+        <p:spPr/>
+        <p:txBody>
+          <a:bodyPr>
+            <a:normAutofit/>
+          </a:bodyPr>
+          <a:lstStyle/>
+          <a:p>
+            <a:pPr algn="just"/>
+            <a:endParaRPr lang="en-US" sz="2000" dirty="0" smtClean="0"/>
+          </a:p>
+          <a:p>
+            <a:pPr algn="just"/>
+            <a:r>
+              <a:rPr lang="en-US" sz="2000" dirty="0" smtClean="0"/>
+              <a:t>This </a:t>
+            </a:r>
+            <a:r>
+              <a:rPr lang="en-US" sz="2000" dirty="0"/>
+              <a:t>query compares the budget of movies and the gross income made by movie. </a:t>
+            </a:r>
+            <a:endParaRPr lang="en-US" sz="2000" dirty="0" smtClean="0"/>
+          </a:p>
+          <a:p>
+            <a:pPr algn="just"/>
+            <a:r>
+              <a:rPr lang="en-US" sz="2000" dirty="0" smtClean="0"/>
+              <a:t>We </a:t>
+            </a:r>
+            <a:r>
+              <a:rPr lang="en-US" sz="2000" dirty="0"/>
+              <a:t>took a very coarse average of budgets and gross incomes. </a:t>
+            </a:r>
+            <a:endParaRPr lang="en-US" sz="2000" dirty="0" smtClean="0"/>
+          </a:p>
+          <a:p>
+            <a:pPr algn="just"/>
+            <a:r>
+              <a:rPr lang="en-US" sz="2000" dirty="0" smtClean="0"/>
+              <a:t>We </a:t>
+            </a:r>
+            <a:r>
+              <a:rPr lang="en-US" sz="2000" dirty="0"/>
+              <a:t>averaged all budgets and gross income of all movies in each year. The result is displayed using bar chart. </a:t>
+            </a:r>
+            <a:endParaRPr lang="en-US" sz="2000" dirty="0" smtClean="0"/>
+          </a:p>
+          <a:p>
+            <a:pPr algn="just"/>
+            <a:r>
+              <a:rPr lang="en-US" sz="2000" dirty="0" smtClean="0"/>
+              <a:t>By </a:t>
+            </a:r>
+            <a:r>
+              <a:rPr lang="en-US" sz="2000" dirty="0"/>
+              <a:t>using this visualization, we can which years the average budget is greater or lesser than what the movie received as the gross income. </a:t>
+            </a:r>
+            <a:endParaRPr lang="en-IN" sz="2000" dirty="0"/>
+          </a:p>
+        </p:txBody>
+      </p:sp>
+      <p:pic>
+        <p:nvPicPr>
+          <p:cNvPr id="4" name="Content Placeholder 3"/>
+          <p:cNvPicPr>
+            <a:picLocks noGrp="1" noChangeAspect="1"/>
+          </p:cNvPicPr>
+          <p:nvPr>
+            <p:ph sz="half" idx="2"/>
+          </p:nvPr>
+        </p:nvPicPr>
+        <p:blipFill>
+          <a:blip r:embed="rId2">
+            <a:extLst>
+              <a:ext uri="{28A0092B-C50C-407E-A947-70E740481C1C}">
+                <a14:useLocalDpi xmlns:a14="http://schemas.microsoft.com/office/drawing/2010/main" val="0"/>
+              </a:ext>
+            </a:extLst>
+          </a:blip>
+          <a:stretch>
+            <a:fillRect/>
+          </a:stretch>
+        </p:blipFill>
+        <p:spPr>
+          <a:xfrm>
+            <a:off x="5994400" y="2017906"/>
+            <a:ext cx="5816600" cy="3454904"/>
+          </a:xfrm>
+          <a:prstGeom prst="rect">
+            <a:avLst/>
+          </a:prstGeom>
+          <a:ln w="38100" cap="sq">
+            <a:solidFill>
+              <a:srgbClr val="000000"/>
+            </a:solidFill>
+            <a:prstDash val="solid"/>
+            <a:miter lim="800000"/>
+          </a:ln>
+          <a:effectLst>
+            <a:outerShdw blurRad="50800" dist="38100" dir="2700000" algn="tl" rotWithShape="0">
+              <a:srgbClr val="000000">
+                <a:alpha val="43000"/>
+              </a:srgbClr>
+            </a:outerShdw>
+          </a:effectLst>
+        </p:spPr>
+      </p:pic>
+      <p:sp>
+        <p:nvSpPr>
+          <p:cNvPr id="9" name="Footer Placeholder 8"/>
+          <p:cNvSpPr>
+            <a:spLocks noGrp="1"/>
+          </p:cNvSpPr>
+          <p:nvPr>
+            <p:ph type="ftr" sz="quarter" idx="11"/>
+          </p:nvPr>
+        </p:nvSpPr>
+        <p:spPr/>
+        <p:txBody>
+          <a:bodyPr/>
+          <a:lstStyle/>
+          <a:p>
+            <a:r>
+              <a:rPr lang="en-US" smtClean="0"/>
+              <a:t>CS532 - Database System Project - 3 | IMDB Data Analysis</a:t>
+            </a:r>
+            <a:endParaRPr lang="en-US" dirty="0"/>
+          </a:p>
+        </p:txBody>
+      </p:sp>
+      <p:sp>
+        <p:nvSpPr>
+          <p:cNvPr id="10" name="Slide Number Placeholder 9"/>
+          <p:cNvSpPr>
+            <a:spLocks noGrp="1"/>
+          </p:cNvSpPr>
+          <p:nvPr>
+            <p:ph type="sldNum" sz="quarter" idx="12"/>
+          </p:nvPr>
+        </p:nvSpPr>
+        <p:spPr/>
+        <p:txBody>
+          <a:bodyPr/>
+          <a:lstStyle/>
+          <a:p>
+            <a:fld id="{401CF334-2D5C-4859-84A6-CA7E6E43FAEB}" type="slidenum">
+              <a:rPr lang="en-US" smtClean="0"/>
+              <a:t>11</a:t>
+            </a:fld>
+            <a:endParaRPr lang="en-US"/>
+          </a:p>
+        </p:txBody>
+      </p:sp>
+      <p:sp>
+        <p:nvSpPr>
+          <p:cNvPr id="11" name="Date Placeholder 10"/>
+          <p:cNvSpPr>
+            <a:spLocks noGrp="1"/>
+          </p:cNvSpPr>
+          <p:nvPr>
+            <p:ph type="dt" sz="half" idx="10"/>
+          </p:nvPr>
+        </p:nvSpPr>
+        <p:spPr/>
+        <p:txBody>
+          <a:bodyPr/>
+          <a:lstStyle/>
+          <a:p>
+            <a:fld id="{B202A79C-9F35-4BCD-8C7A-D580BAFFC321}" type="datetime1">
+              <a:rPr lang="en-US" smtClean="0"/>
+              <a:t>4/23/2020</a:t>
+            </a:fld>
+            <a:endParaRPr lang="en-US"/>
+          </a:p>
+        </p:txBody>
+      </p:sp>
+    </p:spTree>
+    <p:extLst>
+      <p:ext uri="{BB962C8B-B14F-4D97-AF65-F5344CB8AC3E}">
+        <p14:creationId xmlns:p14="http://schemas.microsoft.com/office/powerpoint/2010/main" val="3541191203"/>
+      </p:ext>
+    </p:extLst>
+  </p:cSld>
+  <p:clrMapOvr>
+    <a:masterClrMapping/>
+  </p:clrMapOvr>
+  <mc:AlternateContent xmlns:mc="http://schemas.openxmlformats.org/markup-compatibility/2006" xmlns:p14="http://schemas.microsoft.com/office/powerpoint/2010/main">
+    <mc:Choice Requires="p14">
+      <p:transition spd="med" p14:dur="700">
+        <p:fade/>
+      </p:transition>
+    </mc:Choice>
+    <mc:Fallback xmlns="">
+      <p:transition spd="med">
+        <p:fade/>
+      </p:transition>
+    </mc:Fallback>
+  </mc:AlternateContent>
+</p:sld>
+</file>
+
+<file path=ppt/slides/slide12.xml><?xml version="1.0" encoding="utf-8"?>
+<p:sld xmlns:a="http://schemas.openxmlformats.org/drawingml/2006/main" xmlns:r="http://schemas.openxmlformats.org/officeDocument/2006/relationships" xmlns:p="http://schemas.openxmlformats.org/presentationml/2006/main">
+  <p:cSld>
+    <p:spTree>
+      <p:nvGrpSpPr>
+        <p:cNvPr id="1" name=""/>
+        <p:cNvGrpSpPr/>
+        <p:nvPr/>
+      </p:nvGrpSpPr>
+      <p:grpSpPr>
+        <a:xfrm>
+          <a:off x="0" y="0"/>
+          <a:ext cx="0" cy="0"/>
+          <a:chOff x="0" y="0"/>
+          <a:chExt cx="0" cy="0"/>
+        </a:xfrm>
+      </p:grpSpPr>
+      <p:sp>
+        <p:nvSpPr>
+          <p:cNvPr id="2" name="Title 1"/>
+          <p:cNvSpPr>
+            <a:spLocks noGrp="1"/>
+          </p:cNvSpPr>
+          <p:nvPr>
+            <p:ph type="title"/>
+          </p:nvPr>
+        </p:nvSpPr>
+        <p:spPr/>
+        <p:txBody>
+          <a:bodyPr>
+            <a:normAutofit/>
+          </a:bodyPr>
+          <a:lstStyle/>
+          <a:p>
+            <a:r>
+              <a:rPr lang="en-US" sz="2800" dirty="0"/>
+              <a:t>Query 7</a:t>
+            </a:r>
+            <a:r>
+              <a:rPr lang="en-US" sz="2800" dirty="0" smtClean="0"/>
+              <a:t>:</a:t>
+            </a:r>
+            <a:r>
+              <a:rPr lang="en-US" sz="2800" dirty="0"/>
+              <a:t/>
+            </a:r>
+            <a:br>
+              <a:rPr lang="en-US" sz="2800" dirty="0"/>
+            </a:br>
+            <a:r>
+              <a:rPr lang="en-US" sz="2800" dirty="0"/>
+              <a:t>Movies to watch based on ratings</a:t>
+            </a:r>
+            <a:endParaRPr lang="en-IN" sz="2800" dirty="0"/>
+          </a:p>
+        </p:txBody>
+      </p:sp>
+      <p:sp>
+        <p:nvSpPr>
+          <p:cNvPr id="6" name="Content Placeholder 5"/>
+          <p:cNvSpPr>
+            <a:spLocks noGrp="1"/>
+          </p:cNvSpPr>
+          <p:nvPr>
+            <p:ph sz="half" idx="1"/>
+          </p:nvPr>
+        </p:nvSpPr>
+        <p:spPr/>
+        <p:txBody>
+          <a:bodyPr>
+            <a:normAutofit/>
+          </a:bodyPr>
+          <a:lstStyle/>
+          <a:p>
+            <a:pPr algn="just"/>
+            <a:endParaRPr lang="en-US" sz="2000" dirty="0" smtClean="0"/>
+          </a:p>
+          <a:p>
+            <a:pPr algn="just"/>
+            <a:r>
+              <a:rPr lang="en-US" sz="2000" dirty="0" smtClean="0"/>
+              <a:t>This </a:t>
+            </a:r>
+            <a:r>
+              <a:rPr lang="en-US" sz="2000" dirty="0"/>
+              <a:t>query help us to list the movies </a:t>
+            </a:r>
+            <a:r>
+              <a:rPr lang="en-US" sz="2000" dirty="0" smtClean="0"/>
+              <a:t>whose IMDB score lies in between </a:t>
+            </a:r>
+            <a:r>
+              <a:rPr lang="en-US" sz="2000" dirty="0"/>
+              <a:t>the </a:t>
+            </a:r>
+            <a:r>
+              <a:rPr lang="en-US" sz="2000" dirty="0" smtClean="0"/>
+              <a:t>selected range in </a:t>
+            </a:r>
+            <a:r>
+              <a:rPr lang="en-US" sz="2000" dirty="0"/>
+              <a:t>the tabular format. </a:t>
+            </a:r>
+            <a:endParaRPr lang="en-US" sz="2000" dirty="0" smtClean="0"/>
+          </a:p>
+          <a:p>
+            <a:pPr algn="just"/>
+            <a:r>
+              <a:rPr lang="en-US" sz="2000" dirty="0" smtClean="0"/>
+              <a:t>This </a:t>
+            </a:r>
+            <a:r>
+              <a:rPr lang="en-US" sz="2000" dirty="0"/>
+              <a:t>query helps the users to see movies, which other people have rated high. </a:t>
+            </a:r>
+            <a:endParaRPr lang="en-US" sz="2000" dirty="0" smtClean="0"/>
+          </a:p>
+          <a:p>
+            <a:pPr algn="just"/>
+            <a:r>
+              <a:rPr lang="en-US" sz="2000" dirty="0" smtClean="0"/>
+              <a:t>So user </a:t>
+            </a:r>
+            <a:r>
+              <a:rPr lang="en-US" sz="2000" dirty="0"/>
+              <a:t>can filter the movies and choose the movie of his choice to watch. </a:t>
+            </a:r>
+            <a:endParaRPr lang="en-US" sz="2000" dirty="0" smtClean="0"/>
+          </a:p>
+          <a:p>
+            <a:pPr algn="just"/>
+            <a:r>
+              <a:rPr lang="en-US" sz="2000" dirty="0" smtClean="0"/>
+              <a:t>We </a:t>
+            </a:r>
+            <a:r>
+              <a:rPr lang="en-US" sz="2000" dirty="0"/>
+              <a:t>take the “year” as an input so that we can filter the movies as per the year and then from those </a:t>
+            </a:r>
+            <a:r>
+              <a:rPr lang="en-US" sz="2000" dirty="0" smtClean="0"/>
+              <a:t>set of movies we </a:t>
+            </a:r>
+            <a:r>
+              <a:rPr lang="en-US" sz="2000" dirty="0"/>
+              <a:t>displaying only those IMDB score is in between selected </a:t>
+            </a:r>
+            <a:r>
+              <a:rPr lang="en-US" sz="2000" dirty="0" smtClean="0"/>
+              <a:t>range. </a:t>
+            </a:r>
+            <a:endParaRPr lang="en-IN" sz="2000" dirty="0"/>
+          </a:p>
+        </p:txBody>
+      </p:sp>
+      <p:pic>
+        <p:nvPicPr>
+          <p:cNvPr id="8" name="Content Placeholder 7"/>
+          <p:cNvPicPr>
+            <a:picLocks noGrp="1" noChangeAspect="1"/>
+          </p:cNvPicPr>
+          <p:nvPr>
+            <p:ph sz="half" idx="2"/>
+          </p:nvPr>
+        </p:nvPicPr>
+        <p:blipFill>
+          <a:blip r:embed="rId2" cstate="print">
+            <a:extLst>
+              <a:ext uri="{28A0092B-C50C-407E-A947-70E740481C1C}">
+                <a14:useLocalDpi xmlns:a14="http://schemas.microsoft.com/office/drawing/2010/main" val="0"/>
+              </a:ext>
+            </a:extLst>
+          </a:blip>
+          <a:stretch>
+            <a:fillRect/>
+          </a:stretch>
+        </p:blipFill>
+        <p:spPr>
+          <a:xfrm>
+            <a:off x="6197600" y="2298701"/>
+            <a:ext cx="5384800" cy="3496056"/>
+          </a:xfrm>
+          <a:prstGeom prst="rect">
+            <a:avLst/>
+          </a:prstGeom>
+          <a:ln w="38100" cap="sq">
+            <a:solidFill>
+              <a:srgbClr val="000000"/>
+            </a:solidFill>
+            <a:prstDash val="solid"/>
+            <a:miter lim="800000"/>
+          </a:ln>
+          <a:effectLst>
+            <a:outerShdw blurRad="50800" dist="38100" dir="2700000" algn="tl" rotWithShape="0">
+              <a:srgbClr val="000000">
+                <a:alpha val="43000"/>
+              </a:srgbClr>
+            </a:outerShdw>
+          </a:effectLst>
+        </p:spPr>
+      </p:pic>
+      <p:sp>
+        <p:nvSpPr>
+          <p:cNvPr id="11" name="Footer Placeholder 10"/>
+          <p:cNvSpPr>
+            <a:spLocks noGrp="1"/>
+          </p:cNvSpPr>
+          <p:nvPr>
+            <p:ph type="ftr" sz="quarter" idx="11"/>
+          </p:nvPr>
+        </p:nvSpPr>
+        <p:spPr/>
+        <p:txBody>
+          <a:bodyPr/>
+          <a:lstStyle/>
+          <a:p>
+            <a:r>
+              <a:rPr lang="en-US" smtClean="0"/>
+              <a:t>CS532 - Database System Project - 3 | IMDB Data Analysis</a:t>
+            </a:r>
+            <a:endParaRPr lang="en-US" dirty="0"/>
+          </a:p>
+        </p:txBody>
+      </p:sp>
+      <p:sp>
+        <p:nvSpPr>
+          <p:cNvPr id="12" name="Slide Number Placeholder 11"/>
+          <p:cNvSpPr>
+            <a:spLocks noGrp="1"/>
+          </p:cNvSpPr>
+          <p:nvPr>
+            <p:ph type="sldNum" sz="quarter" idx="12"/>
+          </p:nvPr>
+        </p:nvSpPr>
+        <p:spPr/>
+        <p:txBody>
+          <a:bodyPr/>
+          <a:lstStyle/>
+          <a:p>
+            <a:fld id="{401CF334-2D5C-4859-84A6-CA7E6E43FAEB}" type="slidenum">
+              <a:rPr lang="en-US" smtClean="0"/>
+              <a:t>12</a:t>
+            </a:fld>
+            <a:endParaRPr lang="en-US"/>
+          </a:p>
+        </p:txBody>
+      </p:sp>
+      <p:sp>
+        <p:nvSpPr>
+          <p:cNvPr id="13" name="Date Placeholder 12"/>
+          <p:cNvSpPr>
+            <a:spLocks noGrp="1"/>
+          </p:cNvSpPr>
+          <p:nvPr>
+            <p:ph type="dt" sz="half" idx="10"/>
+          </p:nvPr>
+        </p:nvSpPr>
+        <p:spPr/>
+        <p:txBody>
+          <a:bodyPr/>
+          <a:lstStyle/>
+          <a:p>
+            <a:fld id="{5EA82EA6-2510-4221-A388-C0688FCA0B3F}" type="datetime1">
+              <a:rPr lang="en-US" smtClean="0"/>
+              <a:t>4/23/2020</a:t>
+            </a:fld>
+            <a:endParaRPr lang="en-US"/>
+          </a:p>
+        </p:txBody>
+      </p:sp>
+    </p:spTree>
+    <p:extLst>
+      <p:ext uri="{BB962C8B-B14F-4D97-AF65-F5344CB8AC3E}">
+        <p14:creationId xmlns:p14="http://schemas.microsoft.com/office/powerpoint/2010/main" val="1672036674"/>
+      </p:ext>
+    </p:extLst>
+  </p:cSld>
+  <p:clrMapOvr>
+    <a:masterClrMapping/>
+  </p:clrMapOvr>
+  <mc:AlternateContent xmlns:mc="http://schemas.openxmlformats.org/markup-compatibility/2006" xmlns:p14="http://schemas.microsoft.com/office/powerpoint/2010/main">
+    <mc:Choice Requires="p14">
+      <p:transition spd="med" p14:dur="700">
+        <p:fade/>
+      </p:transition>
+    </mc:Choice>
+    <mc:Fallback xmlns="">
+      <p:transition spd="med">
+        <p:fade/>
+      </p:transition>
+    </mc:Fallback>
+  </mc:AlternateContent>
+</p:sld>
+</file>
+
+<file path=ppt/slides/slide13.xml><?xml version="1.0" encoding="utf-8"?>
+<p:sld xmlns:a="http://schemas.openxmlformats.org/drawingml/2006/main" xmlns:r="http://schemas.openxmlformats.org/officeDocument/2006/relationships" xmlns:p="http://schemas.openxmlformats.org/presentationml/2006/main">
+  <p:cSld>
+    <p:spTree>
+      <p:nvGrpSpPr>
+        <p:cNvPr id="1" name=""/>
+        <p:cNvGrpSpPr/>
+        <p:nvPr/>
+      </p:nvGrpSpPr>
+      <p:grpSpPr>
+        <a:xfrm>
+          <a:off x="0" y="0"/>
+          <a:ext cx="0" cy="0"/>
+          <a:chOff x="0" y="0"/>
+          <a:chExt cx="0" cy="0"/>
+        </a:xfrm>
+      </p:grpSpPr>
+      <p:sp>
+        <p:nvSpPr>
+          <p:cNvPr id="2" name="Title 1"/>
+          <p:cNvSpPr>
+            <a:spLocks noGrp="1"/>
+          </p:cNvSpPr>
+          <p:nvPr>
+            <p:ph type="title"/>
+          </p:nvPr>
+        </p:nvSpPr>
+        <p:spPr/>
+        <p:txBody>
+          <a:bodyPr>
+            <a:normAutofit fontScale="90000"/>
+          </a:bodyPr>
+          <a:lstStyle/>
+          <a:p>
+            <a:r>
+              <a:rPr lang="en-US" sz="2800" dirty="0"/>
+              <a:t>Query </a:t>
+            </a:r>
+            <a:r>
+              <a:rPr lang="en-US" sz="2800" dirty="0" smtClean="0"/>
+              <a:t>8:</a:t>
+            </a:r>
+            <a:r>
+              <a:rPr lang="en-US" sz="2800" dirty="0"/>
+              <a:t/>
+            </a:r>
+            <a:br>
+              <a:rPr lang="en-US" sz="2800" dirty="0"/>
+            </a:br>
+            <a:r>
+              <a:rPr lang="en-US" sz="2800" dirty="0"/>
+              <a:t>Increasing/Decreasing trend of the movie genres for different years</a:t>
+            </a:r>
+            <a:endParaRPr lang="en-IN" sz="2800" dirty="0"/>
+          </a:p>
+        </p:txBody>
+      </p:sp>
+      <p:sp>
+        <p:nvSpPr>
+          <p:cNvPr id="6" name="Content Placeholder 5"/>
+          <p:cNvSpPr>
+            <a:spLocks noGrp="1"/>
+          </p:cNvSpPr>
+          <p:nvPr>
+            <p:ph sz="half" idx="1"/>
+          </p:nvPr>
+        </p:nvSpPr>
+        <p:spPr/>
+        <p:txBody>
+          <a:bodyPr>
+            <a:normAutofit lnSpcReduction="10000"/>
+          </a:bodyPr>
+          <a:lstStyle/>
+          <a:p>
+            <a:pPr algn="just"/>
+            <a:r>
+              <a:rPr lang="en-US" sz="2000" dirty="0"/>
+              <a:t>We have generated the line graph for this query where we are able to see all the genres with different colors and their increasing/decreasing trends over the year. </a:t>
+            </a:r>
+            <a:endParaRPr lang="en-US" sz="2000" dirty="0" smtClean="0"/>
+          </a:p>
+          <a:p>
+            <a:pPr algn="just"/>
+            <a:r>
+              <a:rPr lang="en-US" sz="2000" dirty="0" smtClean="0"/>
+              <a:t>Like </a:t>
+            </a:r>
+            <a:r>
+              <a:rPr lang="en-US" sz="2000" dirty="0"/>
+              <a:t>for e.g. If we consider the genre </a:t>
+            </a:r>
+            <a:r>
+              <a:rPr lang="en-US" sz="2000" dirty="0" smtClean="0"/>
+              <a:t>“crime”, </a:t>
+            </a:r>
+            <a:r>
+              <a:rPr lang="en-US" sz="2000" dirty="0"/>
+              <a:t>in the </a:t>
+            </a:r>
+            <a:r>
+              <a:rPr lang="en-US" sz="2000" dirty="0" smtClean="0"/>
+              <a:t>early years, making </a:t>
+            </a:r>
+            <a:r>
+              <a:rPr lang="en-US" sz="2000" dirty="0"/>
+              <a:t>the movie on this genre was </a:t>
+            </a:r>
+            <a:r>
+              <a:rPr lang="en-US" sz="2000" dirty="0" smtClean="0"/>
+              <a:t>less popular, </a:t>
+            </a:r>
+            <a:r>
+              <a:rPr lang="en-US" sz="2000" dirty="0"/>
+              <a:t>then </a:t>
+            </a:r>
+            <a:r>
+              <a:rPr lang="en-US" sz="2000" dirty="0" smtClean="0"/>
+              <a:t>the </a:t>
+            </a:r>
+            <a:r>
+              <a:rPr lang="en-US" sz="2000" dirty="0"/>
+              <a:t>directors started </a:t>
+            </a:r>
+            <a:r>
+              <a:rPr lang="en-US" sz="2000" dirty="0" smtClean="0"/>
+              <a:t>making more </a:t>
+            </a:r>
+            <a:r>
+              <a:rPr lang="en-US" sz="2000" dirty="0"/>
+              <a:t>movies based on this genre, so graph started going up. </a:t>
+            </a:r>
+            <a:endParaRPr lang="en-US" sz="2000" dirty="0" smtClean="0"/>
+          </a:p>
+          <a:p>
+            <a:pPr algn="just"/>
+            <a:r>
+              <a:rPr lang="en-US" sz="2000" dirty="0" smtClean="0"/>
+              <a:t>Recently </a:t>
+            </a:r>
+            <a:r>
+              <a:rPr lang="en-US" sz="2000" dirty="0"/>
+              <a:t>again the graph started coming down. So this way we can get the clear idea of trend of different genres in the </a:t>
+            </a:r>
+            <a:r>
+              <a:rPr lang="en-US" sz="2000" dirty="0" smtClean="0"/>
+              <a:t>different </a:t>
+            </a:r>
+            <a:r>
+              <a:rPr lang="en-US" sz="2000" dirty="0"/>
+              <a:t>years. </a:t>
+            </a:r>
+            <a:endParaRPr lang="en-IN" sz="2000" dirty="0"/>
+          </a:p>
+        </p:txBody>
+      </p:sp>
+      <p:pic>
+        <p:nvPicPr>
+          <p:cNvPr id="4" name="Content Placeholder 3"/>
+          <p:cNvPicPr>
+            <a:picLocks noGrp="1" noChangeAspect="1"/>
+          </p:cNvPicPr>
+          <p:nvPr>
+            <p:ph sz="half" idx="2"/>
+          </p:nvPr>
+        </p:nvPicPr>
+        <p:blipFill>
+          <a:blip r:embed="rId2">
+            <a:extLst>
+              <a:ext uri="{28A0092B-C50C-407E-A947-70E740481C1C}">
+                <a14:useLocalDpi xmlns:a14="http://schemas.microsoft.com/office/drawing/2010/main" val="0"/>
+              </a:ext>
+            </a:extLst>
+          </a:blip>
+          <a:stretch>
+            <a:fillRect/>
+          </a:stretch>
+        </p:blipFill>
+        <p:spPr>
+          <a:xfrm>
+            <a:off x="6197600" y="2088969"/>
+            <a:ext cx="5384800" cy="3386499"/>
+          </a:xfrm>
+          <a:prstGeom prst="rect">
+            <a:avLst/>
+          </a:prstGeom>
+          <a:ln w="38100" cap="sq">
+            <a:solidFill>
+              <a:srgbClr val="000000"/>
+            </a:solidFill>
+            <a:prstDash val="solid"/>
+            <a:miter lim="800000"/>
+          </a:ln>
+          <a:effectLst>
+            <a:outerShdw blurRad="50800" dist="38100" dir="2700000" algn="tl" rotWithShape="0">
+              <a:srgbClr val="000000">
+                <a:alpha val="43000"/>
+              </a:srgbClr>
+            </a:outerShdw>
+          </a:effectLst>
+        </p:spPr>
+      </p:pic>
+      <p:sp>
+        <p:nvSpPr>
+          <p:cNvPr id="7" name="Footer Placeholder 6"/>
+          <p:cNvSpPr>
+            <a:spLocks noGrp="1"/>
+          </p:cNvSpPr>
+          <p:nvPr>
+            <p:ph type="ftr" sz="quarter" idx="11"/>
+          </p:nvPr>
+        </p:nvSpPr>
+        <p:spPr/>
+        <p:txBody>
+          <a:bodyPr/>
+          <a:lstStyle/>
+          <a:p>
+            <a:r>
+              <a:rPr lang="en-US" smtClean="0"/>
+              <a:t>CS532 - Database System Project - 3 | IMDB Data Analysis</a:t>
+            </a:r>
+            <a:endParaRPr lang="en-US" dirty="0"/>
+          </a:p>
+        </p:txBody>
+      </p:sp>
+      <p:sp>
+        <p:nvSpPr>
+          <p:cNvPr id="8" name="Slide Number Placeholder 7"/>
+          <p:cNvSpPr>
+            <a:spLocks noGrp="1"/>
+          </p:cNvSpPr>
+          <p:nvPr>
+            <p:ph type="sldNum" sz="quarter" idx="12"/>
+          </p:nvPr>
+        </p:nvSpPr>
+        <p:spPr/>
+        <p:txBody>
+          <a:bodyPr/>
+          <a:lstStyle/>
+          <a:p>
+            <a:fld id="{401CF334-2D5C-4859-84A6-CA7E6E43FAEB}" type="slidenum">
+              <a:rPr lang="en-US" smtClean="0"/>
+              <a:t>13</a:t>
+            </a:fld>
+            <a:endParaRPr lang="en-US"/>
+          </a:p>
+        </p:txBody>
+      </p:sp>
+      <p:sp>
+        <p:nvSpPr>
+          <p:cNvPr id="9" name="Date Placeholder 8"/>
+          <p:cNvSpPr>
+            <a:spLocks noGrp="1"/>
+          </p:cNvSpPr>
+          <p:nvPr>
+            <p:ph type="dt" sz="half" idx="10"/>
+          </p:nvPr>
+        </p:nvSpPr>
+        <p:spPr/>
+        <p:txBody>
+          <a:bodyPr/>
+          <a:lstStyle/>
+          <a:p>
+            <a:fld id="{88E89752-07F8-47B8-953B-32FCBBB502FC}" type="datetime1">
+              <a:rPr lang="en-US" smtClean="0"/>
+              <a:t>4/23/2020</a:t>
+            </a:fld>
+            <a:endParaRPr lang="en-US"/>
+          </a:p>
+        </p:txBody>
+      </p:sp>
+    </p:spTree>
+    <p:extLst>
+      <p:ext uri="{BB962C8B-B14F-4D97-AF65-F5344CB8AC3E}">
+        <p14:creationId xmlns:p14="http://schemas.microsoft.com/office/powerpoint/2010/main" val="1243185854"/>
+      </p:ext>
+    </p:extLst>
+  </p:cSld>
+  <p:clrMapOvr>
+    <a:masterClrMapping/>
+  </p:clrMapOvr>
+  <mc:AlternateContent xmlns:mc="http://schemas.openxmlformats.org/markup-compatibility/2006" xmlns:p14="http://schemas.microsoft.com/office/powerpoint/2010/main">
+    <mc:Choice Requires="p14">
+      <p:transition spd="med" p14:dur="700">
+        <p:fade/>
+      </p:transition>
+    </mc:Choice>
+    <mc:Fallback xmlns="">
+      <p:transition spd="med">
+        <p:fade/>
+      </p:transition>
+    </mc:Fallback>
+  </mc:AlternateContent>
+</p:sld>
+</file>
+
+<file path=ppt/slides/slide14.xml><?xml version="1.0" encoding="utf-8"?>
+<p:sld xmlns:a="http://schemas.openxmlformats.org/drawingml/2006/main" xmlns:r="http://schemas.openxmlformats.org/officeDocument/2006/relationships" xmlns:p="http://schemas.openxmlformats.org/presentationml/2006/main">
+  <p:cSld>
+    <p:spTree>
+      <p:nvGrpSpPr>
+        <p:cNvPr id="1" name=""/>
+        <p:cNvGrpSpPr/>
+        <p:nvPr/>
+      </p:nvGrpSpPr>
+      <p:grpSpPr>
+        <a:xfrm>
+          <a:off x="0" y="0"/>
+          <a:ext cx="0" cy="0"/>
+          <a:chOff x="0" y="0"/>
+          <a:chExt cx="0" cy="0"/>
+        </a:xfrm>
+      </p:grpSpPr>
+      <p:sp>
+        <p:nvSpPr>
+          <p:cNvPr id="2" name="Title 1"/>
+          <p:cNvSpPr>
+            <a:spLocks noGrp="1"/>
+          </p:cNvSpPr>
+          <p:nvPr>
+            <p:ph type="title"/>
+          </p:nvPr>
+        </p:nvSpPr>
+        <p:spPr/>
+        <p:txBody>
+          <a:bodyPr>
+            <a:normAutofit/>
+          </a:bodyPr>
+          <a:lstStyle/>
+          <a:p>
+            <a:r>
+              <a:rPr lang="en-IN" sz="3600" dirty="0" smtClean="0"/>
+              <a:t>References</a:t>
+            </a:r>
+            <a:endParaRPr lang="en-IN" sz="3600" dirty="0"/>
+          </a:p>
+        </p:txBody>
+      </p:sp>
+      <p:sp>
+        <p:nvSpPr>
+          <p:cNvPr id="3" name="Content Placeholder 2"/>
+          <p:cNvSpPr>
+            <a:spLocks noGrp="1"/>
+          </p:cNvSpPr>
+          <p:nvPr>
+            <p:ph idx="1"/>
+          </p:nvPr>
+        </p:nvSpPr>
+        <p:spPr/>
+        <p:txBody>
+          <a:bodyPr>
+            <a:normAutofit/>
+          </a:bodyPr>
+          <a:lstStyle/>
+          <a:p>
+            <a:r>
+              <a:rPr lang="en-IN" sz="2000" dirty="0"/>
+              <a:t>IMDB. “What Is IMDb?” IMDb, IMDb.com, help.imdb.com/article/</a:t>
+            </a:r>
+            <a:r>
+              <a:rPr lang="en-IN" sz="2000" dirty="0" err="1"/>
+              <a:t>imdb</a:t>
+            </a:r>
+            <a:r>
+              <a:rPr lang="en-IN" sz="2000" dirty="0"/>
+              <a:t>/general-information/what-is- </a:t>
+            </a:r>
+            <a:r>
+              <a:rPr lang="en-IN" sz="2000" dirty="0" err="1"/>
+              <a:t>imdb</a:t>
+            </a:r>
+            <a:r>
+              <a:rPr lang="en-IN" sz="2000" dirty="0"/>
+              <a:t>/G836CY29Z4SGNMK5?ref_=helpart_nav_1</a:t>
+            </a:r>
+            <a:r>
+              <a:rPr lang="en-IN" sz="2000" dirty="0" smtClean="0"/>
+              <a:t>#</a:t>
+            </a:r>
+          </a:p>
+          <a:p>
+            <a:r>
+              <a:rPr lang="en-IN" sz="2000" dirty="0" err="1"/>
+              <a:t>Yueming</a:t>
+            </a:r>
+            <a:r>
+              <a:rPr lang="en-IN" sz="2000" dirty="0"/>
+              <a:t>. “IMDB 5000 Movie Dataset.” </a:t>
+            </a:r>
+            <a:r>
+              <a:rPr lang="en-IN" sz="2000" dirty="0" err="1"/>
+              <a:t>Kaggle</a:t>
+            </a:r>
+            <a:r>
+              <a:rPr lang="en-IN" sz="2000" dirty="0"/>
+              <a:t>, 16 Dec. 2017, </a:t>
+            </a:r>
+            <a:r>
+              <a:rPr lang="en-IN" sz="2000" dirty="0" smtClean="0">
+                <a:hlinkClick r:id="rId2"/>
+              </a:rPr>
+              <a:t>www.kaggle.com/carolzhangdc/imdb-5000-movie-dataset</a:t>
+            </a:r>
+            <a:endParaRPr lang="en-IN" sz="2000" dirty="0" smtClean="0"/>
+          </a:p>
+          <a:p>
+            <a:r>
+              <a:rPr lang="en-IN" sz="2000" dirty="0"/>
+              <a:t>Flask official Documentation </a:t>
+            </a:r>
+            <a:r>
+              <a:rPr lang="en-IN" sz="2000" dirty="0">
+                <a:hlinkClick r:id="rId3"/>
+              </a:rPr>
+              <a:t>https://flask.palletsprojects.com/en/1.1.x</a:t>
+            </a:r>
+            <a:r>
+              <a:rPr lang="en-IN" sz="2000" dirty="0" smtClean="0">
+                <a:hlinkClick r:id="rId3"/>
+              </a:rPr>
+              <a:t>/</a:t>
+            </a:r>
+            <a:endParaRPr lang="en-IN" sz="2000" dirty="0" smtClean="0"/>
+          </a:p>
+          <a:p>
+            <a:r>
+              <a:rPr lang="en-US" sz="2000" dirty="0"/>
+              <a:t>HTML Documentation and tutorial from </a:t>
+            </a:r>
+            <a:r>
+              <a:rPr lang="en-US" sz="2000" dirty="0">
+                <a:hlinkClick r:id="rId4"/>
+              </a:rPr>
+              <a:t>https://www.w3schools.com/html</a:t>
+            </a:r>
+            <a:r>
+              <a:rPr lang="en-US" sz="2000" dirty="0" smtClean="0">
+                <a:hlinkClick r:id="rId4"/>
+              </a:rPr>
+              <a:t>/</a:t>
+            </a:r>
+            <a:endParaRPr lang="en-US" sz="2000" dirty="0" smtClean="0"/>
+          </a:p>
+          <a:p>
+            <a:r>
+              <a:rPr lang="en-US" sz="2000" dirty="0"/>
+              <a:t>CSS and Bootstrap from </a:t>
+            </a:r>
+            <a:r>
+              <a:rPr lang="en-US" sz="2000" dirty="0">
+                <a:hlinkClick r:id="rId5"/>
+              </a:rPr>
+              <a:t>https://getbootstrap.com</a:t>
+            </a:r>
+            <a:r>
+              <a:rPr lang="en-US" sz="2000" dirty="0" smtClean="0">
+                <a:hlinkClick r:id="rId5"/>
+              </a:rPr>
+              <a:t>/</a:t>
+            </a:r>
+            <a:endParaRPr lang="en-US" sz="2000" dirty="0" smtClean="0"/>
+          </a:p>
+          <a:p>
+            <a:r>
+              <a:rPr lang="en-IN" sz="2000" dirty="0" smtClean="0"/>
+              <a:t>JQuery </a:t>
+            </a:r>
+            <a:r>
+              <a:rPr lang="en-IN" sz="2000" dirty="0"/>
+              <a:t>from </a:t>
+            </a:r>
+            <a:r>
+              <a:rPr lang="en-IN" sz="2000" dirty="0">
+                <a:hlinkClick r:id="rId6"/>
+              </a:rPr>
+              <a:t>https://jqueryui.com</a:t>
+            </a:r>
+            <a:r>
+              <a:rPr lang="en-IN" sz="2000" dirty="0" smtClean="0">
+                <a:hlinkClick r:id="rId6"/>
+              </a:rPr>
+              <a:t>/</a:t>
+            </a:r>
+            <a:endParaRPr lang="en-IN" sz="2000" dirty="0" smtClean="0"/>
+          </a:p>
+          <a:p>
+            <a:r>
+              <a:rPr lang="en-US" sz="2000" dirty="0"/>
+              <a:t>Referring fonts from </a:t>
+            </a:r>
+            <a:r>
+              <a:rPr lang="en-US" sz="2000" dirty="0">
+                <a:hlinkClick r:id="rId7"/>
+              </a:rPr>
+              <a:t>https://fonts.google.com</a:t>
+            </a:r>
+            <a:r>
+              <a:rPr lang="en-US" sz="2000" dirty="0" smtClean="0">
+                <a:hlinkClick r:id="rId7"/>
+              </a:rPr>
+              <a:t>/</a:t>
+            </a:r>
+            <a:endParaRPr lang="en-US" sz="2000" dirty="0" smtClean="0"/>
+          </a:p>
+          <a:p>
+            <a:r>
+              <a:rPr lang="en-IN" sz="2000" dirty="0" smtClean="0"/>
+              <a:t>Animation: </a:t>
+            </a:r>
+            <a:r>
+              <a:rPr lang="en-IN" sz="2000" dirty="0" smtClean="0">
+                <a:hlinkClick r:id="rId8"/>
+              </a:rPr>
+              <a:t>https</a:t>
+            </a:r>
+            <a:r>
+              <a:rPr lang="en-IN" sz="2000" dirty="0">
+                <a:hlinkClick r:id="rId8"/>
+              </a:rPr>
+              <a:t>://</a:t>
+            </a:r>
+            <a:r>
+              <a:rPr lang="en-IN" sz="2000" dirty="0" smtClean="0">
+                <a:hlinkClick r:id="rId8"/>
+              </a:rPr>
+              <a:t>wowjs.uk/docs</a:t>
+            </a:r>
+            <a:endParaRPr lang="en-IN" sz="2000" dirty="0" smtClean="0"/>
+          </a:p>
+          <a:p>
+            <a:r>
+              <a:rPr lang="en-IN" sz="2000" dirty="0"/>
+              <a:t>Charts Library: </a:t>
+            </a:r>
+            <a:r>
+              <a:rPr lang="en-IN" sz="2000" dirty="0">
+                <a:hlinkClick r:id="rId9"/>
+              </a:rPr>
+              <a:t>https://www.chartjs.org</a:t>
+            </a:r>
+            <a:r>
+              <a:rPr lang="en-IN" sz="2000" dirty="0" smtClean="0">
+                <a:hlinkClick r:id="rId9"/>
+              </a:rPr>
+              <a:t>/</a:t>
+            </a:r>
+            <a:endParaRPr lang="en-IN" sz="2000" dirty="0" smtClean="0"/>
+          </a:p>
+          <a:p>
+            <a:r>
+              <a:rPr lang="en-IN" sz="2000" dirty="0" smtClean="0"/>
+              <a:t>Images of Slider and favicon are referred </a:t>
+            </a:r>
+            <a:r>
+              <a:rPr lang="en-US" sz="2000" dirty="0" smtClean="0">
+                <a:hlinkClick r:id="rId10"/>
+              </a:rPr>
+              <a:t>https</a:t>
+            </a:r>
+            <a:r>
+              <a:rPr lang="en-US" sz="2000" dirty="0">
+                <a:hlinkClick r:id="rId10"/>
+              </a:rPr>
+              <a:t>://</a:t>
+            </a:r>
+            <a:r>
+              <a:rPr lang="en-US" sz="2000" dirty="0" smtClean="0">
+                <a:hlinkClick r:id="rId10"/>
+              </a:rPr>
+              <a:t>www.google.com/imghp?hl=en</a:t>
+            </a:r>
+            <a:endParaRPr lang="en-US" sz="2000" dirty="0" smtClean="0"/>
+          </a:p>
+          <a:p>
+            <a:pPr marL="0" indent="0">
+              <a:buNone/>
+            </a:pPr>
+            <a:endParaRPr lang="en-IN" sz="2000" dirty="0" smtClean="0"/>
+          </a:p>
+          <a:p>
+            <a:endParaRPr lang="en-IN" sz="2000" dirty="0"/>
+          </a:p>
+        </p:txBody>
+      </p:sp>
+      <p:sp>
+        <p:nvSpPr>
+          <p:cNvPr id="6" name="Footer Placeholder 5"/>
+          <p:cNvSpPr>
+            <a:spLocks noGrp="1"/>
+          </p:cNvSpPr>
+          <p:nvPr>
+            <p:ph type="ftr" sz="quarter" idx="11"/>
+          </p:nvPr>
+        </p:nvSpPr>
+        <p:spPr/>
+        <p:txBody>
+          <a:bodyPr/>
+          <a:lstStyle/>
+          <a:p>
+            <a:r>
+              <a:rPr lang="en-US" smtClean="0"/>
+              <a:t>CS532 - Database System Project - 3 | IMDB Data Analysis</a:t>
+            </a:r>
+            <a:endParaRPr lang="en-US" dirty="0"/>
+          </a:p>
+        </p:txBody>
+      </p:sp>
+      <p:sp>
+        <p:nvSpPr>
+          <p:cNvPr id="7" name="Slide Number Placeholder 6"/>
+          <p:cNvSpPr>
+            <a:spLocks noGrp="1"/>
+          </p:cNvSpPr>
+          <p:nvPr>
+            <p:ph type="sldNum" sz="quarter" idx="12"/>
+          </p:nvPr>
+        </p:nvSpPr>
+        <p:spPr/>
+        <p:txBody>
+          <a:bodyPr/>
+          <a:lstStyle/>
+          <a:p>
+            <a:fld id="{401CF334-2D5C-4859-84A6-CA7E6E43FAEB}" type="slidenum">
+              <a:rPr lang="en-US" smtClean="0"/>
+              <a:t>14</a:t>
+            </a:fld>
+            <a:endParaRPr lang="en-US"/>
+          </a:p>
+        </p:txBody>
+      </p:sp>
+      <p:sp>
+        <p:nvSpPr>
+          <p:cNvPr id="8" name="Date Placeholder 7"/>
+          <p:cNvSpPr>
+            <a:spLocks noGrp="1"/>
+          </p:cNvSpPr>
+          <p:nvPr>
+            <p:ph type="dt" sz="half" idx="10"/>
+          </p:nvPr>
+        </p:nvSpPr>
+        <p:spPr/>
+        <p:txBody>
+          <a:bodyPr/>
+          <a:lstStyle/>
+          <a:p>
+            <a:fld id="{4B91880D-CA43-482E-890B-4D9A505993A5}" type="datetime1">
+              <a:rPr lang="en-US" smtClean="0"/>
+              <a:t>4/23/2020</a:t>
+            </a:fld>
+            <a:endParaRPr lang="en-US"/>
+          </a:p>
+        </p:txBody>
+      </p:sp>
+    </p:spTree>
+    <p:extLst>
+      <p:ext uri="{BB962C8B-B14F-4D97-AF65-F5344CB8AC3E}">
+        <p14:creationId xmlns:p14="http://schemas.microsoft.com/office/powerpoint/2010/main" val="2098766824"/>
+      </p:ext>
+    </p:extLst>
+  </p:cSld>
+  <p:clrMapOvr>
+    <a:masterClrMapping/>
+  </p:clrMapOvr>
+  <mc:AlternateContent xmlns:mc="http://schemas.openxmlformats.org/markup-compatibility/2006" xmlns:p14="http://schemas.microsoft.com/office/powerpoint/2010/main">
+    <mc:Choice Requires="p14">
+      <p:transition spd="med" p14:dur="700">
+        <p:fade/>
+      </p:transition>
+    </mc:Choice>
+    <mc:Fallback xmlns="">
+      <p:transition spd="med">
+        <p:fade/>
+      </p:transition>
+    </mc:Fallback>
+  </mc:AlternateContent>
+</p:sld>
+</file>
+
 <file path=ppt/slides/slide2.xml><?xml version="1.0" encoding="utf-8"?>
 <p:sld xmlns:a="http://schemas.openxmlformats.org/drawingml/2006/main" xmlns:r="http://schemas.openxmlformats.org/officeDocument/2006/relationships" xmlns:p="http://schemas.openxmlformats.org/presentationml/2006/main">
   <p:cSld>
@@ -4928,6 +6739,7 @@
           <a:bodyPr/>
           <a:lstStyle/>
           <a:p>
+            <a:pPr algn="just"/>
             <a:r>
               <a:rPr lang="en-US" sz="2000" dirty="0"/>
               <a:t>IMDb is the world most popular sites for movies, TV and celebrity content which has been around since </a:t>
@@ -4938,12 +6750,14 @@
             </a:r>
           </a:p>
           <a:p>
+            <a:pPr algn="just"/>
             <a:r>
               <a:rPr lang="en-US" sz="2000" dirty="0"/>
               <a:t>This application aims to give better analysis and experience to the users by giving the curated analysis about the different movies based on their corresponding IMDB scores, revenue generated and also gives a broader view to the user to see what movies they can watch and what is its statistics.</a:t>
             </a:r>
           </a:p>
           <a:p>
+            <a:pPr algn="just"/>
             <a:r>
               <a:rPr lang="en-US" sz="2000" dirty="0"/>
               <a:t>Performing all this analysis on such a huge data might be difficult using the structures DB but this is somewhat eased </a:t>
@@ -4962,11 +6776,81 @@
             </a:r>
           </a:p>
           <a:p>
+            <a:pPr algn="just"/>
             <a:r>
               <a:rPr lang="en-US" sz="2000" dirty="0" smtClean="0"/>
               <a:t>Reading all the analysis in just textual format is also somewhat tedious and time consuming. Hence we have designed the line and bar graphs to visualize the data in a better way.</a:t>
             </a:r>
             <a:endParaRPr lang="en-US" sz="2000" dirty="0"/>
+          </a:p>
+        </p:txBody>
+      </p:sp>
+      <p:sp>
+        <p:nvSpPr>
+          <p:cNvPr id="6" name="Footer Placeholder 5"/>
+          <p:cNvSpPr>
+            <a:spLocks noGrp="1"/>
+          </p:cNvSpPr>
+          <p:nvPr>
+            <p:ph type="ftr" sz="quarter" idx="11"/>
+          </p:nvPr>
+        </p:nvSpPr>
+        <p:spPr/>
+        <p:txBody>
+          <a:bodyPr/>
+          <a:lstStyle/>
+          <a:p>
+            <a:r>
+              <a:rPr lang="en-US" dirty="0" smtClean="0"/>
+              <a:t>CS532 - Database System Project - 3 | IMDB Data Analysis</a:t>
+            </a:r>
+            <a:endParaRPr lang="en-US" dirty="0"/>
+          </a:p>
+        </p:txBody>
+      </p:sp>
+      <p:sp>
+        <p:nvSpPr>
+          <p:cNvPr id="7" name="Slide Number Placeholder 6"/>
+          <p:cNvSpPr>
+            <a:spLocks noGrp="1"/>
+          </p:cNvSpPr>
+          <p:nvPr>
+            <p:ph type="sldNum" sz="quarter" idx="12"/>
+          </p:nvPr>
+        </p:nvSpPr>
+        <p:spPr/>
+        <p:txBody>
+          <a:bodyPr/>
+          <a:lstStyle/>
+          <a:p>
+            <a:fld id="{401CF334-2D5C-4859-84A6-CA7E6E43FAEB}" type="slidenum">
+              <a:rPr lang="en-US" smtClean="0"/>
+              <a:t>2</a:t>
+            </a:fld>
+            <a:endParaRPr lang="en-US"/>
+          </a:p>
+        </p:txBody>
+      </p:sp>
+      <p:sp>
+        <p:nvSpPr>
+          <p:cNvPr id="8" name="Date Placeholder 7"/>
+          <p:cNvSpPr>
+            <a:spLocks noGrp="1"/>
+          </p:cNvSpPr>
+          <p:nvPr>
+            <p:ph type="dt" sz="half" idx="10"/>
+          </p:nvPr>
+        </p:nvSpPr>
+        <p:spPr/>
+        <p:txBody>
+          <a:bodyPr/>
+          <a:lstStyle/>
+          <a:p>
+            <a:fld id="{2A7D06BF-E9EE-4E76-B8B4-6733454F1536}" type="datetime1">
+              <a:rPr lang="en-US" smtClean="0"/>
+              <a:t>4/23/2020</a:t>
+            </a:fld>
+            <a:endParaRPr lang="en-US"/>
           </a:p>
         </p:txBody>
       </p:sp>
@@ -5061,18 +6945,21 @@
           </a:bodyPr>
           <a:lstStyle/>
           <a:p>
+            <a:pPr algn="just"/>
             <a:r>
               <a:rPr lang="en-US" sz="2000" dirty="0" smtClean="0"/>
               <a:t>Database: We have used the NoSQL DB “MongoDB” to store all the data. It is basically Open source, document based and also it provides the support to store unstructured and can be retrieved in different forms.</a:t>
             </a:r>
           </a:p>
           <a:p>
+            <a:pPr algn="just"/>
             <a:r>
               <a:rPr lang="en-US" sz="2000" dirty="0" smtClean="0"/>
               <a:t>Data is stored in database name “movies” and inside the database there is a collection named “movies”.</a:t>
             </a:r>
           </a:p>
           <a:p>
+            <a:pPr algn="just"/>
             <a:r>
               <a:rPr lang="en-US" sz="2000" dirty="0" smtClean="0"/>
               <a:t>Frontend: After the data being retrieved in python, we have displayed the data in a user friendly manner using HTML, CSS and JavaScript.HTML</a:t>
@@ -5084,13 +6971,10 @@
             <a:endParaRPr lang="en-US" sz="2000" dirty="0" smtClean="0"/>
           </a:p>
           <a:p>
+            <a:pPr algn="just"/>
             <a:r>
               <a:rPr lang="en-US" sz="2000" dirty="0" smtClean="0"/>
-              <a:t>Backend:</a:t>
-            </a:r>
-            <a:r>
-              <a:rPr lang="en-US" sz="2000" dirty="0" smtClean="0"/>
-              <a:t> we have used </a:t>
+              <a:t>Backend: we have used </a:t>
             </a:r>
             <a:r>
               <a:rPr lang="en-US" sz="2000" dirty="0"/>
@@ -5107,6 +6991,7 @@
             <a:endParaRPr lang="en-US" sz="2000" dirty="0" smtClean="0"/>
           </a:p>
           <a:p>
+            <a:pPr algn="just"/>
             <a:r>
               <a:rPr lang="en-US" sz="2000" dirty="0" smtClean="0"/>
               <a:t>Middleware: To wrap the whole project and create a connection we have used micro-framework “</a:t>
@@ -5120,6 +7005,75 @@
               <a:t>” as the scaffolding for developing the web-based application.</a:t>
             </a:r>
             <a:endParaRPr lang="en-US" sz="2000" dirty="0"/>
+          </a:p>
+        </p:txBody>
+      </p:sp>
+      <p:sp>
+        <p:nvSpPr>
+          <p:cNvPr id="6" name="Footer Placeholder 5"/>
+          <p:cNvSpPr>
+            <a:spLocks noGrp="1"/>
+          </p:cNvSpPr>
+          <p:nvPr>
+            <p:ph type="ftr" sz="quarter" idx="11"/>
+          </p:nvPr>
+        </p:nvSpPr>
+        <p:spPr/>
+        <p:txBody>
+          <a:bodyPr/>
+          <a:lstStyle/>
+          <a:p>
+            <a:r>
+              <a:rPr lang="en-US" smtClean="0"/>
+              <a:t>CS532 - Database System Project - 3 | IMDB Data Analysis</a:t>
+            </a:r>
+            <a:endParaRPr lang="en-US" dirty="0"/>
+          </a:p>
+        </p:txBody>
+      </p:sp>
+      <p:sp>
+        <p:nvSpPr>
+          <p:cNvPr id="7" name="Slide Number Placeholder 6"/>
+          <p:cNvSpPr>
+            <a:spLocks noGrp="1"/>
+          </p:cNvSpPr>
+          <p:nvPr>
+            <p:ph type="sldNum" sz="quarter" idx="12"/>
+          </p:nvPr>
+        </p:nvSpPr>
+        <p:spPr/>
+        <p:txBody>
+          <a:bodyPr/>
+          <a:lstStyle/>
+          <a:p>
+            <a:fld id="{401CF334-2D5C-4859-84A6-CA7E6E43FAEB}" type="slidenum">
+              <a:rPr lang="en-US" smtClean="0"/>
+              <a:t>3</a:t>
+            </a:fld>
+            <a:endParaRPr lang="en-US"/>
+          </a:p>
+        </p:txBody>
+      </p:sp>
+      <p:sp>
+        <p:nvSpPr>
+          <p:cNvPr id="8" name="Date Placeholder 7"/>
+          <p:cNvSpPr>
+            <a:spLocks noGrp="1"/>
+          </p:cNvSpPr>
+          <p:nvPr>
+            <p:ph type="dt" sz="half" idx="10"/>
+          </p:nvPr>
+        </p:nvSpPr>
+        <p:spPr/>
+        <p:txBody>
+          <a:bodyPr/>
+          <a:lstStyle/>
+          <a:p>
+            <a:fld id="{E2D52A79-7C7D-4B80-A73D-C719B728589D}" type="datetime1">
+              <a:rPr lang="en-US" smtClean="0"/>
+              <a:t>4/23/2020</a:t>
+            </a:fld>
+            <a:endParaRPr lang="en-US"/>
           </a:p>
         </p:txBody>
       </p:sp>
@@ -5174,7 +7128,7 @@
       </p:grpSpPr>
       <p:sp>
         <p:nvSpPr>
-          <p:cNvPr id="3" name="Title 2"/>
+          <p:cNvPr id="2" name="Title 1"/>
           <p:cNvSpPr>
             <a:spLocks noGrp="1"/>
           </p:cNvSpPr>
@@ -5190,16 +7144,19 @@
           <a:lstStyle/>
           <a:p>
             <a:r>
-              <a:rPr lang="en-US" sz="3600" dirty="0" smtClean="0"/>
-              <a:t>Operations/Queries Supported:</a:t>
-            </a:r>
-            <a:endParaRPr lang="en-US" sz="3600" dirty="0"/>
-          </a:p>
-        </p:txBody>
-      </p:sp>
-      <p:sp>
-        <p:nvSpPr>
-          <p:cNvPr id="2" name="Content Placeholder 1"/>
+              <a:rPr lang="en-IN" sz="3600" dirty="0" smtClean="0"/>
+              <a:t>Data Cleaning Proces</a:t>
+            </a:r>
+            <a:r>
+              <a:rPr lang="en-IN" sz="3600" dirty="0"/>
+              <a:t>s</a:t>
+            </a:r>
+          </a:p>
+        </p:txBody>
+      </p:sp>
+      <p:sp>
+        <p:nvSpPr>
+          <p:cNvPr id="3" name="Content Placeholder 2"/>
           <p:cNvSpPr>
             <a:spLocks noGrp="1"/>
           </p:cNvSpPr>
@@ -5214,80 +7171,141 @@
           </a:bodyPr>
           <a:lstStyle/>
           <a:p>
-            <a:r>
-              <a:rPr lang="en-US" sz="2000" dirty="0" smtClean="0"/>
-              <a:t>All the queries are “select” queries, we fire the queries to the MongoDB Dataset, retrieve the data and we then represent it in the format as needed.</a:t>
-            </a:r>
-          </a:p>
-          <a:p>
-            <a:r>
-              <a:rPr lang="en-US" sz="2000" dirty="0" smtClean="0"/>
-              <a:t>We simply need to pass the parameter as an input like:</a:t>
-            </a:r>
-          </a:p>
-          <a:p>
-            <a:pPr lvl="1"/>
-            <a:r>
-              <a:rPr lang="en-US" sz="2000" dirty="0" smtClean="0"/>
-              <a:t>Year </a:t>
-            </a:r>
-            <a:r>
-              <a:rPr lang="en-US" sz="2000" dirty="0" smtClean="0">
-                <a:sym typeface="Wingdings" panose="05000000000000000000" pitchFamily="2" charset="2"/>
-              </a:rPr>
-              <a:t> year of the movie released</a:t>
-            </a:r>
-          </a:p>
-          <a:p>
-            <a:pPr lvl="1"/>
-            <a:r>
-              <a:rPr lang="en-US" sz="2000" dirty="0" smtClean="0">
-                <a:sym typeface="Wingdings" panose="05000000000000000000" pitchFamily="2" charset="2"/>
-              </a:rPr>
-              <a:t>Genre  Movies from the specific year of specific genre.</a:t>
-            </a:r>
-          </a:p>
-          <a:p>
-            <a:pPr lvl="1"/>
-            <a:r>
-              <a:rPr lang="en-US" sz="2000" dirty="0" smtClean="0">
-                <a:sym typeface="Wingdings" panose="05000000000000000000" pitchFamily="2" charset="2"/>
-              </a:rPr>
-              <a:t>Range slider  Slider to give the lower and upper bound of the IMDB Score.</a:t>
-            </a:r>
-          </a:p>
-          <a:p>
-            <a:r>
-              <a:rPr lang="en-US" sz="2000" dirty="0" smtClean="0"/>
-              <a:t>These operations is facilitated by the mongo query ‘</a:t>
-            </a:r>
-            <a:r>
-              <a:rPr lang="en-US" sz="2000" b="1" dirty="0" smtClean="0"/>
-              <a:t>find</a:t>
-            </a:r>
-            <a:r>
-              <a:rPr lang="en-US" sz="2000" dirty="0" smtClean="0"/>
-              <a:t>’.</a:t>
-            </a:r>
-          </a:p>
-          <a:p>
-            <a:r>
-              <a:rPr lang="en-US" sz="2000" dirty="0" smtClean="0"/>
-              <a:t>Following are the queries supported by this application:</a:t>
-            </a:r>
-          </a:p>
-          <a:p>
             <a:pPr marL="0" indent="0">
               <a:buNone/>
             </a:pPr>
+            <a:r>
+              <a:rPr lang="en-US" sz="2000" dirty="0" smtClean="0"/>
+              <a:t>We </a:t>
+            </a:r>
+            <a:r>
+              <a:rPr lang="en-US" sz="2000" dirty="0"/>
+              <a:t>have done following things to clean and purify the data: </a:t>
+            </a:r>
+            <a:endParaRPr lang="en-IN" sz="2000" dirty="0"/>
+          </a:p>
+          <a:p>
+            <a:r>
+              <a:rPr lang="en-US" sz="2000" dirty="0"/>
+              <a:t>For the Null values in the column with Number as Data type, we have filled it with Average of the column. </a:t>
+            </a:r>
+            <a:endParaRPr lang="en-IN" sz="2000" dirty="0"/>
+          </a:p>
+          <a:p>
+            <a:r>
+              <a:rPr lang="en-US" sz="2000" dirty="0"/>
+              <a:t>For the Columns of Revenue, we have generated the random number between the specific ranges to fill out null values. </a:t>
+            </a:r>
+            <a:endParaRPr lang="en-IN" sz="2000" dirty="0"/>
+          </a:p>
+          <a:p>
+            <a:r>
+              <a:rPr lang="en-US" sz="2000" dirty="0"/>
+              <a:t>Use of Excel formulas to trim and remove the </a:t>
+            </a:r>
+            <a:r>
+              <a:rPr lang="en-US" sz="2000" dirty="0" smtClean="0"/>
+              <a:t>unnecessary </a:t>
+            </a:r>
+            <a:r>
+              <a:rPr lang="en-US" sz="2000" dirty="0"/>
+              <a:t>blanks spaces in between the words and at the end</a:t>
+            </a:r>
+            <a:r>
+              <a:rPr lang="en-US" sz="2000" dirty="0" smtClean="0"/>
+              <a:t>.</a:t>
+            </a:r>
+            <a:endParaRPr lang="en-IN" sz="2000" dirty="0"/>
+          </a:p>
+          <a:p>
+            <a:r>
+              <a:rPr lang="en-US" sz="2000" dirty="0"/>
+              <a:t>For null values in the columns with the string datatype we have replace it with the dummy string</a:t>
+            </a:r>
+            <a:r>
+              <a:rPr lang="en-US" sz="2000" dirty="0" smtClean="0"/>
+              <a:t>.</a:t>
+            </a:r>
             <a:endParaRPr lang="en-US" sz="2000" dirty="0"/>
+          </a:p>
+          <a:p>
+            <a:endParaRPr lang="en-IN" sz="2000" dirty="0"/>
+          </a:p>
+        </p:txBody>
+      </p:sp>
+      <p:sp>
+        <p:nvSpPr>
+          <p:cNvPr id="4" name="Date Placeholder 3"/>
+          <p:cNvSpPr>
+            <a:spLocks noGrp="1"/>
+          </p:cNvSpPr>
+          <p:nvPr>
+            <p:ph type="dt" sz="half" idx="10"/>
+          </p:nvPr>
+        </p:nvSpPr>
+        <p:spPr/>
+        <p:txBody>
+          <a:bodyPr/>
+          <a:lstStyle/>
+          <a:p>
+            <a:fld id="{6962C5E1-6D18-4673-85A9-B84F9A603C62}" type="datetime1">
+              <a:rPr lang="en-US" smtClean="0"/>
+              <a:t>4/23/2020</a:t>
+            </a:fld>
+            <a:endParaRPr lang="en-US"/>
+          </a:p>
+        </p:txBody>
+      </p:sp>
+      <p:sp>
+        <p:nvSpPr>
+          <p:cNvPr id="5" name="Footer Placeholder 4"/>
+          <p:cNvSpPr>
+            <a:spLocks noGrp="1"/>
+          </p:cNvSpPr>
+          <p:nvPr>
+            <p:ph type="ftr" sz="quarter" idx="11"/>
+          </p:nvPr>
+        </p:nvSpPr>
+        <p:spPr/>
+        <p:txBody>
+          <a:bodyPr/>
+          <a:lstStyle/>
+          <a:p>
+            <a:r>
+              <a:rPr lang="en-US" smtClean="0"/>
+              <a:t>CS532 - Database System Project - 3 | IMDB Data Analysis</a:t>
+            </a:r>
+            <a:endParaRPr lang="en-US" dirty="0"/>
+          </a:p>
+        </p:txBody>
+      </p:sp>
+      <p:sp>
+        <p:nvSpPr>
+          <p:cNvPr id="6" name="Slide Number Placeholder 5"/>
+          <p:cNvSpPr>
+            <a:spLocks noGrp="1"/>
+          </p:cNvSpPr>
+          <p:nvPr>
+            <p:ph type="sldNum" sz="quarter" idx="12"/>
+          </p:nvPr>
+        </p:nvSpPr>
+        <p:spPr/>
+        <p:txBody>
+          <a:bodyPr/>
+          <a:lstStyle/>
+          <a:p>
+            <a:fld id="{401CF334-2D5C-4859-84A6-CA7E6E43FAEB}" type="slidenum">
+              <a:rPr lang="en-US" smtClean="0"/>
+              <a:t>4</a:t>
+            </a:fld>
+            <a:endParaRPr lang="en-US"/>
           </a:p>
         </p:txBody>
       </p:sp>
     </p:spTree>
     <p:extLst>
       <p:ext uri="{BB962C8B-B14F-4D97-AF65-F5344CB8AC3E}">
-        <p14:creationId xmlns:p14="http://schemas.microsoft.com/office/powerpoint/2010/main" val="115085417"/>
+        <p14:creationId xmlns:p14="http://schemas.microsoft.com/office/powerpoint/2010/main" val="2660574855"/>
       </p:ext>
     </p:extLst>
   </p:cSld>
@@ -5306,13 +7324,6 @@
       </p:transition>
     </mc:Fallback>
   </mc:AlternateContent>
-  <p:timing>
-    <p:tnLst>
-      <p:par>
-        <p:cTn id="1" dur="indefinite" restart="never" nodeType="tmRoot"/>
-      </p:par>
-    </p:tnLst>
-  </p:timing>
 </p:sld>
 </file>
 
@@ -5343,53 +7354,7 @@
             <p:ph type="title"/>
           </p:nvPr>
         </p:nvSpPr>
-        <p:spPr>
-          <a:xfrm>
-            <a:off x="609600" y="792480"/>
-            <a:ext cx="10972800" cy="1143000"/>
-          </a:xfrm>
-        </p:spPr>
-        <p:txBody>
-          <a:bodyPr>
-            <a:noAutofit/>
-          </a:bodyPr>
-          <a:lstStyle/>
-          <a:p>
-            <a:r>
-              <a:rPr lang="en-US" sz="3600" dirty="0" smtClean="0"/>
-              <a:t>Query 1:</a:t>
-            </a:r>
-            <a:r>
-              <a:rPr lang="en-US" sz="3600" dirty="0"/>
-              <a:t/>
-            </a:r>
-            <a:br>
-              <a:rPr lang="en-US" sz="3600" dirty="0"/>
-            </a:br>
-            <a:r>
-              <a:rPr lang="en-US" sz="3600" dirty="0"/>
-              <a:t>List of movies yearly</a:t>
-            </a:r>
-            <a:endParaRPr lang="en-US" sz="3600" dirty="0"/>
-          </a:p>
-        </p:txBody>
-      </p:sp>
-      <p:sp>
-        <p:nvSpPr>
-          <p:cNvPr id="2" name="Content Placeholder 1"/>
-          <p:cNvSpPr>
-            <a:spLocks noGrp="1"/>
-          </p:cNvSpPr>
-          <p:nvPr>
-            <p:ph idx="1"/>
-          </p:nvPr>
-        </p:nvSpPr>
-        <p:spPr>
-          <a:xfrm>
-            <a:off x="609600" y="1935480"/>
-            <a:ext cx="10972800" cy="1567574"/>
-          </a:xfrm>
-        </p:spPr>
+        <p:spPr/>
         <p:txBody>
           <a:bodyPr>
             <a:normAutofit/>
@@ -5397,84 +7362,190 @@
           <a:lstStyle/>
           <a:p>
             <a:r>
+              <a:rPr lang="en-US" sz="3600" dirty="0" smtClean="0"/>
+              <a:t>Operations/Queries Supported:</a:t>
+            </a:r>
+            <a:endParaRPr lang="en-US" sz="3600" dirty="0"/>
+          </a:p>
+        </p:txBody>
+      </p:sp>
+      <p:sp>
+        <p:nvSpPr>
+          <p:cNvPr id="2" name="Content Placeholder 1"/>
+          <p:cNvSpPr>
+            <a:spLocks noGrp="1"/>
+          </p:cNvSpPr>
+          <p:nvPr>
+            <p:ph idx="1"/>
+          </p:nvPr>
+        </p:nvSpPr>
+        <p:spPr/>
+        <p:txBody>
+          <a:bodyPr>
+            <a:normAutofit/>
+          </a:bodyPr>
+          <a:lstStyle/>
+          <a:p>
+            <a:pPr algn="just"/>
+            <a:r>
               <a:rPr lang="en-US" sz="2000" dirty="0" smtClean="0"/>
-              <a:t> </a:t>
-            </a:r>
-            <a:r>
-              <a:rPr lang="en-US" sz="2000" dirty="0"/>
-              <a:t>This query help us to list the all movies for the selected year in the tabular format. </a:t>
+              <a:t>All the queries are “select” queries, we fire the queries to the MongoDB Dataset, retrieve the data and we then represent it in the format as needed.</a:t>
+            </a:r>
+          </a:p>
+          <a:p>
+            <a:pPr algn="just"/>
+            <a:r>
+              <a:rPr lang="en-US" sz="2000" dirty="0" smtClean="0"/>
+              <a:t>We simply need to pass the parameter as an input like:</a:t>
+            </a:r>
+          </a:p>
+          <a:p>
+            <a:pPr lvl="1" algn="just"/>
+            <a:r>
+              <a:rPr lang="en-US" sz="2000" dirty="0" smtClean="0"/>
+              <a:t>Year </a:t>
+            </a:r>
+            <a:r>
+              <a:rPr lang="en-US" sz="2000" dirty="0" smtClean="0">
+                <a:sym typeface="Wingdings" panose="05000000000000000000" pitchFamily="2" charset="2"/>
+              </a:rPr>
+              <a:t> year of the movie released</a:t>
+            </a:r>
+          </a:p>
+          <a:p>
+            <a:pPr lvl="1" algn="just"/>
+            <a:r>
+              <a:rPr lang="en-US" sz="2000" dirty="0" smtClean="0">
+                <a:sym typeface="Wingdings" panose="05000000000000000000" pitchFamily="2" charset="2"/>
+              </a:rPr>
+              <a:t>Genre  Movies from the specific year of specific genre.</a:t>
+            </a:r>
+          </a:p>
+          <a:p>
+            <a:pPr lvl="1" algn="just"/>
+            <a:r>
+              <a:rPr lang="en-US" sz="2000" dirty="0" smtClean="0">
+                <a:sym typeface="Wingdings" panose="05000000000000000000" pitchFamily="2" charset="2"/>
+              </a:rPr>
+              <a:t>Range slider  Slider to give the lower and upper bound of the IMDB Score.</a:t>
+            </a:r>
+          </a:p>
+          <a:p>
+            <a:pPr algn="just"/>
+            <a:r>
+              <a:rPr lang="en-US" sz="2000" dirty="0" smtClean="0"/>
+              <a:t>These operations is facilitated by the mongo query ‘</a:t>
+            </a:r>
+            <a:r>
+              <a:rPr lang="en-US" sz="2000" b="1" dirty="0" smtClean="0"/>
+              <a:t>find</a:t>
+            </a:r>
+            <a:r>
+              <a:rPr lang="en-US" sz="2000" dirty="0" smtClean="0"/>
+              <a:t>’.</a:t>
+            </a:r>
+          </a:p>
+          <a:p>
+            <a:pPr algn="just"/>
+            <a:r>
+              <a:rPr lang="en-US" sz="2000" dirty="0" smtClean="0"/>
+              <a:t>Following </a:t>
+            </a:r>
+            <a:r>
+              <a:rPr lang="en-US" sz="2000" dirty="0" smtClean="0"/>
+              <a:t>slides describe the </a:t>
+            </a:r>
+            <a:r>
+              <a:rPr lang="en-US" sz="2000" dirty="0" smtClean="0"/>
+              <a:t>queries supported by this </a:t>
+            </a:r>
+            <a:r>
+              <a:rPr lang="en-US" sz="2000" dirty="0" smtClean="0"/>
+              <a:t>application</a:t>
             </a:r>
             <a:endParaRPr lang="en-US" sz="2000" dirty="0" smtClean="0"/>
           </a:p>
           <a:p>
-            <a:r>
-              <a:rPr lang="en-US" sz="2000" dirty="0" smtClean="0"/>
-              <a:t>We </a:t>
-            </a:r>
-            <a:r>
-              <a:rPr lang="en-US" sz="2000" dirty="0"/>
-              <a:t>take the “</a:t>
-            </a:r>
-            <a:r>
-              <a:rPr lang="en-US" sz="2000" b="1" dirty="0"/>
-              <a:t>year</a:t>
-            </a:r>
-            <a:r>
-              <a:rPr lang="en-US" sz="2000" dirty="0"/>
-              <a:t>” as an input from the user via a drop down menu. After he clicks submit, we fire a select query in the MongoDB Database to fetch all the movies released in that particular year. </a:t>
-            </a:r>
+            <a:pPr marL="0" indent="0" algn="just">
+              <a:buNone/>
+            </a:pPr>
             <a:endParaRPr lang="en-US" sz="2000" dirty="0"/>
           </a:p>
         </p:txBody>
       </p:sp>
-      <p:pic>
-        <p:nvPicPr>
-          <p:cNvPr id="5" name="Picture 4"/>
-          <p:cNvPicPr>
-            <a:picLocks noChangeAspect="1"/>
-          </p:cNvPicPr>
-          <p:nvPr/>
-        </p:nvPicPr>
-        <p:blipFill>
-          <a:blip r:embed="rId2">
-            <a:extLst>
-              <a:ext uri="{28A0092B-C50C-407E-A947-70E740481C1C}">
-                <a14:useLocalDpi xmlns:a14="http://schemas.microsoft.com/office/drawing/2010/main" val="0"/>
-              </a:ext>
-            </a:extLst>
-          </a:blip>
-          <a:stretch>
-            <a:fillRect/>
-          </a:stretch>
-        </p:blipFill>
-        <p:spPr>
-          <a:xfrm>
-            <a:off x="1297546" y="3331874"/>
-            <a:ext cx="9596907" cy="3364344"/>
-          </a:xfrm>
-          <a:prstGeom prst="rect">
-            <a:avLst/>
-          </a:prstGeom>
-          <a:ln w="38100" cap="sq">
-            <a:solidFill>
-              <a:srgbClr val="000000"/>
-            </a:solidFill>
-            <a:prstDash val="solid"/>
-            <a:miter lim="800000"/>
-          </a:ln>
-          <a:effectLst>
-            <a:outerShdw blurRad="50800" dist="38100" dir="2700000" algn="tl" rotWithShape="0">
-              <a:srgbClr val="000000">
-                <a:alpha val="43000"/>
-              </a:srgbClr>
-            </a:outerShdw>
-          </a:effectLst>
-        </p:spPr>
-      </p:pic>
+      <p:sp>
+        <p:nvSpPr>
+          <p:cNvPr id="6" name="Footer Placeholder 5"/>
+          <p:cNvSpPr>
+            <a:spLocks noGrp="1"/>
+          </p:cNvSpPr>
+          <p:nvPr>
+            <p:ph type="ftr" sz="quarter" idx="11"/>
+          </p:nvPr>
+        </p:nvSpPr>
+        <p:spPr/>
+        <p:txBody>
+          <a:bodyPr/>
+          <a:lstStyle/>
+          <a:p>
+            <a:r>
+              <a:rPr lang="en-US" smtClean="0"/>
+              <a:t>CS532 - Database System Project - 3 | IMDB Data Analysis</a:t>
+            </a:r>
+            <a:endParaRPr lang="en-US" dirty="0"/>
+          </a:p>
+        </p:txBody>
+      </p:sp>
+      <p:sp>
+        <p:nvSpPr>
+          <p:cNvPr id="7" name="Slide Number Placeholder 6"/>
+          <p:cNvSpPr>
+            <a:spLocks noGrp="1"/>
+          </p:cNvSpPr>
+          <p:nvPr>
+            <p:ph type="sldNum" sz="quarter" idx="12"/>
+          </p:nvPr>
+        </p:nvSpPr>
+        <p:spPr/>
+        <p:txBody>
+          <a:bodyPr/>
+          <a:lstStyle/>
+          <a:p>
+            <a:fld id="{401CF334-2D5C-4859-84A6-CA7E6E43FAEB}" type="slidenum">
+              <a:rPr lang="en-US" smtClean="0"/>
+              <a:t>5</a:t>
+            </a:fld>
+            <a:endParaRPr lang="en-US"/>
+          </a:p>
+        </p:txBody>
+      </p:sp>
+      <p:sp>
+        <p:nvSpPr>
+          <p:cNvPr id="8" name="Date Placeholder 7"/>
+          <p:cNvSpPr>
+            <a:spLocks noGrp="1"/>
+          </p:cNvSpPr>
+          <p:nvPr>
+            <p:ph type="dt" sz="half" idx="10"/>
+          </p:nvPr>
+        </p:nvSpPr>
+        <p:spPr/>
+        <p:txBody>
+          <a:bodyPr/>
+          <a:lstStyle/>
+          <a:p>
+            <a:fld id="{390AC118-7456-492B-801C-EBDCE8D827CC}" type="datetime1">
+              <a:rPr lang="en-US" smtClean="0"/>
+              <a:t>4/23/2020</a:t>
+            </a:fld>
+            <a:endParaRPr lang="en-US"/>
+          </a:p>
+        </p:txBody>
+      </p:sp>
     </p:spTree>
     <p:extLst>
       <p:ext uri="{BB962C8B-B14F-4D97-AF65-F5344CB8AC3E}">
-        <p14:creationId xmlns:p14="http://schemas.microsoft.com/office/powerpoint/2010/main" val="3252008090"/>
+        <p14:creationId xmlns:p14="http://schemas.microsoft.com/office/powerpoint/2010/main" val="115085417"/>
       </p:ext>
     </p:extLst>
   </p:cSld>
@@ -5530,26 +7601,165 @@
             <p:ph type="title"/>
           </p:nvPr>
         </p:nvSpPr>
+        <p:spPr>
+          <a:xfrm>
+            <a:off x="609600" y="792480"/>
+            <a:ext cx="10972800" cy="1143000"/>
+          </a:xfrm>
+        </p:spPr>
+        <p:txBody>
+          <a:bodyPr>
+            <a:noAutofit/>
+          </a:bodyPr>
+          <a:lstStyle/>
+          <a:p>
+            <a:r>
+              <a:rPr lang="en-US" sz="2800" dirty="0" smtClean="0"/>
+              <a:t>Query 1:</a:t>
+            </a:r>
+            <a:r>
+              <a:rPr lang="en-US" sz="2800" dirty="0"/>
+              <a:t/>
+            </a:r>
+            <a:br>
+              <a:rPr lang="en-US" sz="2800" dirty="0"/>
+            </a:br>
+            <a:r>
+              <a:rPr lang="en-US" sz="2800" dirty="0"/>
+              <a:t>List of movies yearly</a:t>
+            </a:r>
+          </a:p>
+        </p:txBody>
+      </p:sp>
+      <p:sp>
+        <p:nvSpPr>
+          <p:cNvPr id="2" name="Content Placeholder 1"/>
+          <p:cNvSpPr>
+            <a:spLocks noGrp="1"/>
+          </p:cNvSpPr>
+          <p:nvPr>
+            <p:ph idx="1"/>
+          </p:nvPr>
+        </p:nvSpPr>
+        <p:spPr>
+          <a:xfrm>
+            <a:off x="609600" y="1935480"/>
+            <a:ext cx="10972800" cy="1567574"/>
+          </a:xfrm>
+        </p:spPr>
+        <p:txBody>
+          <a:bodyPr>
+            <a:normAutofit/>
+          </a:bodyPr>
+          <a:lstStyle/>
+          <a:p>
+            <a:pPr algn="just"/>
+            <a:r>
+              <a:rPr lang="en-US" sz="2000" dirty="0" smtClean="0"/>
+              <a:t> </a:t>
+            </a:r>
+            <a:r>
+              <a:rPr lang="en-US" sz="2000" dirty="0"/>
+              <a:t>This query help us to list the all movies for the selected year in the tabular format. </a:t>
+            </a:r>
+            <a:endParaRPr lang="en-US" sz="2000" dirty="0" smtClean="0"/>
+          </a:p>
+          <a:p>
+            <a:pPr algn="just"/>
+            <a:r>
+              <a:rPr lang="en-US" sz="2000" dirty="0" smtClean="0"/>
+              <a:t>We </a:t>
+            </a:r>
+            <a:r>
+              <a:rPr lang="en-US" sz="2000" dirty="0"/>
+              <a:t>take the “</a:t>
+            </a:r>
+            <a:r>
+              <a:rPr lang="en-US" sz="2000" b="1" dirty="0"/>
+              <a:t>year</a:t>
+            </a:r>
+            <a:r>
+              <a:rPr lang="en-US" sz="2000" dirty="0"/>
+              <a:t>” as an input from the user via a drop down menu. After he clicks submit, we fire a select query in the MongoDB Database to fetch all the movies released in that particular year. </a:t>
+            </a:r>
+          </a:p>
+        </p:txBody>
+      </p:sp>
+      <p:pic>
+        <p:nvPicPr>
+          <p:cNvPr id="5" name="Picture 4"/>
+          <p:cNvPicPr>
+            <a:picLocks noChangeAspect="1"/>
+          </p:cNvPicPr>
+          <p:nvPr/>
+        </p:nvPicPr>
+        <p:blipFill>
+          <a:blip r:embed="rId2">
+            <a:extLst>
+              <a:ext uri="{28A0092B-C50C-407E-A947-70E740481C1C}">
+                <a14:useLocalDpi xmlns:a14="http://schemas.microsoft.com/office/drawing/2010/main" val="0"/>
+              </a:ext>
+            </a:extLst>
+          </a:blip>
+          <a:stretch>
+            <a:fillRect/>
+          </a:stretch>
+        </p:blipFill>
+        <p:spPr>
+          <a:xfrm>
+            <a:off x="1716647" y="3374143"/>
+            <a:ext cx="8506853" cy="2982208"/>
+          </a:xfrm>
+          <a:prstGeom prst="rect">
+            <a:avLst/>
+          </a:prstGeom>
+          <a:ln w="38100" cap="sq">
+            <a:solidFill>
+              <a:srgbClr val="000000"/>
+            </a:solidFill>
+            <a:prstDash val="solid"/>
+            <a:miter lim="800000"/>
+          </a:ln>
+          <a:effectLst>
+            <a:outerShdw blurRad="50800" dist="38100" dir="2700000" algn="tl" rotWithShape="0">
+              <a:srgbClr val="000000">
+                <a:alpha val="43000"/>
+              </a:srgbClr>
+            </a:outerShdw>
+          </a:effectLst>
+        </p:spPr>
+      </p:pic>
+      <p:sp>
+        <p:nvSpPr>
+          <p:cNvPr id="7" name="Footer Placeholder 6"/>
+          <p:cNvSpPr>
+            <a:spLocks noGrp="1"/>
+          </p:cNvSpPr>
+          <p:nvPr>
+            <p:ph type="ftr" sz="quarter" idx="11"/>
+          </p:nvPr>
+        </p:nvSpPr>
         <p:spPr/>
         <p:txBody>
           <a:bodyPr/>
           <a:lstStyle/>
           <a:p>
             <a:r>
-              <a:rPr lang="en-US" dirty="0"/>
-              <a:t>Brainstorming Activity</a:t>
-            </a:r>
-          </a:p>
-        </p:txBody>
-      </p:sp>
-      <p:sp>
-        <p:nvSpPr>
-          <p:cNvPr id="2" name="Content Placeholder 1"/>
-          <p:cNvSpPr>
-            <a:spLocks noGrp="1"/>
-          </p:cNvSpPr>
-          <p:nvPr>
-            <p:ph idx="1"/>
+              <a:rPr lang="en-US" smtClean="0"/>
+              <a:t>CS532 - Database System Project - 3 | IMDB Data Analysis</a:t>
+            </a:r>
+            <a:endParaRPr lang="en-US" dirty="0"/>
+          </a:p>
+        </p:txBody>
+      </p:sp>
+      <p:sp>
+        <p:nvSpPr>
+          <p:cNvPr id="8" name="Slide Number Placeholder 7"/>
+          <p:cNvSpPr>
+            <a:spLocks noGrp="1"/>
+          </p:cNvSpPr>
+          <p:nvPr>
+            <p:ph type="sldNum" sz="quarter" idx="12"/>
           </p:nvPr>
         </p:nvSpPr>
         <p:spPr/>
@@ -5557,69 +7767,41 @@
           <a:bodyPr/>
           <a:lstStyle/>
           <a:p>
-            <a:r>
-              <a:rPr lang="en-US" dirty="0"/>
-              <a:t>Generate </a:t>
-            </a:r>
-            <a:r>
-              <a:rPr lang="en-US" dirty="0" smtClean="0"/>
-              <a:t>ideas.</a:t>
-            </a:r>
-            <a:endParaRPr lang="en-US" dirty="0"/>
-          </a:p>
-          <a:p>
-            <a:pPr lvl="1"/>
-            <a:r>
-              <a:rPr lang="en-US" dirty="0"/>
-              <a:t>Use games and exercises to “warm up” your creative </a:t>
-            </a:r>
-            <a:r>
-              <a:rPr lang="en-US" dirty="0" smtClean="0"/>
-              <a:t>thinking.</a:t>
-            </a:r>
-            <a:endParaRPr lang="en-US" dirty="0"/>
-          </a:p>
-          <a:p>
-            <a:pPr lvl="1"/>
-            <a:r>
-              <a:rPr lang="en-US" dirty="0"/>
-              <a:t>When ideas slow down, try another exercise to generate fresh </a:t>
-            </a:r>
-            <a:r>
-              <a:rPr lang="en-US" dirty="0" smtClean="0"/>
-              <a:t>ideas.</a:t>
-            </a:r>
-            <a:endParaRPr lang="en-US" dirty="0"/>
-          </a:p>
-          <a:p>
-            <a:pPr lvl="1"/>
-            <a:r>
-              <a:rPr lang="en-US" dirty="0"/>
-              <a:t>Breaking into smaller groups may be </a:t>
-            </a:r>
-            <a:r>
-              <a:rPr lang="en-US" dirty="0" smtClean="0"/>
-              <a:t>helpful.</a:t>
-            </a:r>
-            <a:endParaRPr lang="en-US" dirty="0"/>
-          </a:p>
-          <a:p>
-            <a:r>
-              <a:rPr lang="en-US" dirty="0"/>
-              <a:t>Use a computer to capture every </a:t>
-            </a:r>
-            <a:r>
-              <a:rPr lang="en-US" dirty="0" smtClean="0"/>
-              <a:t>comment/idea.</a:t>
-            </a:r>
-            <a:endParaRPr lang="en-US" dirty="0"/>
+            <a:fld id="{401CF334-2D5C-4859-84A6-CA7E6E43FAEB}" type="slidenum">
+              <a:rPr lang="en-US" smtClean="0"/>
+              <a:t>6</a:t>
+            </a:fld>
+            <a:endParaRPr lang="en-US"/>
+          </a:p>
+        </p:txBody>
+      </p:sp>
+      <p:sp>
+        <p:nvSpPr>
+          <p:cNvPr id="9" name="Date Placeholder 8"/>
+          <p:cNvSpPr>
+            <a:spLocks noGrp="1"/>
+          </p:cNvSpPr>
+          <p:nvPr>
+            <p:ph type="dt" sz="half" idx="10"/>
+          </p:nvPr>
+        </p:nvSpPr>
+        <p:spPr/>
+        <p:txBody>
+          <a:bodyPr/>
+          <a:lstStyle/>
+          <a:p>
+            <a:fld id="{31982ADD-F0FA-4DBB-817F-97207B31F2BA}" type="datetime1">
+              <a:rPr lang="en-US" smtClean="0"/>
+              <a:t>4/23/2020</a:t>
+            </a:fld>
+            <a:endParaRPr lang="en-US"/>
           </a:p>
         </p:txBody>
       </p:sp>
     </p:spTree>
     <p:extLst>
       <p:ext uri="{BB962C8B-B14F-4D97-AF65-F5344CB8AC3E}">
-        <p14:creationId xmlns:p14="http://schemas.microsoft.com/office/powerpoint/2010/main" val="1419453836"/>
+        <p14:creationId xmlns:p14="http://schemas.microsoft.com/office/powerpoint/2010/main" val="3252008090"/>
       </p:ext>
     </p:extLst>
   </p:cSld>
@@ -5675,26 +7857,175 @@
             <p:ph type="title"/>
           </p:nvPr>
         </p:nvSpPr>
+        <p:spPr>
+          <a:xfrm>
+            <a:off x="609600" y="665783"/>
+            <a:ext cx="10972800" cy="1143000"/>
+          </a:xfrm>
+        </p:spPr>
+        <p:txBody>
+          <a:bodyPr>
+            <a:noAutofit/>
+          </a:bodyPr>
+          <a:lstStyle/>
+          <a:p>
+            <a:r>
+              <a:rPr lang="en-US" sz="2800" dirty="0" smtClean="0"/>
+              <a:t>Query </a:t>
+            </a:r>
+            <a:r>
+              <a:rPr lang="en-US" sz="2800" dirty="0" smtClean="0"/>
+              <a:t>2:</a:t>
+            </a:r>
+            <a:r>
+              <a:rPr lang="en-US" sz="2800" dirty="0"/>
+              <a:t/>
+            </a:r>
+            <a:br>
+              <a:rPr lang="en-US" sz="2800" dirty="0"/>
+            </a:br>
+            <a:r>
+              <a:rPr lang="en-US" sz="2800" dirty="0"/>
+              <a:t>List of movies based on genre</a:t>
+            </a:r>
+            <a:endParaRPr lang="en-US" sz="2800" dirty="0"/>
+          </a:p>
+        </p:txBody>
+      </p:sp>
+      <p:sp>
+        <p:nvSpPr>
+          <p:cNvPr id="2" name="Content Placeholder 1"/>
+          <p:cNvSpPr>
+            <a:spLocks noGrp="1"/>
+          </p:cNvSpPr>
+          <p:nvPr>
+            <p:ph idx="1"/>
+          </p:nvPr>
+        </p:nvSpPr>
+        <p:spPr>
+          <a:xfrm>
+            <a:off x="609600" y="1808783"/>
+            <a:ext cx="10972800" cy="1567574"/>
+          </a:xfrm>
+        </p:spPr>
+        <p:txBody>
+          <a:bodyPr>
+            <a:normAutofit lnSpcReduction="10000"/>
+          </a:bodyPr>
+          <a:lstStyle/>
+          <a:p>
+            <a:pPr algn="just"/>
+            <a:r>
+              <a:rPr lang="en-US" sz="2000" dirty="0"/>
+              <a:t>This query help us to list the all movies for the selected year and selected genre in the tabular format. </a:t>
+            </a:r>
+            <a:endParaRPr lang="en-US" sz="2000" dirty="0" smtClean="0"/>
+          </a:p>
+          <a:p>
+            <a:pPr algn="just"/>
+            <a:r>
+              <a:rPr lang="en-US" sz="2000" dirty="0" smtClean="0"/>
+              <a:t>We </a:t>
+            </a:r>
+            <a:r>
+              <a:rPr lang="en-US" sz="2000" dirty="0"/>
+              <a:t>take the “</a:t>
+            </a:r>
+            <a:r>
+              <a:rPr lang="en-US" sz="2000" b="1" dirty="0"/>
+              <a:t>year</a:t>
+            </a:r>
+            <a:r>
+              <a:rPr lang="en-US" sz="2000" dirty="0"/>
+              <a:t>” and “</a:t>
+            </a:r>
+            <a:r>
+              <a:rPr lang="en-US" sz="2000" b="1" dirty="0"/>
+              <a:t>genre</a:t>
+            </a:r>
+            <a:r>
+              <a:rPr lang="en-US" sz="2000" dirty="0"/>
+              <a:t>” as an input from the user via a drop down menu. After he clicks submit, we fire a select query in the MongoDB database to fetch all the movies released in that particular year and search movies in that year based on genre. </a:t>
+            </a:r>
+            <a:endParaRPr lang="en-US" sz="2000" dirty="0"/>
+          </a:p>
+        </p:txBody>
+      </p:sp>
+      <p:pic>
+        <p:nvPicPr>
+          <p:cNvPr id="4" name="Picture 3"/>
+          <p:cNvPicPr>
+            <a:picLocks noChangeAspect="1"/>
+          </p:cNvPicPr>
+          <p:nvPr/>
+        </p:nvPicPr>
+        <p:blipFill>
+          <a:blip r:embed="rId2">
+            <a:extLst>
+              <a:ext uri="{28A0092B-C50C-407E-A947-70E740481C1C}">
+                <a14:useLocalDpi xmlns:a14="http://schemas.microsoft.com/office/drawing/2010/main" val="0"/>
+              </a:ext>
+            </a:extLst>
+          </a:blip>
+          <a:stretch>
+            <a:fillRect/>
+          </a:stretch>
+        </p:blipFill>
+        <p:spPr>
+          <a:xfrm>
+            <a:off x="1619250" y="3376357"/>
+            <a:ext cx="8953500" cy="2957788"/>
+          </a:xfrm>
+          <a:prstGeom prst="rect">
+            <a:avLst/>
+          </a:prstGeom>
+          <a:ln w="38100" cap="sq">
+            <a:solidFill>
+              <a:srgbClr val="000000"/>
+            </a:solidFill>
+            <a:prstDash val="solid"/>
+            <a:miter lim="800000"/>
+          </a:ln>
+          <a:effectLst>
+            <a:outerShdw blurRad="50800" dist="38100" dir="2700000" algn="tl" rotWithShape="0">
+              <a:srgbClr val="000000">
+                <a:alpha val="43000"/>
+              </a:srgbClr>
+            </a:outerShdw>
+          </a:effectLst>
+        </p:spPr>
+      </p:pic>
+      <p:sp>
+        <p:nvSpPr>
+          <p:cNvPr id="8" name="Footer Placeholder 7"/>
+          <p:cNvSpPr>
+            <a:spLocks noGrp="1"/>
+          </p:cNvSpPr>
+          <p:nvPr>
+            <p:ph type="ftr" sz="quarter" idx="11"/>
+          </p:nvPr>
+        </p:nvSpPr>
         <p:spPr/>
         <p:txBody>
           <a:bodyPr/>
           <a:lstStyle/>
           <a:p>
             <a:r>
-              <a:rPr lang="en-US" dirty="0"/>
-              <a:t>Summarize</a:t>
-            </a:r>
-          </a:p>
-        </p:txBody>
-      </p:sp>
-      <p:sp>
-        <p:nvSpPr>
-          <p:cNvPr id="2" name="Content Placeholder 1"/>
-          <p:cNvSpPr>
-            <a:spLocks noGrp="1"/>
-          </p:cNvSpPr>
-          <p:nvPr>
-            <p:ph idx="1"/>
+              <a:rPr lang="en-US" smtClean="0"/>
+              <a:t>CS532 - Database System Project - 3 | IMDB Data Analysis</a:t>
+            </a:r>
+            <a:endParaRPr lang="en-US" dirty="0"/>
+          </a:p>
+        </p:txBody>
+      </p:sp>
+      <p:sp>
+        <p:nvSpPr>
+          <p:cNvPr id="9" name="Slide Number Placeholder 8"/>
+          <p:cNvSpPr>
+            <a:spLocks noGrp="1"/>
+          </p:cNvSpPr>
+          <p:nvPr>
+            <p:ph type="sldNum" sz="quarter" idx="12"/>
           </p:nvPr>
         </p:nvSpPr>
         <p:spPr/>
@@ -5702,40 +8033,41 @@
           <a:bodyPr/>
           <a:lstStyle/>
           <a:p>
-            <a:r>
-              <a:rPr lang="en-US" dirty="0"/>
-              <a:t>Review ideas.</a:t>
-            </a:r>
-          </a:p>
-          <a:p>
-            <a:r>
-              <a:rPr lang="en-US" dirty="0"/>
-              <a:t>Vote on top candidates and consolidate.</a:t>
-            </a:r>
-          </a:p>
-          <a:p>
-            <a:r>
-              <a:rPr lang="en-US" dirty="0"/>
-              <a:t>Check requirements and restrictions.</a:t>
-            </a:r>
-          </a:p>
-          <a:p>
-            <a:r>
-              <a:rPr lang="en-US" dirty="0"/>
-              <a:t>Trim list to top 5-10 ideas</a:t>
-            </a:r>
-            <a:r>
-              <a:rPr lang="en-US" dirty="0" smtClean="0"/>
-              <a:t>.</a:t>
-            </a:r>
-            <a:endParaRPr lang="en-US" dirty="0"/>
+            <a:fld id="{401CF334-2D5C-4859-84A6-CA7E6E43FAEB}" type="slidenum">
+              <a:rPr lang="en-US" smtClean="0"/>
+              <a:t>7</a:t>
+            </a:fld>
+            <a:endParaRPr lang="en-US"/>
+          </a:p>
+        </p:txBody>
+      </p:sp>
+      <p:sp>
+        <p:nvSpPr>
+          <p:cNvPr id="10" name="Date Placeholder 9"/>
+          <p:cNvSpPr>
+            <a:spLocks noGrp="1"/>
+          </p:cNvSpPr>
+          <p:nvPr>
+            <p:ph type="dt" sz="half" idx="10"/>
+          </p:nvPr>
+        </p:nvSpPr>
+        <p:spPr/>
+        <p:txBody>
+          <a:bodyPr/>
+          <a:lstStyle/>
+          <a:p>
+            <a:fld id="{3B319C02-F2E5-45B7-89A7-029BAB0ED498}" type="datetime1">
+              <a:rPr lang="en-US" smtClean="0"/>
+              <a:t>4/23/2020</a:t>
+            </a:fld>
+            <a:endParaRPr lang="en-US"/>
           </a:p>
         </p:txBody>
       </p:sp>
     </p:spTree>
     <p:extLst>
       <p:ext uri="{BB962C8B-B14F-4D97-AF65-F5344CB8AC3E}">
-        <p14:creationId xmlns:p14="http://schemas.microsoft.com/office/powerpoint/2010/main" val="2054880847"/>
+        <p14:creationId xmlns:p14="http://schemas.microsoft.com/office/powerpoint/2010/main" val="2040169465"/>
       </p:ext>
     </p:extLst>
   </p:cSld>
@@ -5791,26 +8123,178 @@
             <p:ph type="title"/>
           </p:nvPr>
         </p:nvSpPr>
+        <p:spPr>
+          <a:xfrm>
+            <a:off x="609600" y="665783"/>
+            <a:ext cx="10972800" cy="1143000"/>
+          </a:xfrm>
+        </p:spPr>
+        <p:txBody>
+          <a:bodyPr>
+            <a:noAutofit/>
+          </a:bodyPr>
+          <a:lstStyle/>
+          <a:p>
+            <a:r>
+              <a:rPr lang="en-US" sz="2800" dirty="0" smtClean="0"/>
+              <a:t>Query </a:t>
+            </a:r>
+            <a:r>
+              <a:rPr lang="en-US" sz="2800" dirty="0"/>
+              <a:t>3</a:t>
+            </a:r>
+            <a:r>
+              <a:rPr lang="en-US" sz="2800" dirty="0" smtClean="0"/>
+              <a:t>:</a:t>
+            </a:r>
+            <a:r>
+              <a:rPr lang="en-US" sz="2800" dirty="0"/>
+              <a:t/>
+            </a:r>
+            <a:br>
+              <a:rPr lang="en-US" sz="2800" dirty="0"/>
+            </a:br>
+            <a:r>
+              <a:rPr lang="en-US" sz="2800" dirty="0"/>
+              <a:t>List of actors and number of movies starred by the actor</a:t>
+            </a:r>
+            <a:endParaRPr lang="en-US" sz="2800" dirty="0"/>
+          </a:p>
+        </p:txBody>
+      </p:sp>
+      <p:sp>
+        <p:nvSpPr>
+          <p:cNvPr id="2" name="Content Placeholder 1"/>
+          <p:cNvSpPr>
+            <a:spLocks noGrp="1"/>
+          </p:cNvSpPr>
+          <p:nvPr>
+            <p:ph idx="1"/>
+          </p:nvPr>
+        </p:nvSpPr>
+        <p:spPr>
+          <a:xfrm>
+            <a:off x="609600" y="1808783"/>
+            <a:ext cx="10972800" cy="1567574"/>
+          </a:xfrm>
+        </p:spPr>
+        <p:txBody>
+          <a:bodyPr>
+            <a:normAutofit fontScale="92500" lnSpcReduction="10000"/>
+          </a:bodyPr>
+          <a:lstStyle/>
+          <a:p>
+            <a:pPr algn="just"/>
+            <a:r>
+              <a:rPr lang="en-US" sz="2000" dirty="0"/>
+              <a:t>This query help us to list the all actors and number of movies they starred in the tabular format. </a:t>
+            </a:r>
+            <a:endParaRPr lang="en-US" sz="2000" dirty="0" smtClean="0"/>
+          </a:p>
+          <a:p>
+            <a:pPr algn="just"/>
+            <a:r>
+              <a:rPr lang="en-US" sz="2000" dirty="0" smtClean="0"/>
+              <a:t>We </a:t>
+            </a:r>
+            <a:r>
+              <a:rPr lang="en-US" sz="2000" dirty="0"/>
+              <a:t>fire a select query in the MongoDB database to fetch all the actors from the dataset, we have 3 columns for the name of </a:t>
+            </a:r>
+            <a:r>
+              <a:rPr lang="en-US" sz="2000" dirty="0" smtClean="0"/>
+              <a:t>actors. </a:t>
+            </a:r>
+          </a:p>
+          <a:p>
+            <a:pPr algn="just"/>
+            <a:r>
+              <a:rPr lang="en-US" sz="2000" dirty="0" smtClean="0"/>
+              <a:t>Firstly, </a:t>
+            </a:r>
+            <a:r>
+              <a:rPr lang="en-US" sz="2000" dirty="0"/>
+              <a:t>we get all the actors and then we count the number of movies they starred in to get the actual count. </a:t>
+            </a:r>
+            <a:endParaRPr lang="en-US" sz="2000" dirty="0"/>
+          </a:p>
+        </p:txBody>
+      </p:sp>
+      <p:pic>
+        <p:nvPicPr>
+          <p:cNvPr id="5" name="Picture 4"/>
+          <p:cNvPicPr>
+            <a:picLocks noChangeAspect="1"/>
+          </p:cNvPicPr>
+          <p:nvPr/>
+        </p:nvPicPr>
+        <p:blipFill>
+          <a:blip r:embed="rId2">
+            <a:extLst>
+              <a:ext uri="{28A0092B-C50C-407E-A947-70E740481C1C}">
+                <a14:useLocalDpi xmlns:a14="http://schemas.microsoft.com/office/drawing/2010/main" val="0"/>
+              </a:ext>
+            </a:extLst>
+          </a:blip>
+          <a:stretch>
+            <a:fillRect/>
+          </a:stretch>
+        </p:blipFill>
+        <p:spPr>
+          <a:xfrm>
+            <a:off x="2308359" y="3376357"/>
+            <a:ext cx="7686541" cy="2967068"/>
+          </a:xfrm>
+          <a:prstGeom prst="rect">
+            <a:avLst/>
+          </a:prstGeom>
+          <a:ln w="38100" cap="sq">
+            <a:solidFill>
+              <a:srgbClr val="000000"/>
+            </a:solidFill>
+            <a:prstDash val="solid"/>
+            <a:miter lim="800000"/>
+          </a:ln>
+          <a:effectLst>
+            <a:outerShdw blurRad="50800" dist="38100" dir="2700000" algn="tl" rotWithShape="0">
+              <a:srgbClr val="000000">
+                <a:alpha val="43000"/>
+              </a:srgbClr>
+            </a:outerShdw>
+          </a:effectLst>
+        </p:spPr>
+      </p:pic>
+      <p:sp>
+        <p:nvSpPr>
+          <p:cNvPr id="8" name="Footer Placeholder 7"/>
+          <p:cNvSpPr>
+            <a:spLocks noGrp="1"/>
+          </p:cNvSpPr>
+          <p:nvPr>
+            <p:ph type="ftr" sz="quarter" idx="11"/>
+          </p:nvPr>
+        </p:nvSpPr>
         <p:spPr/>
         <p:txBody>
           <a:bodyPr/>
           <a:lstStyle/>
           <a:p>
             <a:r>
-              <a:rPr lang="en-US" dirty="0"/>
-              <a:t>Next Steps</a:t>
-            </a:r>
-          </a:p>
-        </p:txBody>
-      </p:sp>
-      <p:sp>
-        <p:nvSpPr>
-          <p:cNvPr id="2" name="Content Placeholder 1"/>
-          <p:cNvSpPr>
-            <a:spLocks noGrp="1"/>
-          </p:cNvSpPr>
-          <p:nvPr>
-            <p:ph idx="1"/>
+              <a:rPr lang="en-US" smtClean="0"/>
+              <a:t>CS532 - Database System Project - 3 | IMDB Data Analysis</a:t>
+            </a:r>
+            <a:endParaRPr lang="en-US" dirty="0"/>
+          </a:p>
+        </p:txBody>
+      </p:sp>
+      <p:sp>
+        <p:nvSpPr>
+          <p:cNvPr id="9" name="Slide Number Placeholder 8"/>
+          <p:cNvSpPr>
+            <a:spLocks noGrp="1"/>
+          </p:cNvSpPr>
+          <p:nvPr>
+            <p:ph type="sldNum" sz="quarter" idx="12"/>
           </p:nvPr>
         </p:nvSpPr>
         <p:spPr/>
@@ -5818,49 +8302,41 @@
           <a:bodyPr/>
           <a:lstStyle/>
           <a:p>
-            <a:r>
-              <a:rPr lang="en-US" dirty="0"/>
-              <a:t>Describe what happens next:</a:t>
-            </a:r>
-          </a:p>
-          <a:p>
-            <a:pPr lvl="1"/>
-            <a:r>
-              <a:rPr lang="en-US" dirty="0"/>
-              <a:t>Research the ideas generated?</a:t>
-            </a:r>
-          </a:p>
-          <a:p>
-            <a:pPr lvl="1"/>
-            <a:r>
-              <a:rPr lang="en-US" dirty="0"/>
-              <a:t>Follow up with larger group?</a:t>
-            </a:r>
-          </a:p>
-          <a:p>
-            <a:r>
-              <a:rPr lang="en-US" dirty="0"/>
-              <a:t>Generate action items for follow-up:</a:t>
-            </a:r>
-          </a:p>
-          <a:p>
-            <a:pPr lvl="1"/>
-            <a:r>
-              <a:rPr lang="en-US" dirty="0"/>
-              <a:t>Start turning ideas into reality</a:t>
-            </a:r>
-            <a:r>
-              <a:rPr lang="en-US" dirty="0" smtClean="0"/>
-              <a:t>.</a:t>
-            </a:r>
-            <a:endParaRPr lang="en-US" dirty="0"/>
+            <a:fld id="{401CF334-2D5C-4859-84A6-CA7E6E43FAEB}" type="slidenum">
+              <a:rPr lang="en-US" smtClean="0"/>
+              <a:t>8</a:t>
+            </a:fld>
+            <a:endParaRPr lang="en-US"/>
+          </a:p>
+        </p:txBody>
+      </p:sp>
+      <p:sp>
+        <p:nvSpPr>
+          <p:cNvPr id="10" name="Date Placeholder 9"/>
+          <p:cNvSpPr>
+            <a:spLocks noGrp="1"/>
+          </p:cNvSpPr>
+          <p:nvPr>
+            <p:ph type="dt" sz="half" idx="10"/>
+          </p:nvPr>
+        </p:nvSpPr>
+        <p:spPr/>
+        <p:txBody>
+          <a:bodyPr/>
+          <a:lstStyle/>
+          <a:p>
+            <a:fld id="{A434FC06-D5C2-41A0-B390-14CDDE16EBA5}" type="datetime1">
+              <a:rPr lang="en-US" smtClean="0"/>
+              <a:t>4/23/2020</a:t>
+            </a:fld>
+            <a:endParaRPr lang="en-US"/>
           </a:p>
         </p:txBody>
       </p:sp>
     </p:spTree>
     <p:extLst>
       <p:ext uri="{BB962C8B-B14F-4D97-AF65-F5344CB8AC3E}">
-        <p14:creationId xmlns:p14="http://schemas.microsoft.com/office/powerpoint/2010/main" val="112606551"/>
+        <p14:creationId xmlns:p14="http://schemas.microsoft.com/office/powerpoint/2010/main" val="1629039456"/>
       </p:ext>
     </p:extLst>
   </p:cSld>
@@ -5886,6 +8362,246 @@
       </p:par>
     </p:tnLst>
   </p:timing>
+</p:sld>
+</file>
+
+<file path=ppt/slides/slide9.xml><?xml version="1.0" encoding="utf-8"?>
+<p:sld xmlns:a="http://schemas.openxmlformats.org/drawingml/2006/main" xmlns:r="http://schemas.openxmlformats.org/officeDocument/2006/relationships" xmlns:p="http://schemas.openxmlformats.org/presentationml/2006/main">
+  <p:cSld>
+    <p:spTree>
+      <p:nvGrpSpPr>
+        <p:cNvPr id="1" name=""/>
+        <p:cNvGrpSpPr/>
+        <p:nvPr/>
+      </p:nvGrpSpPr>
+      <p:grpSpPr>
+        <a:xfrm>
+          <a:off x="0" y="0"/>
+          <a:ext cx="0" cy="0"/>
+          <a:chOff x="0" y="0"/>
+          <a:chExt cx="0" cy="0"/>
+        </a:xfrm>
+      </p:grpSpPr>
+      <p:sp>
+        <p:nvSpPr>
+          <p:cNvPr id="2" name="Title 1"/>
+          <p:cNvSpPr>
+            <a:spLocks noGrp="1"/>
+          </p:cNvSpPr>
+          <p:nvPr>
+            <p:ph type="title"/>
+          </p:nvPr>
+        </p:nvSpPr>
+        <p:spPr/>
+        <p:txBody>
+          <a:bodyPr>
+            <a:noAutofit/>
+          </a:bodyPr>
+          <a:lstStyle/>
+          <a:p>
+            <a:r>
+              <a:rPr lang="en-US" sz="2800" dirty="0"/>
+              <a:t>Query 4:</a:t>
+            </a:r>
+            <a:br>
+              <a:rPr lang="en-US" sz="2800" dirty="0"/>
+            </a:br>
+            <a:r>
+              <a:rPr lang="en-US" sz="2800" dirty="0"/>
+              <a:t>Visualizing the top 10 movie genre on each year</a:t>
+            </a:r>
+            <a:endParaRPr lang="en-IN" sz="2400" dirty="0"/>
+          </a:p>
+        </p:txBody>
+      </p:sp>
+      <p:sp>
+        <p:nvSpPr>
+          <p:cNvPr id="3" name="Content Placeholder 2"/>
+          <p:cNvSpPr>
+            <a:spLocks noGrp="1"/>
+          </p:cNvSpPr>
+          <p:nvPr>
+            <p:ph sz="half" idx="1"/>
+          </p:nvPr>
+        </p:nvSpPr>
+        <p:spPr/>
+        <p:txBody>
+          <a:bodyPr>
+            <a:normAutofit/>
+          </a:bodyPr>
+          <a:lstStyle/>
+          <a:p>
+            <a:pPr algn="just"/>
+            <a:endParaRPr lang="en-US" sz="2000" dirty="0" smtClean="0"/>
+          </a:p>
+          <a:p>
+            <a:pPr algn="just"/>
+            <a:r>
+              <a:rPr lang="en-US" sz="2000" dirty="0" smtClean="0"/>
+              <a:t>With </a:t>
+            </a:r>
+            <a:r>
+              <a:rPr lang="en-US" sz="2000" dirty="0"/>
+              <a:t>the help of this query we visualize the top 10 movies for the selected year in the graphical format. </a:t>
+            </a:r>
+          </a:p>
+          <a:p>
+            <a:pPr algn="just"/>
+            <a:r>
+              <a:rPr lang="en-US" sz="2000" dirty="0"/>
+              <a:t>We take the “year” as an input from the user via a drop down menu. </a:t>
+            </a:r>
+          </a:p>
+          <a:p>
+            <a:pPr algn="just"/>
+            <a:r>
+              <a:rPr lang="en-US" sz="2000" dirty="0"/>
+              <a:t>We fire a select query in the MongoDB database to fetch all the movies released in that particular year and select the only top 10 of them and give a graph in a user friendly format. We select the top 10 movies based on the IMDB score that we have for the movie in the dataset. </a:t>
+            </a:r>
+          </a:p>
+          <a:p>
+            <a:pPr algn="just"/>
+            <a:endParaRPr lang="en-IN" sz="2000" dirty="0"/>
+          </a:p>
+        </p:txBody>
+      </p:sp>
+      <p:pic>
+        <p:nvPicPr>
+          <p:cNvPr id="5" name="Content Placeholder 4"/>
+          <p:cNvPicPr>
+            <a:picLocks noGrp="1" noChangeAspect="1"/>
+          </p:cNvPicPr>
+          <p:nvPr>
+            <p:ph sz="half" idx="2"/>
+          </p:nvPr>
+        </p:nvPicPr>
+        <p:blipFill>
+          <a:blip r:embed="rId2">
+            <a:extLst>
+              <a:ext uri="{28A0092B-C50C-407E-A947-70E740481C1C}">
+                <a14:useLocalDpi xmlns:a14="http://schemas.microsoft.com/office/drawing/2010/main" val="0"/>
+              </a:ext>
+            </a:extLst>
+          </a:blip>
+          <a:stretch>
+            <a:fillRect/>
+          </a:stretch>
+        </p:blipFill>
+        <p:spPr>
+          <a:xfrm>
+            <a:off x="6348399" y="1920875"/>
+            <a:ext cx="5083202" cy="4433888"/>
+          </a:xfrm>
+          <a:prstGeom prst="rect">
+            <a:avLst/>
+          </a:prstGeom>
+          <a:ln w="38100" cap="sq">
+            <a:solidFill>
+              <a:srgbClr val="000000"/>
+            </a:solidFill>
+            <a:prstDash val="solid"/>
+            <a:miter lim="800000"/>
+          </a:ln>
+          <a:effectLst>
+            <a:outerShdw blurRad="50800" dist="38100" dir="2700000" algn="tl" rotWithShape="0">
+              <a:srgbClr val="000000">
+                <a:alpha val="43000"/>
+              </a:srgbClr>
+            </a:outerShdw>
+          </a:effectLst>
+        </p:spPr>
+      </p:pic>
+      <p:sp>
+        <p:nvSpPr>
+          <p:cNvPr id="8" name="Footer Placeholder 7"/>
+          <p:cNvSpPr>
+            <a:spLocks noGrp="1"/>
+          </p:cNvSpPr>
+          <p:nvPr>
+            <p:ph type="ftr" sz="quarter" idx="11"/>
+          </p:nvPr>
+        </p:nvSpPr>
+        <p:spPr/>
+        <p:txBody>
+          <a:bodyPr/>
+          <a:lstStyle/>
+          <a:p>
+            <a:r>
+              <a:rPr lang="en-US" smtClean="0"/>
+              <a:t>CS532 - Database System Project - 3 | IMDB Data Analysis</a:t>
+            </a:r>
+            <a:endParaRPr lang="en-US" dirty="0"/>
+          </a:p>
+        </p:txBody>
+      </p:sp>
+      <p:sp>
+        <p:nvSpPr>
+          <p:cNvPr id="9" name="Slide Number Placeholder 8"/>
+          <p:cNvSpPr>
+            <a:spLocks noGrp="1"/>
+          </p:cNvSpPr>
+          <p:nvPr>
+            <p:ph type="sldNum" sz="quarter" idx="12"/>
+          </p:nvPr>
+        </p:nvSpPr>
+        <p:spPr/>
+        <p:txBody>
+          <a:bodyPr/>
+          <a:lstStyle/>
+          <a:p>
+            <a:fld id="{401CF334-2D5C-4859-84A6-CA7E6E43FAEB}" type="slidenum">
+              <a:rPr lang="en-US" smtClean="0"/>
+              <a:t>9</a:t>
+            </a:fld>
+            <a:endParaRPr lang="en-US"/>
+          </a:p>
+        </p:txBody>
+      </p:sp>
+      <p:sp>
+        <p:nvSpPr>
+          <p:cNvPr id="10" name="Date Placeholder 9"/>
+          <p:cNvSpPr>
+            <a:spLocks noGrp="1"/>
+          </p:cNvSpPr>
+          <p:nvPr>
+            <p:ph type="dt" sz="half" idx="10"/>
+          </p:nvPr>
+        </p:nvSpPr>
+        <p:spPr/>
+        <p:txBody>
+          <a:bodyPr/>
+          <a:lstStyle/>
+          <a:p>
+            <a:fld id="{D2D2B03B-3ED3-4FD4-B020-613C4959E7E1}" type="datetime1">
+              <a:rPr lang="en-US" smtClean="0"/>
+              <a:t>4/23/2020</a:t>
+            </a:fld>
+            <a:endParaRPr lang="en-US"/>
+          </a:p>
+        </p:txBody>
+      </p:sp>
+    </p:spTree>
+    <p:extLst>
+      <p:ext uri="{BB962C8B-B14F-4D97-AF65-F5344CB8AC3E}">
+        <p14:creationId xmlns:p14="http://schemas.microsoft.com/office/powerpoint/2010/main" val="3131279299"/>
+      </p:ext>
+    </p:extLst>
+  </p:cSld>
+  <p:clrMapOvr>
+    <a:masterClrMapping/>
+  </p:clrMapOvr>
+  <mc:AlternateContent xmlns:mc="http://schemas.openxmlformats.org/markup-compatibility/2006" xmlns:p14="http://schemas.microsoft.com/office/powerpoint/2010/main">
+    <mc:Choice Requires="p14">
+      <p:transition spd="med" p14:dur="700">
+        <p:fade/>
+      </p:transition>
+    </mc:Choice>
+    <mc:Fallback xmlns="">
+      <p:transition spd="med">
+        <p:fade/>
+      </p:transition>
+    </mc:Fallback>
+  </mc:AlternateContent>
 </p:sld>
 </file>
 
@@ -6477,4 +9193,265 @@
     </a:ext>
   </a:extLst>
 </a:theme>
+</file>
+
+<file path=ppt/theme/theme3.xml><?xml version="1.0" encoding="utf-8"?>
+<a:theme xmlns:a="http://schemas.openxmlformats.org/drawingml/2006/main" name="Office Theme">
+  <a:themeElements>
+    <a:clrScheme name="Office">
+      <a:dk1>
+        <a:sysClr val="windowText" lastClr="000000"/>
+      </a:dk1>
+      <a:lt1>
+        <a:sysClr val="window" lastClr="FFFFFF"/>
+      </a:lt1>
+      <a:dk2>
+        <a:srgbClr val="44546A"/>
+      </a:dk2>
+      <a:lt2>
+        <a:srgbClr val="E7E6E6"/>
+      </a:lt2>
+      <a:accent1>
+        <a:srgbClr val="5B9BD5"/>
+      </a:accent1>
+      <a:accent2>
+        <a:srgbClr val="ED7D31"/>
+      </a:accent2>
+      <a:accent3>
+        <a:srgbClr val="A5A5A5"/>
+      </a:accent3>
+      <a:accent4>
+        <a:srgbClr val="FFC000"/>
+      </a:accent4>
+      <a:accent5>
+        <a:srgbClr val="4472C4"/>
+      </a:accent5>
+      <a:accent6>
+        <a:srgbClr val="70AD47"/>
+      </a:accent6>
+      <a:hlink>
+        <a:srgbClr val="0563C1"/>
+      </a:hlink>
+      <a:folHlink>
+        <a:srgbClr val="954F72"/>
+      </a:folHlink>
+    </a:clrScheme>
+    <a:fontScheme name="Office">
+      <a:majorFont>
+        <a:latin typeface="Calibri Light" panose="020F0302020204030204"/>
+        <a:ea typeface=""/>
+        <a:cs typeface=""/>
+        <a:font script="Jpan" typeface="ＭＳ Ｐゴシック"/>
+        <a:font script="Hang" typeface="맑은 고딕"/>
+        <a:font script="Hans" typeface="宋体"/>
+        <a:font script="Hant" typeface="新細明體"/>
+        <a:font script="Arab" typeface="Times New Roman"/>
+        <a:font script="Hebr" typeface="Times New Roman"/>
+        <a:font script="Thai" typeface="Angsana New"/>
+        <a:font script="Ethi" typeface="Nyala"/>
+        <a:font script="Beng" typeface="Vrinda"/>
+        <a:font script="Gujr" typeface="Shruti"/>
+        <a:font script="Khmr" typeface="MoolBoran"/>
+        <a:font script="Knda" typeface="Tunga"/>
+        <a:font script="Guru" typeface="Raavi"/>
+        <a:font script="Cans" typeface="Euphemia"/>
+        <a:font script="Cher" typeface="Plantagenet Cherokee"/>
+        <a:font script="Yiii" typeface="Microsoft Yi Baiti"/>
+        <a:font script="Tibt" typeface="Microsoft Himalaya"/>
+        <a:font script="Thaa" typeface="MV Boli"/>
+        <a:font script="Deva" typeface="Mangal"/>
+        <a:font script="Telu" typeface="Gautami"/>
+        <a:font script="Taml" typeface="Latha"/>
+        <a:font script="Syrc" typeface="Estrangelo Edessa"/>
+        <a:font script="Orya" typeface="Kalinga"/>
+        <a:font script="Mlym" typeface="Kartika"/>
+        <a:font script="Laoo" typeface="DokChampa"/>
+        <a:font script="Sinh" typeface="Iskoola Pota"/>
+        <a:font script="Mong" typeface="Mongolian Baiti"/>
+        <a:font script="Viet" typeface="Times New Roman"/>
+        <a:font script="Uigh" typeface="Microsoft Uighur"/>
+        <a:font script="Geor" typeface="Sylfaen"/>
+      </a:majorFont>
+      <a:minorFont>
+        <a:latin typeface="Calibri" panose="020F0502020204030204"/>
+        <a:ea typeface=""/>
+        <a:cs typeface=""/>
+        <a:font script="Jpan" typeface="ＭＳ Ｐゴシック"/>
+        <a:font script="Hang" typeface="맑은 고딕"/>
+        <a:font script="Hans" typeface="宋体"/>
+        <a:font script="Hant" typeface="新細明體"/>
+        <a:font script="Arab" typeface="Arial"/>
+        <a:font script="Hebr" typeface="Arial"/>
+        <a:font script="Thai" typeface="Cordia New"/>
+        <a:font script="Ethi" typeface="Nyala"/>
+        <a:font script="Beng" typeface="Vrinda"/>
+        <a:font script="Gujr" typeface="Shruti"/>
+        <a:font script="Khmr" typeface="DaunPenh"/>
+        <a:font script="Knda" typeface="Tunga"/>
+        <a:font script="Guru" typeface="Raavi"/>
+        <a:font script="Cans" typeface="Euphemia"/>
+        <a:font script="Cher" typeface="Plantagenet Cherokee"/>
+        <a:font script="Yiii" typeface="Microsoft Yi Baiti"/>
+        <a:font script="Tibt" typeface="Microsoft Himalaya"/>
+        <a:font script="Thaa" typeface="MV Boli"/>
+        <a:font script="Deva" typeface="Mangal"/>
+        <a:font script="Telu" typeface="Gautami"/>
+        <a:font script="Taml" typeface="Latha"/>
+        <a:font script="Syrc" typeface="Estrangelo Edessa"/>
+        <a:font script="Orya" typeface="Kalinga"/>
+        <a:font script="Mlym" typeface="Kartika"/>
+        <a:font script="Laoo" typeface="DokChampa"/>
+        <a:font script="Sinh" typeface="Iskoola Pota"/>
+        <a:font script="Mong" typeface="Mongolian Baiti"/>
+        <a:font script="Viet" typeface="Arial"/>
+        <a:font script="Uigh" typeface="Microsoft Uighur"/>
+        <a:font script="Geor" typeface="Sylfaen"/>
+      </a:minorFont>
+    </a:fontScheme>
+    <a:fmtScheme name="Office">
+      <a:fillStyleLst>
+        <a:solidFill>
+          <a:schemeClr val="phClr"/>
+        </a:solidFill>
+        <a:gradFill rotWithShape="1">
+          <a:gsLst>
+            <a:gs pos="0">
+              <a:schemeClr val="phClr">
+                <a:lumMod val="110000"/>
+                <a:satMod val="105000"/>
+                <a:tint val="67000"/>
+              </a:schemeClr>
+            </a:gs>
+            <a:gs pos="50000">
+              <a:schemeClr val="phClr">
+                <a:lumMod val="105000"/>
+                <a:satMod val="103000"/>
+                <a:tint val="73000"/>
+              </a:schemeClr>
+            </a:gs>
+            <a:gs pos="100000">
+              <a:schemeClr val="phClr">
+                <a:lumMod val="105000"/>
+                <a:satMod val="109000"/>
+                <a:tint val="81000"/>
+              </a:schemeClr>
+            </a:gs>
+          </a:gsLst>
+          <a:lin ang="5400000" scaled="0"/>
+        </a:gradFill>
+        <a:gradFill rotWithShape="1">
+          <a:gsLst>
+            <a:gs pos="0">
+              <a:schemeClr val="phClr">
+                <a:satMod val="103000"/>
+                <a:lumMod val="102000"/>
+                <a:tint val="94000"/>
+              </a:schemeClr>
+            </a:gs>
+            <a:gs pos="50000">
+              <a:schemeClr val="phClr">
+                <a:satMod val="110000"/>
+                <a:lumMod val="100000"/>
+                <a:shade val="100000"/>
+              </a:schemeClr>
+            </a:gs>
+            <a:gs pos="100000">
+              <a:schemeClr val="phClr">
+                <a:lumMod val="99000"/>
+                <a:satMod val="120000"/>
+                <a:shade val="78000"/>
+              </a:schemeClr>
+            </a:gs>
+          </a:gsLst>
+          <a:lin ang="5400000" scaled="0"/>
+        </a:gradFill>
+      </a:fillStyleLst>
+      <a:lnStyleLst>
+        <a:ln w="6350" cap="flat" cmpd="sng" algn="ctr">
+          <a:solidFill>
+            <a:schemeClr val="phClr"/>
+          </a:solidFill>
+          <a:prstDash val="solid"/>
+          <a:miter lim="800000"/>
+        </a:ln>
+        <a:ln w="12700" cap="flat" cmpd="sng" algn="ctr">
+          <a:solidFill>
+            <a:schemeClr val="phClr"/>
+          </a:solidFill>
+          <a:prstDash val="solid"/>
+          <a:miter lim="800000"/>
+        </a:ln>
+        <a:ln w="19050" cap="flat" cmpd="sng" algn="ctr">
+          <a:solidFill>
+            <a:schemeClr val="phClr"/>
+          </a:solidFill>
+          <a:prstDash val="solid"/>
+          <a:miter lim="800000"/>
+        </a:ln>
+      </a:lnStyleLst>
+      <a:effectStyleLst>
+        <a:effectStyle>
+          <a:effectLst/>
+        </a:effectStyle>
+        <a:effectStyle>
+          <a:effectLst/>
+        </a:effectStyle>
+        <a:effectStyle>
+          <a:effectLst>
+            <a:outerShdw blurRad="57150" dist="19050" dir="5400000" algn="ctr" rotWithShape="0">
+              <a:srgbClr val="000000">
+                <a:alpha val="63000"/>
+              </a:srgbClr>
+            </a:outerShdw>
+          </a:effectLst>
+        </a:effectStyle>
+      </a:effectStyleLst>
+      <a:bgFillStyleLst>
+        <a:solidFill>
+          <a:schemeClr val="phClr"/>
+        </a:solidFill>
+        <a:solidFill>
+          <a:schemeClr val="phClr">
+            <a:tint val="95000"/>
+            <a:satMod val="170000"/>
+          </a:schemeClr>
+        </a:solidFill>
+        <a:gradFill rotWithShape="1">
+          <a:gsLst>
+            <a:gs pos="0">
+              <a:schemeClr val="phClr">
+                <a:tint val="93000"/>
+                <a:satMod val="150000"/>
+                <a:shade val="98000"/>
+                <a:lumMod val="102000"/>
+              </a:schemeClr>
+            </a:gs>
+            <a:gs pos="50000">
+              <a:schemeClr val="phClr">
+                <a:tint val="98000"/>
+                <a:satMod val="130000"/>
+                <a:shade val="90000"/>
+                <a:lumMod val="103000"/>
+              </a:schemeClr>
+            </a:gs>
+            <a:gs pos="100000">
+              <a:schemeClr val="phClr">
+                <a:shade val="63000"/>
+                <a:satMod val="120000"/>
+              </a:schemeClr>
+            </a:gs>
+          </a:gsLst>
+          <a:lin ang="5400000" scaled="0"/>
+        </a:gradFill>
+      </a:bgFillStyleLst>
+    </a:fmtScheme>
+  </a:themeElements>
+  <a:objectDefaults/>
+  <a:extraClrSchemeLst/>
+  <a:extLst>
+    <a:ext uri="{05A4C25C-085E-4340-85A3-A5531E510DB2}">
+      <thm15:themeFamily xmlns:thm15="http://schemas.microsoft.com/office/thememl/2012/main" name="Office Theme" id="{62F939B6-93AF-4DB8-9C6B-D6C7DFDC589F}" vid="{4A3C46E8-61CC-4603-A589-7422A47A8E4A}"/>
+    </a:ext>
+  </a:extLst>
+</a:theme>
 </file>
</xml_diff>

<commit_message>
Presentation slides almost finalized
</commit_message>
<xml_diff>
--- a/Project-03/docs/saraf-yudhoatmojo_Presentation.pptx
+++ b/Project-03/docs/saraf-yudhoatmojo_Presentation.pptx
@@ -1,14 +1,14 @@
 
 <file path=ppt/presentation.xml><?xml version="1.0" encoding="utf-8"?>
-<p:presentation xmlns:a="http://schemas.openxmlformats.org/drawingml/2006/main" xmlns:r="http://schemas.openxmlformats.org/officeDocument/2006/relationships" xmlns:p="http://schemas.openxmlformats.org/presentationml/2006/main" showSpecialPlsOnTitleSld="0" saveSubsetFonts="1">
+<p:presentation xmlns:a="http://schemas.openxmlformats.org/drawingml/2006/main" xmlns:r="http://schemas.openxmlformats.org/officeDocument/2006/relationships" xmlns:p="http://schemas.openxmlformats.org/presentationml/2006/main" saveSubsetFonts="1">
   <p:sldMasterIdLst>
     <p:sldMasterId id="2147483684" r:id="rId1"/>
   </p:sldMasterIdLst>
   <p:notesMasterIdLst>
-    <p:notesMasterId r:id="rId16"/>
+    <p:notesMasterId r:id="rId17"/>
   </p:notesMasterIdLst>
   <p:handoutMasterIdLst>
-    <p:handoutMasterId r:id="rId17"/>
+    <p:handoutMasterId r:id="rId18"/>
   </p:handoutMasterIdLst>
   <p:sldIdLst>
     <p:sldId id="272" r:id="rId2"/>
@@ -18,13 +18,14 @@
     <p:sldId id="275" r:id="rId6"/>
     <p:sldId id="276" r:id="rId7"/>
     <p:sldId id="277" r:id="rId8"/>
-    <p:sldId id="278" r:id="rId9"/>
-    <p:sldId id="280" r:id="rId10"/>
+    <p:sldId id="280" r:id="rId9"/>
+    <p:sldId id="288" r:id="rId10"/>
     <p:sldId id="281" r:id="rId11"/>
     <p:sldId id="282" r:id="rId12"/>
     <p:sldId id="283" r:id="rId13"/>
     <p:sldId id="285" r:id="rId14"/>
     <p:sldId id="286" r:id="rId15"/>
+    <p:sldId id="289" r:id="rId16"/>
   </p:sldIdLst>
   <p:sldSz cx="12192000" cy="6858000"/>
   <p:notesSz cx="6858000" cy="9144000"/>
@@ -1160,9 +1161,9 @@
           <a:bodyPr/>
           <a:lstStyle/>
           <a:p>
-            <a:fld id="{6CE4C3DD-97B9-4138-A366-86632CAEDDA2}" type="datetime1">
-              <a:rPr lang="en-US" smtClean="0"/>
-              <a:t>4/23/2020</a:t>
+            <a:fld id="{4EB4526D-5895-484D-8B9C-366891255E46}" type="datetime1">
+              <a:rPr lang="en-US" smtClean="0"/>
+              <a:t>4/24/2020</a:t>
             </a:fld>
             <a:endParaRPr lang="en-US"/>
           </a:p>
@@ -1346,9 +1347,9 @@
           <a:bodyPr/>
           <a:lstStyle/>
           <a:p>
-            <a:fld id="{E2517C3C-F070-44A8-946E-C6396901C462}" type="datetime1">
-              <a:rPr lang="en-US" smtClean="0"/>
-              <a:t>4/23/2020</a:t>
+            <a:fld id="{5713C4CA-7D1D-4080-BCE8-32DF1D6E9CA8}" type="datetime1">
+              <a:rPr lang="en-US" smtClean="0"/>
+              <a:t>4/24/2020</a:t>
             </a:fld>
             <a:endParaRPr lang="en-US"/>
           </a:p>
@@ -1542,9 +1543,9 @@
           <a:bodyPr/>
           <a:lstStyle/>
           <a:p>
-            <a:fld id="{7262D093-5280-4C98-B2BE-CC44549F3693}" type="datetime1">
-              <a:rPr lang="en-US" smtClean="0"/>
-              <a:t>4/23/2020</a:t>
+            <a:fld id="{DD67DD02-AB3A-49DD-86AA-24ED2F740524}" type="datetime1">
+              <a:rPr lang="en-US" smtClean="0"/>
+              <a:t>4/24/2020</a:t>
             </a:fld>
             <a:endParaRPr lang="en-US"/>
           </a:p>
@@ -1728,9 +1729,9 @@
           <a:bodyPr/>
           <a:lstStyle/>
           <a:p>
-            <a:fld id="{6962C5E1-6D18-4673-85A9-B84F9A603C62}" type="datetime1">
-              <a:rPr lang="en-US" smtClean="0"/>
-              <a:t>4/23/2020</a:t>
+            <a:fld id="{C6E55ADB-20A9-4BEC-88D6-9DA2B97BC3CA}" type="datetime1">
+              <a:rPr lang="en-US" smtClean="0"/>
+              <a:t>4/24/2020</a:t>
             </a:fld>
             <a:endParaRPr lang="en-US"/>
           </a:p>
@@ -1977,9 +1978,9 @@
           <a:bodyPr/>
           <a:lstStyle/>
           <a:p>
-            <a:fld id="{86793549-A632-40B5-96C9-0C750971BCAA}" type="datetime1">
-              <a:rPr lang="en-US" smtClean="0"/>
-              <a:t>4/23/2020</a:t>
+            <a:fld id="{F432324C-E9BD-4711-BAB1-F2CCE5BABA7A}" type="datetime1">
+              <a:rPr lang="en-US" smtClean="0"/>
+              <a:t>4/24/2020</a:t>
             </a:fld>
             <a:endParaRPr lang="en-US"/>
           </a:p>
@@ -2262,9 +2263,9 @@
           <a:bodyPr/>
           <a:lstStyle/>
           <a:p>
-            <a:fld id="{2EA24BAE-6383-471E-8B81-672A765179C2}" type="datetime1">
-              <a:rPr lang="en-US" smtClean="0"/>
-              <a:t>4/23/2020</a:t>
+            <a:fld id="{CAE7A11E-1E5F-4860-B225-C6ADC9DC9648}" type="datetime1">
+              <a:rPr lang="en-US" smtClean="0"/>
+              <a:t>4/24/2020</a:t>
             </a:fld>
             <a:endParaRPr lang="en-US"/>
           </a:p>
@@ -2661,9 +2662,9 @@
           <a:bodyPr/>
           <a:lstStyle/>
           <a:p>
-            <a:fld id="{76E09940-37DC-4CF8-A772-BD64FE784FF4}" type="datetime1">
-              <a:rPr lang="en-US" smtClean="0"/>
-              <a:t>4/23/2020</a:t>
+            <a:fld id="{AC9ABB6B-BFB7-4BAE-A7AA-10306EAA4A95}" type="datetime1">
+              <a:rPr lang="en-US" smtClean="0"/>
+              <a:t>4/24/2020</a:t>
             </a:fld>
             <a:endParaRPr lang="en-US"/>
           </a:p>
@@ -2832,9 +2833,9 @@
           <a:bodyPr/>
           <a:lstStyle/>
           <a:p>
-            <a:fld id="{ABE1DB6B-DF0A-4325-B455-629E4CD87C31}" type="datetime1">
-              <a:rPr lang="en-US" smtClean="0"/>
-              <a:t>4/23/2020</a:t>
+            <a:fld id="{907E1EED-038B-4301-A797-D205321DC819}" type="datetime1">
+              <a:rPr lang="en-US" smtClean="0"/>
+              <a:t>4/24/2020</a:t>
             </a:fld>
             <a:endParaRPr lang="en-US"/>
           </a:p>
@@ -2943,9 +2944,9 @@
           <a:bodyPr/>
           <a:lstStyle/>
           <a:p>
-            <a:fld id="{3719A3C6-B4F5-49A1-AF08-3BFDA296AF9E}" type="datetime1">
-              <a:rPr lang="en-US" smtClean="0"/>
-              <a:t>4/23/2020</a:t>
+            <a:fld id="{F05A4D07-1E28-47C6-BB31-706DEF4D9105}" type="datetime1">
+              <a:rPr lang="en-US" smtClean="0"/>
+              <a:t>4/24/2020</a:t>
             </a:fld>
             <a:endParaRPr lang="en-US"/>
           </a:p>
@@ -3225,9 +3226,9 @@
           <a:bodyPr/>
           <a:lstStyle/>
           <a:p>
-            <a:fld id="{B6A54A73-FF84-46BD-9053-76AF7BE0A3C4}" type="datetime1">
-              <a:rPr lang="en-US" smtClean="0"/>
-              <a:t>4/23/2020</a:t>
+            <a:fld id="{B1C561E7-AF5F-4256-8C24-85B263729398}" type="datetime1">
+              <a:rPr lang="en-US" smtClean="0"/>
+              <a:t>4/24/2020</a:t>
             </a:fld>
             <a:endParaRPr lang="en-US"/>
           </a:p>
@@ -3580,9 +3581,9 @@
           <a:bodyPr/>
           <a:lstStyle/>
           <a:p>
-            <a:fld id="{A5B3F7F0-CDEA-4047-BA01-11422AE57A1E}" type="datetime1">
-              <a:rPr lang="en-US" smtClean="0"/>
-              <a:t>4/23/2020</a:t>
+            <a:fld id="{120D91C9-4BC8-4542-BA92-0332C1BC676D}" type="datetime1">
+              <a:rPr lang="en-US" smtClean="0"/>
+              <a:t>4/24/2020</a:t>
             </a:fld>
             <a:endParaRPr lang="en-US"/>
           </a:p>
@@ -4614,9 +4615,9 @@
             </a:lvl1pPr>
           </a:lstStyle>
           <a:p>
-            <a:fld id="{58123F0E-BB49-4BB1-BF17-EC0E5060B3AB}" type="datetime1">
-              <a:rPr lang="en-US" smtClean="0"/>
-              <a:t>4/23/2020</a:t>
+            <a:fld id="{65ABC731-E871-486E-A2C9-AFD0EC42F67E}" type="datetime1">
+              <a:rPr lang="en-US" smtClean="0"/>
+              <a:t>4/24/2020</a:t>
             </a:fld>
             <a:endParaRPr lang="en-US" dirty="0"/>
           </a:p>
@@ -5070,7 +5071,12 @@
             <p:ph type="ctrTitle"/>
           </p:nvPr>
         </p:nvSpPr>
-        <p:spPr/>
+        <p:spPr>
+          <a:xfrm>
+            <a:off x="711200" y="2253802"/>
+            <a:ext cx="10468864" cy="946597"/>
+          </a:xfrm>
+        </p:spPr>
         <p:txBody>
           <a:bodyPr/>
           <a:lstStyle/>
@@ -5078,11 +5084,7 @@
             <a:pPr algn="ctr"/>
             <a:r>
               <a:rPr lang="en-US" dirty="0" smtClean="0"/>
-              <a:t>IMDB </a:t>
-            </a:r>
-            <a:r>
-              <a:rPr lang="en-US" dirty="0" smtClean="0"/>
-              <a:t>Data Analysis</a:t>
+              <a:t>IMDB Data Analysis</a:t>
             </a:r>
             <a:endParaRPr lang="en-US" dirty="0"/>
           </a:p>
@@ -5129,6 +5131,75 @@
           </a:p>
           <a:p>
             <a:endParaRPr lang="en-US" dirty="0"/>
+          </a:p>
+        </p:txBody>
+      </p:sp>
+      <p:sp>
+        <p:nvSpPr>
+          <p:cNvPr id="7" name="Date Placeholder 6"/>
+          <p:cNvSpPr>
+            <a:spLocks noGrp="1"/>
+          </p:cNvSpPr>
+          <p:nvPr>
+            <p:ph type="dt" sz="half" idx="10"/>
+          </p:nvPr>
+        </p:nvSpPr>
+        <p:spPr/>
+        <p:txBody>
+          <a:bodyPr/>
+          <a:lstStyle/>
+          <a:p>
+            <a:fld id="{5CB832B1-439F-43C3-9AD3-4F5C1A6406C6}" type="datetime1">
+              <a:rPr lang="en-US" smtClean="0"/>
+              <a:t>4/24/2020</a:t>
+            </a:fld>
+            <a:endParaRPr lang="en-US"/>
+          </a:p>
+        </p:txBody>
+      </p:sp>
+      <p:sp>
+        <p:nvSpPr>
+          <p:cNvPr id="8" name="Footer Placeholder 7"/>
+          <p:cNvSpPr>
+            <a:spLocks noGrp="1"/>
+          </p:cNvSpPr>
+          <p:nvPr>
+            <p:ph type="ftr" sz="quarter" idx="11"/>
+          </p:nvPr>
+        </p:nvSpPr>
+        <p:spPr/>
+        <p:txBody>
+          <a:bodyPr/>
+          <a:lstStyle/>
+          <a:p>
+            <a:r>
+              <a:rPr lang="en-US" smtClean="0"/>
+              <a:t>CS532 - Database System Project - 3 | IMDB Data Analysis</a:t>
+            </a:r>
+            <a:endParaRPr lang="en-US" dirty="0"/>
+          </a:p>
+        </p:txBody>
+      </p:sp>
+      <p:sp>
+        <p:nvSpPr>
+          <p:cNvPr id="9" name="Slide Number Placeholder 8"/>
+          <p:cNvSpPr>
+            <a:spLocks noGrp="1"/>
+          </p:cNvSpPr>
+          <p:nvPr>
+            <p:ph type="sldNum" sz="quarter" idx="12"/>
+          </p:nvPr>
+        </p:nvSpPr>
+        <p:spPr/>
+        <p:txBody>
+          <a:bodyPr/>
+          <a:lstStyle/>
+          <a:p>
+            <a:fld id="{401CF334-2D5C-4859-84A6-CA7E6E43FAEB}" type="slidenum">
+              <a:rPr lang="en-US" smtClean="0"/>
+              <a:t>1</a:t>
+            </a:fld>
+            <a:endParaRPr lang="en-US"/>
           </a:p>
         </p:txBody>
       </p:sp>
@@ -5287,7 +5358,15 @@
             <a:pPr algn="just"/>
             <a:r>
               <a:rPr lang="en-US" dirty="0"/>
-              <a:t>This query help us to conclude or derive a relation for movie about how much has earned as compared to the IMDB rating given by the people. </a:t>
+              <a:t>This query help us to conclude or derive a relation for movie about how much has earned as compared to the </a:t>
+            </a:r>
+            <a:r>
+              <a:rPr lang="en-US" dirty="0" smtClean="0"/>
+              <a:t>IMDb </a:t>
+            </a:r>
+            <a:r>
+              <a:rPr lang="en-US" dirty="0"/>
+              <a:t>rating given by the people. </a:t>
             </a:r>
             <a:endParaRPr lang="en-US" dirty="0" smtClean="0"/>
           </a:p>
@@ -5299,7 +5378,23 @@
             </a:r>
             <a:r>
               <a:rPr lang="en-US" dirty="0"/>
-              <a:t>happens that the movie has not collected much revenue but based on the story and script makes the movie popular between </a:t>
+              <a:t>happens that the movie has not collected much revenue but based on the story and </a:t>
+            </a:r>
+            <a:r>
+              <a:rPr lang="en-US" dirty="0" smtClean="0"/>
+              <a:t>script the </a:t>
+            </a:r>
+            <a:r>
+              <a:rPr lang="en-US" dirty="0"/>
+              <a:t>movie </a:t>
+            </a:r>
+            <a:r>
+              <a:rPr lang="en-US" dirty="0" smtClean="0"/>
+              <a:t>got popular </a:t>
+            </a:r>
+            <a:r>
+              <a:rPr lang="en-US" dirty="0"/>
+              <a:t>between </a:t>
             </a:r>
             <a:r>
               <a:rPr lang="en-US" dirty="0" smtClean="0"/>
@@ -5307,7 +5402,15 @@
             </a:r>
             <a:r>
               <a:rPr lang="en-US" dirty="0"/>
-              <a:t>compelling them to give high IMDB Score. </a:t>
+              <a:t>compelling them to give high </a:t>
+            </a:r>
+            <a:r>
+              <a:rPr lang="en-US" dirty="0" smtClean="0"/>
+              <a:t>IMDb Score</a:t>
+            </a:r>
+            <a:r>
+              <a:rPr lang="en-US" dirty="0"/>
+              <a:t>. </a:t>
             </a:r>
             <a:endParaRPr lang="en-US" dirty="0" smtClean="0"/>
           </a:p>
@@ -5319,7 +5422,11 @@
             </a:r>
             <a:r>
               <a:rPr lang="en-US" dirty="0"/>
-              <a:t>also possible that movie collected a lot revenue </a:t>
+              <a:t>also possible that movie collected a lot </a:t>
+            </a:r>
+            <a:r>
+              <a:rPr lang="en-US" dirty="0" smtClean="0"/>
+              <a:t>of revenue </a:t>
             </a:r>
             <a:r>
               <a:rPr lang="en-US" dirty="0" smtClean="0"/>
@@ -5327,7 +5434,15 @@
             </a:r>
             <a:r>
               <a:rPr lang="en-US" dirty="0"/>
-              <a:t>popularity of its actors but the actual story, script and other things are so-so, normal so it has low IMDB Score. </a:t>
+              <a:t>popularity of its actors but the actual story, script and other things are so-so, normal so it has low </a:t>
+            </a:r>
+            <a:r>
+              <a:rPr lang="en-US" dirty="0" smtClean="0"/>
+              <a:t>IMDb </a:t>
+            </a:r>
+            <a:r>
+              <a:rPr lang="en-US" dirty="0"/>
+              <a:t>Score. </a:t>
             </a:r>
             <a:endParaRPr lang="en-US" dirty="0" smtClean="0"/>
           </a:p>
@@ -5339,7 +5454,15 @@
             </a:r>
             <a:r>
               <a:rPr lang="en-US" dirty="0"/>
-              <a:t>we take the “year” as the input from the year so generate the scenario for that particular year</a:t>
+              <a:t>we take the “</a:t>
+            </a:r>
+            <a:r>
+              <a:rPr lang="en-US" b="1" dirty="0"/>
+              <a:t>year</a:t>
+            </a:r>
+            <a:r>
+              <a:rPr lang="en-US" dirty="0"/>
+              <a:t>” as the input from the year so generate the scenario for that particular year</a:t>
             </a:r>
             <a:r>
               <a:rPr lang="en-US" dirty="0" smtClean="0"/>
@@ -5351,12 +5474,12 @@
       </p:sp>
       <p:sp>
         <p:nvSpPr>
-          <p:cNvPr id="10" name="Footer Placeholder 9"/>
-          <p:cNvSpPr>
-            <a:spLocks noGrp="1"/>
-          </p:cNvSpPr>
-          <p:nvPr>
-            <p:ph type="ftr" sz="quarter" idx="11"/>
+          <p:cNvPr id="3" name="Date Placeholder 2"/>
+          <p:cNvSpPr>
+            <a:spLocks noGrp="1"/>
+          </p:cNvSpPr>
+          <p:nvPr>
+            <p:ph type="dt" sz="half" idx="10"/>
           </p:nvPr>
         </p:nvSpPr>
         <p:spPr/>
@@ -5364,32 +5487,9 @@
           <a:bodyPr/>
           <a:lstStyle/>
           <a:p>
-            <a:r>
-              <a:rPr lang="en-US" smtClean="0"/>
-              <a:t>CS532 - Database System Project - 3 | IMDB Data Analysis</a:t>
-            </a:r>
-            <a:endParaRPr lang="en-US" dirty="0"/>
-          </a:p>
-        </p:txBody>
-      </p:sp>
-      <p:sp>
-        <p:nvSpPr>
-          <p:cNvPr id="11" name="Slide Number Placeholder 10"/>
-          <p:cNvSpPr>
-            <a:spLocks noGrp="1"/>
-          </p:cNvSpPr>
-          <p:nvPr>
-            <p:ph type="sldNum" sz="quarter" idx="12"/>
-          </p:nvPr>
-        </p:nvSpPr>
-        <p:spPr/>
-        <p:txBody>
-          <a:bodyPr/>
-          <a:lstStyle/>
-          <a:p>
-            <a:fld id="{401CF334-2D5C-4859-84A6-CA7E6E43FAEB}" type="slidenum">
-              <a:rPr lang="en-US" smtClean="0"/>
-              <a:t>10</a:t>
+            <a:fld id="{572F4B5F-848D-41E6-B311-03EB61C03148}" type="datetime1">
+              <a:rPr lang="en-US" smtClean="0"/>
+              <a:t>4/24/2020</a:t>
             </a:fld>
             <a:endParaRPr lang="en-US"/>
           </a:p>
@@ -5397,12 +5497,12 @@
       </p:sp>
       <p:sp>
         <p:nvSpPr>
-          <p:cNvPr id="12" name="Date Placeholder 11"/>
-          <p:cNvSpPr>
-            <a:spLocks noGrp="1"/>
-          </p:cNvSpPr>
-          <p:nvPr>
-            <p:ph type="dt" sz="half" idx="10"/>
+          <p:cNvPr id="4" name="Footer Placeholder 3"/>
+          <p:cNvSpPr>
+            <a:spLocks noGrp="1"/>
+          </p:cNvSpPr>
+          <p:nvPr>
+            <p:ph type="ftr" sz="quarter" idx="11"/>
           </p:nvPr>
         </p:nvSpPr>
         <p:spPr/>
@@ -5410,9 +5510,32 @@
           <a:bodyPr/>
           <a:lstStyle/>
           <a:p>
-            <a:fld id="{A84F1356-C1B6-49A4-8E93-C2FFC393265B}" type="datetime1">
-              <a:rPr lang="en-US" smtClean="0"/>
-              <a:t>4/23/2020</a:t>
+            <a:r>
+              <a:rPr lang="en-US" smtClean="0"/>
+              <a:t>CS532 - Database System Project - 3 | IMDB Data Analysis</a:t>
+            </a:r>
+            <a:endParaRPr lang="en-US" dirty="0"/>
+          </a:p>
+        </p:txBody>
+      </p:sp>
+      <p:sp>
+        <p:nvSpPr>
+          <p:cNvPr id="5" name="Slide Number Placeholder 4"/>
+          <p:cNvSpPr>
+            <a:spLocks noGrp="1"/>
+          </p:cNvSpPr>
+          <p:nvPr>
+            <p:ph type="sldNum" sz="quarter" idx="12"/>
+          </p:nvPr>
+        </p:nvSpPr>
+        <p:spPr/>
+        <p:txBody>
+          <a:bodyPr/>
+          <a:lstStyle/>
+          <a:p>
+            <a:fld id="{401CF334-2D5C-4859-84A6-CA7E6E43FAEB}" type="slidenum">
+              <a:rPr lang="en-US" smtClean="0"/>
+              <a:t>10</a:t>
             </a:fld>
             <a:endParaRPr lang="en-US"/>
           </a:p>
@@ -5510,7 +5633,12 @@
             <p:ph sz="half" idx="1"/>
           </p:nvPr>
         </p:nvSpPr>
-        <p:spPr/>
+        <p:spPr>
+          <a:xfrm>
+            <a:off x="609600" y="1920085"/>
+            <a:ext cx="5224530" cy="4434840"/>
+          </a:xfrm>
+        </p:spPr>
         <p:txBody>
           <a:bodyPr>
             <a:normAutofit/>
@@ -5528,7 +5656,11 @@
             </a:r>
             <a:r>
               <a:rPr lang="en-US" sz="2000" dirty="0"/>
-              <a:t>query compares the budget of movies and the gross income made by movie. </a:t>
+              <a:t>query compares the budget of movies and the gross income made by </a:t>
+            </a:r>
+            <a:r>
+              <a:rPr lang="en-US" sz="2000" dirty="0" smtClean="0"/>
+              <a:t>movies. </a:t>
             </a:r>
             <a:endParaRPr lang="en-US" sz="2000" dirty="0" smtClean="0"/>
           </a:p>
@@ -5564,7 +5696,23 @@
             </a:r>
             <a:r>
               <a:rPr lang="en-US" sz="2000" dirty="0"/>
-              <a:t>using this visualization, we can which years the average budget is greater or lesser than what the movie received as the gross income. </a:t>
+              <a:t>using this visualization, we </a:t>
+            </a:r>
+            <a:r>
+              <a:rPr lang="en-US" sz="2000" dirty="0" smtClean="0"/>
+              <a:t>can find that in </a:t>
+            </a:r>
+            <a:r>
+              <a:rPr lang="en-US" sz="2000" dirty="0"/>
+              <a:t>which years the average budget is greater or lesser than what the </a:t>
+            </a:r>
+            <a:r>
+              <a:rPr lang="en-US" sz="2000" dirty="0" smtClean="0"/>
+              <a:t>movies </a:t>
+            </a:r>
+            <a:r>
+              <a:rPr lang="en-US" sz="2000" dirty="0"/>
+              <a:t>received as the gross income. </a:t>
             </a:r>
             <a:endParaRPr lang="en-IN" sz="2000" dirty="0"/>
           </a:p>
@@ -5618,12 +5766,12 @@
       </p:pic>
       <p:sp>
         <p:nvSpPr>
-          <p:cNvPr id="9" name="Footer Placeholder 8"/>
-          <p:cNvSpPr>
-            <a:spLocks noGrp="1"/>
-          </p:cNvSpPr>
-          <p:nvPr>
-            <p:ph type="ftr" sz="quarter" idx="11"/>
+          <p:cNvPr id="3" name="Date Placeholder 2"/>
+          <p:cNvSpPr>
+            <a:spLocks noGrp="1"/>
+          </p:cNvSpPr>
+          <p:nvPr>
+            <p:ph type="dt" sz="half" idx="10"/>
           </p:nvPr>
         </p:nvSpPr>
         <p:spPr/>
@@ -5631,32 +5779,9 @@
           <a:bodyPr/>
           <a:lstStyle/>
           <a:p>
-            <a:r>
-              <a:rPr lang="en-US" smtClean="0"/>
-              <a:t>CS532 - Database System Project - 3 | IMDB Data Analysis</a:t>
-            </a:r>
-            <a:endParaRPr lang="en-US" dirty="0"/>
-          </a:p>
-        </p:txBody>
-      </p:sp>
-      <p:sp>
-        <p:nvSpPr>
-          <p:cNvPr id="10" name="Slide Number Placeholder 9"/>
-          <p:cNvSpPr>
-            <a:spLocks noGrp="1"/>
-          </p:cNvSpPr>
-          <p:nvPr>
-            <p:ph type="sldNum" sz="quarter" idx="12"/>
-          </p:nvPr>
-        </p:nvSpPr>
-        <p:spPr/>
-        <p:txBody>
-          <a:bodyPr/>
-          <a:lstStyle/>
-          <a:p>
-            <a:fld id="{401CF334-2D5C-4859-84A6-CA7E6E43FAEB}" type="slidenum">
-              <a:rPr lang="en-US" smtClean="0"/>
-              <a:t>11</a:t>
+            <a:fld id="{5AB08BB0-D1E5-4D46-93A5-98C32C99CF0A}" type="datetime1">
+              <a:rPr lang="en-US" smtClean="0"/>
+              <a:t>4/24/2020</a:t>
             </a:fld>
             <a:endParaRPr lang="en-US"/>
           </a:p>
@@ -5664,12 +5789,12 @@
       </p:sp>
       <p:sp>
         <p:nvSpPr>
-          <p:cNvPr id="11" name="Date Placeholder 10"/>
-          <p:cNvSpPr>
-            <a:spLocks noGrp="1"/>
-          </p:cNvSpPr>
-          <p:nvPr>
-            <p:ph type="dt" sz="half" idx="10"/>
+          <p:cNvPr id="5" name="Footer Placeholder 4"/>
+          <p:cNvSpPr>
+            <a:spLocks noGrp="1"/>
+          </p:cNvSpPr>
+          <p:nvPr>
+            <p:ph type="ftr" sz="quarter" idx="11"/>
           </p:nvPr>
         </p:nvSpPr>
         <p:spPr/>
@@ -5677,9 +5802,32 @@
           <a:bodyPr/>
           <a:lstStyle/>
           <a:p>
-            <a:fld id="{B202A79C-9F35-4BCD-8C7A-D580BAFFC321}" type="datetime1">
-              <a:rPr lang="en-US" smtClean="0"/>
-              <a:t>4/23/2020</a:t>
+            <a:r>
+              <a:rPr lang="en-US" smtClean="0"/>
+              <a:t>CS532 - Database System Project - 3 | IMDB Data Analysis</a:t>
+            </a:r>
+            <a:endParaRPr lang="en-US" dirty="0"/>
+          </a:p>
+        </p:txBody>
+      </p:sp>
+      <p:sp>
+        <p:nvSpPr>
+          <p:cNvPr id="7" name="Slide Number Placeholder 6"/>
+          <p:cNvSpPr>
+            <a:spLocks noGrp="1"/>
+          </p:cNvSpPr>
+          <p:nvPr>
+            <p:ph type="sldNum" sz="quarter" idx="12"/>
+          </p:nvPr>
+        </p:nvSpPr>
+        <p:spPr/>
+        <p:txBody>
+          <a:bodyPr/>
+          <a:lstStyle/>
+          <a:p>
+            <a:fld id="{401CF334-2D5C-4859-84A6-CA7E6E43FAEB}" type="slidenum">
+              <a:rPr lang="en-US" smtClean="0"/>
+              <a:t>11</a:t>
             </a:fld>
             <a:endParaRPr lang="en-US"/>
           </a:p>
@@ -5799,7 +5947,15 @@
             </a:r>
             <a:r>
               <a:rPr lang="en-US" sz="2000" dirty="0" smtClean="0"/>
-              <a:t>whose IMDB score lies in between </a:t>
+              <a:t>whose </a:t>
+            </a:r>
+            <a:r>
+              <a:rPr lang="en-US" sz="2000" dirty="0" smtClean="0"/>
+              <a:t>IMDb </a:t>
+            </a:r>
+            <a:r>
+              <a:rPr lang="en-US" sz="2000" dirty="0" smtClean="0"/>
+              <a:t>score lies in between </a:t>
             </a:r>
             <a:r>
               <a:rPr lang="en-US" sz="2000" dirty="0"/>
@@ -5847,15 +6003,35 @@
             </a:r>
             <a:r>
               <a:rPr lang="en-US" sz="2000" dirty="0"/>
-              <a:t>take the “year” as an input so that we can filter the movies as per the year and then from those </a:t>
+              <a:t>take the “</a:t>
+            </a:r>
+            <a:r>
+              <a:rPr lang="en-US" sz="2000" b="1" dirty="0"/>
+              <a:t>year</a:t>
+            </a:r>
+            <a:r>
+              <a:rPr lang="en-US" sz="2000" dirty="0"/>
+              <a:t>” as an input so that we can filter the movies as per the year and then from those </a:t>
             </a:r>
             <a:r>
               <a:rPr lang="en-US" sz="2000" dirty="0" smtClean="0"/>
               <a:t>set of movies we </a:t>
             </a:r>
             <a:r>
+              <a:rPr lang="en-US" sz="2000" dirty="0" smtClean="0"/>
+              <a:t>display </a:t>
+            </a:r>
+            <a:r>
               <a:rPr lang="en-US" sz="2000" dirty="0"/>
-              <a:t>displaying only those IMDB score is in between selected </a:t>
+              <a:t>only those </a:t>
+            </a:r>
+            <a:r>
+              <a:rPr lang="en-US" sz="2000" dirty="0" smtClean="0"/>
+              <a:t>IMDb </a:t>
+            </a:r>
+            <a:r>
+              <a:rPr lang="en-US" sz="2000" dirty="0"/>
+              <a:t>score is in between selected </a:t>
             </a:r>
             <a:r>
               <a:rPr lang="en-US" sz="2000" dirty="0" smtClean="0"/>
@@ -5913,12 +6089,12 @@
       </p:pic>
       <p:sp>
         <p:nvSpPr>
-          <p:cNvPr id="11" name="Footer Placeholder 10"/>
-          <p:cNvSpPr>
-            <a:spLocks noGrp="1"/>
-          </p:cNvSpPr>
-          <p:nvPr>
-            <p:ph type="ftr" sz="quarter" idx="11"/>
+          <p:cNvPr id="3" name="Date Placeholder 2"/>
+          <p:cNvSpPr>
+            <a:spLocks noGrp="1"/>
+          </p:cNvSpPr>
+          <p:nvPr>
+            <p:ph type="dt" sz="half" idx="10"/>
           </p:nvPr>
         </p:nvSpPr>
         <p:spPr/>
@@ -5926,32 +6102,9 @@
           <a:bodyPr/>
           <a:lstStyle/>
           <a:p>
-            <a:r>
-              <a:rPr lang="en-US" smtClean="0"/>
-              <a:t>CS532 - Database System Project - 3 | IMDB Data Analysis</a:t>
-            </a:r>
-            <a:endParaRPr lang="en-US" dirty="0"/>
-          </a:p>
-        </p:txBody>
-      </p:sp>
-      <p:sp>
-        <p:nvSpPr>
-          <p:cNvPr id="12" name="Slide Number Placeholder 11"/>
-          <p:cNvSpPr>
-            <a:spLocks noGrp="1"/>
-          </p:cNvSpPr>
-          <p:nvPr>
-            <p:ph type="sldNum" sz="quarter" idx="12"/>
-          </p:nvPr>
-        </p:nvSpPr>
-        <p:spPr/>
-        <p:txBody>
-          <a:bodyPr/>
-          <a:lstStyle/>
-          <a:p>
-            <a:fld id="{401CF334-2D5C-4859-84A6-CA7E6E43FAEB}" type="slidenum">
-              <a:rPr lang="en-US" smtClean="0"/>
-              <a:t>12</a:t>
+            <a:fld id="{71F858BD-1B71-4D0C-B974-1C4F72AC7C92}" type="datetime1">
+              <a:rPr lang="en-US" smtClean="0"/>
+              <a:t>4/24/2020</a:t>
             </a:fld>
             <a:endParaRPr lang="en-US"/>
           </a:p>
@@ -5959,12 +6112,12 @@
       </p:sp>
       <p:sp>
         <p:nvSpPr>
-          <p:cNvPr id="13" name="Date Placeholder 12"/>
-          <p:cNvSpPr>
-            <a:spLocks noGrp="1"/>
-          </p:cNvSpPr>
-          <p:nvPr>
-            <p:ph type="dt" sz="half" idx="10"/>
+          <p:cNvPr id="4" name="Footer Placeholder 3"/>
+          <p:cNvSpPr>
+            <a:spLocks noGrp="1"/>
+          </p:cNvSpPr>
+          <p:nvPr>
+            <p:ph type="ftr" sz="quarter" idx="11"/>
           </p:nvPr>
         </p:nvSpPr>
         <p:spPr/>
@@ -5972,9 +6125,32 @@
           <a:bodyPr/>
           <a:lstStyle/>
           <a:p>
-            <a:fld id="{5EA82EA6-2510-4221-A388-C0688FCA0B3F}" type="datetime1">
-              <a:rPr lang="en-US" smtClean="0"/>
-              <a:t>4/23/2020</a:t>
+            <a:r>
+              <a:rPr lang="en-US" smtClean="0"/>
+              <a:t>CS532 - Database System Project - 3 | IMDB Data Analysis</a:t>
+            </a:r>
+            <a:endParaRPr lang="en-US" dirty="0"/>
+          </a:p>
+        </p:txBody>
+      </p:sp>
+      <p:sp>
+        <p:nvSpPr>
+          <p:cNvPr id="5" name="Slide Number Placeholder 4"/>
+          <p:cNvSpPr>
+            <a:spLocks noGrp="1"/>
+          </p:cNvSpPr>
+          <p:nvPr>
+            <p:ph type="sldNum" sz="quarter" idx="12"/>
+          </p:nvPr>
+        </p:nvSpPr>
+        <p:spPr/>
+        <p:txBody>
+          <a:bodyPr/>
+          <a:lstStyle/>
+          <a:p>
+            <a:fld id="{401CF334-2D5C-4859-84A6-CA7E6E43FAEB}" type="slidenum">
+              <a:rPr lang="en-US" smtClean="0"/>
+              <a:t>12</a:t>
             </a:fld>
             <a:endParaRPr lang="en-US"/>
           </a:p>
@@ -6098,7 +6274,15 @@
             </a:r>
             <a:r>
               <a:rPr lang="en-US" sz="2000" dirty="0" smtClean="0"/>
-              <a:t>“crime”, </a:t>
+              <a:t>“</a:t>
+            </a:r>
+            <a:r>
+              <a:rPr lang="en-US" sz="2000" b="1" dirty="0" smtClean="0"/>
+              <a:t>crime</a:t>
+            </a:r>
+            <a:r>
+              <a:rPr lang="en-US" sz="2000" dirty="0" smtClean="0"/>
+              <a:t>”, </a:t>
             </a:r>
             <a:r>
               <a:rPr lang="en-US" sz="2000" dirty="0"/>
@@ -6208,12 +6392,12 @@
       </p:pic>
       <p:sp>
         <p:nvSpPr>
-          <p:cNvPr id="7" name="Footer Placeholder 6"/>
-          <p:cNvSpPr>
-            <a:spLocks noGrp="1"/>
-          </p:cNvSpPr>
-          <p:nvPr>
-            <p:ph type="ftr" sz="quarter" idx="11"/>
+          <p:cNvPr id="3" name="Date Placeholder 2"/>
+          <p:cNvSpPr>
+            <a:spLocks noGrp="1"/>
+          </p:cNvSpPr>
+          <p:nvPr>
+            <p:ph type="dt" sz="half" idx="10"/>
           </p:nvPr>
         </p:nvSpPr>
         <p:spPr/>
@@ -6221,32 +6405,9 @@
           <a:bodyPr/>
           <a:lstStyle/>
           <a:p>
-            <a:r>
-              <a:rPr lang="en-US" smtClean="0"/>
-              <a:t>CS532 - Database System Project - 3 | IMDB Data Analysis</a:t>
-            </a:r>
-            <a:endParaRPr lang="en-US" dirty="0"/>
-          </a:p>
-        </p:txBody>
-      </p:sp>
-      <p:sp>
-        <p:nvSpPr>
-          <p:cNvPr id="8" name="Slide Number Placeholder 7"/>
-          <p:cNvSpPr>
-            <a:spLocks noGrp="1"/>
-          </p:cNvSpPr>
-          <p:nvPr>
-            <p:ph type="sldNum" sz="quarter" idx="12"/>
-          </p:nvPr>
-        </p:nvSpPr>
-        <p:spPr/>
-        <p:txBody>
-          <a:bodyPr/>
-          <a:lstStyle/>
-          <a:p>
-            <a:fld id="{401CF334-2D5C-4859-84A6-CA7E6E43FAEB}" type="slidenum">
-              <a:rPr lang="en-US" smtClean="0"/>
-              <a:t>13</a:t>
+            <a:fld id="{2CA18EA3-0160-4CFC-8B0E-87901BB1ADBB}" type="datetime1">
+              <a:rPr lang="en-US" smtClean="0"/>
+              <a:t>4/24/2020</a:t>
             </a:fld>
             <a:endParaRPr lang="en-US"/>
           </a:p>
@@ -6254,12 +6415,12 @@
       </p:sp>
       <p:sp>
         <p:nvSpPr>
-          <p:cNvPr id="9" name="Date Placeholder 8"/>
-          <p:cNvSpPr>
-            <a:spLocks noGrp="1"/>
-          </p:cNvSpPr>
-          <p:nvPr>
-            <p:ph type="dt" sz="half" idx="10"/>
+          <p:cNvPr id="5" name="Footer Placeholder 4"/>
+          <p:cNvSpPr>
+            <a:spLocks noGrp="1"/>
+          </p:cNvSpPr>
+          <p:nvPr>
+            <p:ph type="ftr" sz="quarter" idx="11"/>
           </p:nvPr>
         </p:nvSpPr>
         <p:spPr/>
@@ -6267,9 +6428,32 @@
           <a:bodyPr/>
           <a:lstStyle/>
           <a:p>
-            <a:fld id="{88E89752-07F8-47B8-953B-32FCBBB502FC}" type="datetime1">
-              <a:rPr lang="en-US" smtClean="0"/>
-              <a:t>4/23/2020</a:t>
+            <a:r>
+              <a:rPr lang="en-US" smtClean="0"/>
+              <a:t>CS532 - Database System Project - 3 | IMDB Data Analysis</a:t>
+            </a:r>
+            <a:endParaRPr lang="en-US" dirty="0"/>
+          </a:p>
+        </p:txBody>
+      </p:sp>
+      <p:sp>
+        <p:nvSpPr>
+          <p:cNvPr id="10" name="Slide Number Placeholder 9"/>
+          <p:cNvSpPr>
+            <a:spLocks noGrp="1"/>
+          </p:cNvSpPr>
+          <p:nvPr>
+            <p:ph type="sldNum" sz="quarter" idx="12"/>
+          </p:nvPr>
+        </p:nvSpPr>
+        <p:spPr/>
+        <p:txBody>
+          <a:bodyPr/>
+          <a:lstStyle/>
+          <a:p>
+            <a:fld id="{401CF334-2D5C-4859-84A6-CA7E6E43FAEB}" type="slidenum">
+              <a:rPr lang="en-US" smtClean="0"/>
+              <a:t>13</a:t>
             </a:fld>
             <a:endParaRPr lang="en-US"/>
           </a:p>
@@ -6590,12 +6774,12 @@
       </p:sp>
       <p:sp>
         <p:nvSpPr>
-          <p:cNvPr id="6" name="Footer Placeholder 5"/>
-          <p:cNvSpPr>
-            <a:spLocks noGrp="1"/>
-          </p:cNvSpPr>
-          <p:nvPr>
-            <p:ph type="ftr" sz="quarter" idx="11"/>
+          <p:cNvPr id="4" name="Date Placeholder 3"/>
+          <p:cNvSpPr>
+            <a:spLocks noGrp="1"/>
+          </p:cNvSpPr>
+          <p:nvPr>
+            <p:ph type="dt" sz="half" idx="10"/>
           </p:nvPr>
         </p:nvSpPr>
         <p:spPr/>
@@ -6603,32 +6787,9 @@
           <a:bodyPr/>
           <a:lstStyle/>
           <a:p>
-            <a:r>
-              <a:rPr lang="en-US" smtClean="0"/>
-              <a:t>CS532 - Database System Project - 3 | IMDB Data Analysis</a:t>
-            </a:r>
-            <a:endParaRPr lang="en-US" dirty="0"/>
-          </a:p>
-        </p:txBody>
-      </p:sp>
-      <p:sp>
-        <p:nvSpPr>
-          <p:cNvPr id="7" name="Slide Number Placeholder 6"/>
-          <p:cNvSpPr>
-            <a:spLocks noGrp="1"/>
-          </p:cNvSpPr>
-          <p:nvPr>
-            <p:ph type="sldNum" sz="quarter" idx="12"/>
-          </p:nvPr>
-        </p:nvSpPr>
-        <p:spPr/>
-        <p:txBody>
-          <a:bodyPr/>
-          <a:lstStyle/>
-          <a:p>
-            <a:fld id="{401CF334-2D5C-4859-84A6-CA7E6E43FAEB}" type="slidenum">
-              <a:rPr lang="en-US" smtClean="0"/>
-              <a:t>14</a:t>
+            <a:fld id="{E8FDF4B1-9B1D-49E5-82B5-D153EE631998}" type="datetime1">
+              <a:rPr lang="en-US" smtClean="0"/>
+              <a:t>4/24/2020</a:t>
             </a:fld>
             <a:endParaRPr lang="en-US"/>
           </a:p>
@@ -6636,12 +6797,12 @@
       </p:sp>
       <p:sp>
         <p:nvSpPr>
-          <p:cNvPr id="8" name="Date Placeholder 7"/>
-          <p:cNvSpPr>
-            <a:spLocks noGrp="1"/>
-          </p:cNvSpPr>
-          <p:nvPr>
-            <p:ph type="dt" sz="half" idx="10"/>
+          <p:cNvPr id="5" name="Footer Placeholder 4"/>
+          <p:cNvSpPr>
+            <a:spLocks noGrp="1"/>
+          </p:cNvSpPr>
+          <p:nvPr>
+            <p:ph type="ftr" sz="quarter" idx="11"/>
           </p:nvPr>
         </p:nvSpPr>
         <p:spPr/>
@@ -6649,9 +6810,32 @@
           <a:bodyPr/>
           <a:lstStyle/>
           <a:p>
-            <a:fld id="{4B91880D-CA43-482E-890B-4D9A505993A5}" type="datetime1">
-              <a:rPr lang="en-US" smtClean="0"/>
-              <a:t>4/23/2020</a:t>
+            <a:r>
+              <a:rPr lang="en-US" smtClean="0"/>
+              <a:t>CS532 - Database System Project - 3 | IMDB Data Analysis</a:t>
+            </a:r>
+            <a:endParaRPr lang="en-US" dirty="0"/>
+          </a:p>
+        </p:txBody>
+      </p:sp>
+      <p:sp>
+        <p:nvSpPr>
+          <p:cNvPr id="9" name="Slide Number Placeholder 8"/>
+          <p:cNvSpPr>
+            <a:spLocks noGrp="1"/>
+          </p:cNvSpPr>
+          <p:nvPr>
+            <p:ph type="sldNum" sz="quarter" idx="12"/>
+          </p:nvPr>
+        </p:nvSpPr>
+        <p:spPr/>
+        <p:txBody>
+          <a:bodyPr/>
+          <a:lstStyle/>
+          <a:p>
+            <a:fld id="{401CF334-2D5C-4859-84A6-CA7E6E43FAEB}" type="slidenum">
+              <a:rPr lang="en-US" smtClean="0"/>
+              <a:t>14</a:t>
             </a:fld>
             <a:endParaRPr lang="en-US"/>
           </a:p>
@@ -6661,6 +6845,147 @@
     <p:extLst>
       <p:ext uri="{BB962C8B-B14F-4D97-AF65-F5344CB8AC3E}">
         <p14:creationId xmlns:p14="http://schemas.microsoft.com/office/powerpoint/2010/main" val="2098766824"/>
+      </p:ext>
+    </p:extLst>
+  </p:cSld>
+  <p:clrMapOvr>
+    <a:masterClrMapping/>
+  </p:clrMapOvr>
+  <mc:AlternateContent xmlns:mc="http://schemas.openxmlformats.org/markup-compatibility/2006" xmlns:p14="http://schemas.microsoft.com/office/powerpoint/2010/main">
+    <mc:Choice Requires="p14">
+      <p:transition spd="med" p14:dur="700">
+        <p:fade/>
+      </p:transition>
+    </mc:Choice>
+    <mc:Fallback xmlns="">
+      <p:transition spd="med">
+        <p:fade/>
+      </p:transition>
+    </mc:Fallback>
+  </mc:AlternateContent>
+</p:sld>
+</file>
+
+<file path=ppt/slides/slide15.xml><?xml version="1.0" encoding="utf-8"?>
+<p:sld xmlns:a="http://schemas.openxmlformats.org/drawingml/2006/main" xmlns:r="http://schemas.openxmlformats.org/officeDocument/2006/relationships" xmlns:p="http://schemas.openxmlformats.org/presentationml/2006/main">
+  <p:cSld>
+    <p:spTree>
+      <p:nvGrpSpPr>
+        <p:cNvPr id="1" name=""/>
+        <p:cNvGrpSpPr/>
+        <p:nvPr/>
+      </p:nvGrpSpPr>
+      <p:grpSpPr>
+        <a:xfrm>
+          <a:off x="0" y="0"/>
+          <a:ext cx="0" cy="0"/>
+          <a:chOff x="0" y="0"/>
+          <a:chExt cx="0" cy="0"/>
+        </a:xfrm>
+      </p:grpSpPr>
+      <p:sp>
+        <p:nvSpPr>
+          <p:cNvPr id="2" name="Date Placeholder 1"/>
+          <p:cNvSpPr>
+            <a:spLocks noGrp="1"/>
+          </p:cNvSpPr>
+          <p:nvPr>
+            <p:ph type="dt" sz="half" idx="10"/>
+          </p:nvPr>
+        </p:nvSpPr>
+        <p:spPr/>
+        <p:txBody>
+          <a:bodyPr/>
+          <a:lstStyle/>
+          <a:p>
+            <a:fld id="{F05A4D07-1E28-47C6-BB31-706DEF4D9105}" type="datetime1">
+              <a:rPr lang="en-US" smtClean="0"/>
+              <a:t>4/24/2020</a:t>
+            </a:fld>
+            <a:endParaRPr lang="en-US"/>
+          </a:p>
+        </p:txBody>
+      </p:sp>
+      <p:sp>
+        <p:nvSpPr>
+          <p:cNvPr id="3" name="Footer Placeholder 2"/>
+          <p:cNvSpPr>
+            <a:spLocks noGrp="1"/>
+          </p:cNvSpPr>
+          <p:nvPr>
+            <p:ph type="ftr" sz="quarter" idx="11"/>
+          </p:nvPr>
+        </p:nvSpPr>
+        <p:spPr/>
+        <p:txBody>
+          <a:bodyPr/>
+          <a:lstStyle/>
+          <a:p>
+            <a:r>
+              <a:rPr lang="en-US" smtClean="0"/>
+              <a:t>CS532 - Database System Project - 3 | IMDB Data Analysis</a:t>
+            </a:r>
+            <a:endParaRPr lang="en-US" dirty="0"/>
+          </a:p>
+        </p:txBody>
+      </p:sp>
+      <p:sp>
+        <p:nvSpPr>
+          <p:cNvPr id="4" name="Slide Number Placeholder 3"/>
+          <p:cNvSpPr>
+            <a:spLocks noGrp="1"/>
+          </p:cNvSpPr>
+          <p:nvPr>
+            <p:ph type="sldNum" sz="quarter" idx="12"/>
+          </p:nvPr>
+        </p:nvSpPr>
+        <p:spPr/>
+        <p:txBody>
+          <a:bodyPr/>
+          <a:lstStyle/>
+          <a:p>
+            <a:fld id="{401CF334-2D5C-4859-84A6-CA7E6E43FAEB}" type="slidenum">
+              <a:rPr lang="en-US" smtClean="0"/>
+              <a:t>15</a:t>
+            </a:fld>
+            <a:endParaRPr lang="en-US"/>
+          </a:p>
+        </p:txBody>
+      </p:sp>
+      <p:pic>
+        <p:nvPicPr>
+          <p:cNvPr id="8" name="Picture 7"/>
+          <p:cNvPicPr>
+            <a:picLocks noChangeAspect="1"/>
+          </p:cNvPicPr>
+          <p:nvPr/>
+        </p:nvPicPr>
+        <p:blipFill>
+          <a:blip r:embed="rId2" cstate="print">
+            <a:extLst>
+              <a:ext uri="{28A0092B-C50C-407E-A947-70E740481C1C}">
+                <a14:useLocalDpi xmlns:a14="http://schemas.microsoft.com/office/drawing/2010/main" val="0"/>
+              </a:ext>
+            </a:extLst>
+          </a:blip>
+          <a:stretch>
+            <a:fillRect/>
+          </a:stretch>
+        </p:blipFill>
+        <p:spPr>
+          <a:xfrm>
+            <a:off x="3308204" y="1378039"/>
+            <a:ext cx="5552459" cy="3682390"/>
+          </a:xfrm>
+          <a:prstGeom prst="rect">
+            <a:avLst/>
+          </a:prstGeom>
+        </p:spPr>
+      </p:pic>
+    </p:spTree>
+    <p:extLst>
+      <p:ext uri="{BB962C8B-B14F-4D97-AF65-F5344CB8AC3E}">
+        <p14:creationId xmlns:p14="http://schemas.microsoft.com/office/powerpoint/2010/main" val="4003618705"/>
       </p:ext>
     </p:extLst>
   </p:cSld>
@@ -6760,11 +7085,19 @@
             <a:pPr algn="just"/>
             <a:r>
               <a:rPr lang="en-US" sz="2000" dirty="0"/>
-              <a:t>Performing all this analysis on such a huge data might be difficult using the structures DB but this is somewhat eased </a:t>
+              <a:t>Performing all this analysis on such a huge data might be difficult using the </a:t>
             </a:r>
             <a:r>
               <a:rPr lang="en-US" sz="2000" dirty="0" smtClean="0"/>
-              <a:t>by </a:t>
+              <a:t>structured </a:t>
+            </a:r>
+            <a:r>
+              <a:rPr lang="en-US" sz="2000" dirty="0"/>
+              <a:t>DB but this is somewhat </a:t>
+            </a:r>
+            <a:r>
+              <a:rPr lang="en-US" sz="2000" dirty="0" smtClean="0"/>
+              <a:t>easy by </a:t>
             </a:r>
             <a:r>
               <a:rPr lang="en-US" sz="2000" dirty="0"/>
@@ -6779,7 +7112,15 @@
             <a:pPr algn="just"/>
             <a:r>
               <a:rPr lang="en-US" sz="2000" dirty="0" smtClean="0"/>
-              <a:t>Reading all the analysis in just textual format is also somewhat tedious and time consuming. Hence we have designed the line and bar graphs to visualize the data in a better way.</a:t>
+              <a:t>Reading all the analysis in just textual format is also somewhat tedious and time consuming. Hence we have </a:t>
+            </a:r>
+            <a:r>
+              <a:rPr lang="en-US" sz="2000" dirty="0" smtClean="0"/>
+              <a:t>also designed </a:t>
+            </a:r>
+            <a:r>
+              <a:rPr lang="en-US" sz="2000" dirty="0" smtClean="0"/>
+              <a:t>the line and bar graphs to visualize the data in a better way.</a:t>
             </a:r>
             <a:endParaRPr lang="en-US" sz="2000" dirty="0"/>
           </a:p>
@@ -6787,12 +7128,12 @@
       </p:sp>
       <p:sp>
         <p:nvSpPr>
-          <p:cNvPr id="6" name="Footer Placeholder 5"/>
-          <p:cNvSpPr>
-            <a:spLocks noGrp="1"/>
-          </p:cNvSpPr>
-          <p:nvPr>
-            <p:ph type="ftr" sz="quarter" idx="11"/>
+          <p:cNvPr id="4" name="Date Placeholder 3"/>
+          <p:cNvSpPr>
+            <a:spLocks noGrp="1"/>
+          </p:cNvSpPr>
+          <p:nvPr>
+            <p:ph type="dt" sz="half" idx="10"/>
           </p:nvPr>
         </p:nvSpPr>
         <p:spPr/>
@@ -6800,32 +7141,9 @@
           <a:bodyPr/>
           <a:lstStyle/>
           <a:p>
-            <a:r>
-              <a:rPr lang="en-US" dirty="0" smtClean="0"/>
-              <a:t>CS532 - Database System Project - 3 | IMDB Data Analysis</a:t>
-            </a:r>
-            <a:endParaRPr lang="en-US" dirty="0"/>
-          </a:p>
-        </p:txBody>
-      </p:sp>
-      <p:sp>
-        <p:nvSpPr>
-          <p:cNvPr id="7" name="Slide Number Placeholder 6"/>
-          <p:cNvSpPr>
-            <a:spLocks noGrp="1"/>
-          </p:cNvSpPr>
-          <p:nvPr>
-            <p:ph type="sldNum" sz="quarter" idx="12"/>
-          </p:nvPr>
-        </p:nvSpPr>
-        <p:spPr/>
-        <p:txBody>
-          <a:bodyPr/>
-          <a:lstStyle/>
-          <a:p>
-            <a:fld id="{401CF334-2D5C-4859-84A6-CA7E6E43FAEB}" type="slidenum">
-              <a:rPr lang="en-US" smtClean="0"/>
-              <a:t>2</a:t>
+            <a:fld id="{A8C1DEDB-B6A4-4F1A-9549-6441D9A38E2A}" type="datetime1">
+              <a:rPr lang="en-US" smtClean="0"/>
+              <a:t>4/24/2020</a:t>
             </a:fld>
             <a:endParaRPr lang="en-US"/>
           </a:p>
@@ -6833,12 +7151,12 @@
       </p:sp>
       <p:sp>
         <p:nvSpPr>
-          <p:cNvPr id="8" name="Date Placeholder 7"/>
-          <p:cNvSpPr>
-            <a:spLocks noGrp="1"/>
-          </p:cNvSpPr>
-          <p:nvPr>
-            <p:ph type="dt" sz="half" idx="10"/>
+          <p:cNvPr id="5" name="Footer Placeholder 4"/>
+          <p:cNvSpPr>
+            <a:spLocks noGrp="1"/>
+          </p:cNvSpPr>
+          <p:nvPr>
+            <p:ph type="ftr" sz="quarter" idx="11"/>
           </p:nvPr>
         </p:nvSpPr>
         <p:spPr/>
@@ -6846,9 +7164,32 @@
           <a:bodyPr/>
           <a:lstStyle/>
           <a:p>
-            <a:fld id="{2A7D06BF-E9EE-4E76-B8B4-6733454F1536}" type="datetime1">
-              <a:rPr lang="en-US" smtClean="0"/>
-              <a:t>4/23/2020</a:t>
+            <a:r>
+              <a:rPr lang="en-US" smtClean="0"/>
+              <a:t>CS532 - Database System Project - 3 | IMDB Data Analysis</a:t>
+            </a:r>
+            <a:endParaRPr lang="en-US" dirty="0"/>
+          </a:p>
+        </p:txBody>
+      </p:sp>
+      <p:sp>
+        <p:nvSpPr>
+          <p:cNvPr id="9" name="Slide Number Placeholder 8"/>
+          <p:cNvSpPr>
+            <a:spLocks noGrp="1"/>
+          </p:cNvSpPr>
+          <p:nvPr>
+            <p:ph type="sldNum" sz="quarter" idx="12"/>
+          </p:nvPr>
+        </p:nvSpPr>
+        <p:spPr/>
+        <p:txBody>
+          <a:bodyPr/>
+          <a:lstStyle/>
+          <a:p>
+            <a:fld id="{401CF334-2D5C-4859-84A6-CA7E6E43FAEB}" type="slidenum">
+              <a:rPr lang="en-US" smtClean="0"/>
+              <a:t>2</a:t>
             </a:fld>
             <a:endParaRPr lang="en-US"/>
           </a:p>
@@ -6947,34 +7288,134 @@
           <a:p>
             <a:pPr algn="just"/>
             <a:r>
+              <a:rPr lang="en-US" sz="2000" b="1" dirty="0" smtClean="0"/>
+              <a:t>Database: </a:t>
+            </a:r>
+            <a:r>
               <a:rPr lang="en-US" sz="2000" dirty="0" smtClean="0"/>
-              <a:t>Database: We have used the NoSQL DB “MongoDB” to store all the data. It is basically Open source, document based and also it provides the support to store unstructured and can be retrieved in different forms.</a:t>
+              <a:t>We have used the NoSQL DB “</a:t>
+            </a:r>
+            <a:r>
+              <a:rPr lang="en-US" sz="2000" b="1" i="1" dirty="0" smtClean="0"/>
+              <a:t>MongoDB</a:t>
+            </a:r>
+            <a:r>
+              <a:rPr lang="en-US" sz="2000" dirty="0" smtClean="0"/>
+              <a:t>” to store all the data. It is </a:t>
+            </a:r>
+            <a:r>
+              <a:rPr lang="en-US" sz="2000" dirty="0" smtClean="0"/>
+              <a:t>basically an </a:t>
+            </a:r>
+            <a:r>
+              <a:rPr lang="en-US" sz="2000" dirty="0"/>
+              <a:t>o</a:t>
+            </a:r>
+            <a:r>
+              <a:rPr lang="en-US" sz="2000" dirty="0" smtClean="0"/>
+              <a:t>pen </a:t>
+            </a:r>
+            <a:r>
+              <a:rPr lang="en-US" sz="2000" dirty="0" smtClean="0"/>
+              <a:t>source, document based </a:t>
+            </a:r>
+            <a:r>
+              <a:rPr lang="en-US" sz="2000" dirty="0" smtClean="0"/>
+              <a:t>database and </a:t>
+            </a:r>
+            <a:r>
+              <a:rPr lang="en-US" sz="2000" dirty="0" smtClean="0"/>
+              <a:t>also it provides the support to store unstructured </a:t>
+            </a:r>
+            <a:r>
+              <a:rPr lang="en-US" sz="2000" dirty="0" smtClean="0"/>
+              <a:t>data and that can </a:t>
+            </a:r>
+            <a:r>
+              <a:rPr lang="en-US" sz="2000" dirty="0" smtClean="0"/>
+              <a:t>be retrieved in different forms.</a:t>
             </a:r>
           </a:p>
           <a:p>
             <a:pPr algn="just"/>
             <a:r>
               <a:rPr lang="en-US" sz="2000" dirty="0" smtClean="0"/>
-              <a:t>Data is stored in database name “movies” and inside the database there is a collection named “movies”.</a:t>
+              <a:t>For our project we have stored the </a:t>
+            </a:r>
+            <a:r>
+              <a:rPr lang="en-US" sz="2000" dirty="0"/>
+              <a:t>d</a:t>
+            </a:r>
+            <a:r>
+              <a:rPr lang="en-US" sz="2000" dirty="0" smtClean="0"/>
+              <a:t>ata in a </a:t>
+            </a:r>
+            <a:r>
+              <a:rPr lang="en-US" sz="2000" dirty="0" smtClean="0"/>
+              <a:t>database </a:t>
+            </a:r>
+            <a:r>
+              <a:rPr lang="en-US" sz="2000" dirty="0" smtClean="0"/>
+              <a:t>named </a:t>
+            </a:r>
+            <a:r>
+              <a:rPr lang="en-US" sz="2000" dirty="0" smtClean="0"/>
+              <a:t>“</a:t>
+            </a:r>
+            <a:r>
+              <a:rPr lang="en-US" sz="2000" b="1" i="1" dirty="0" smtClean="0"/>
+              <a:t>movies</a:t>
+            </a:r>
+            <a:r>
+              <a:rPr lang="en-US" sz="2000" dirty="0" smtClean="0"/>
+              <a:t>” and inside the database there is a collection named “</a:t>
+            </a:r>
+            <a:r>
+              <a:rPr lang="en-US" sz="2000" b="1" i="1" dirty="0" smtClean="0"/>
+              <a:t>movies</a:t>
+            </a:r>
+            <a:r>
+              <a:rPr lang="en-US" sz="2000" dirty="0" smtClean="0"/>
+              <a:t>”.</a:t>
             </a:r>
           </a:p>
           <a:p>
             <a:pPr algn="just"/>
             <a:r>
+              <a:rPr lang="en-US" sz="2000" b="1" dirty="0" smtClean="0"/>
+              <a:t>Frontend: </a:t>
+            </a:r>
+            <a:r>
               <a:rPr lang="en-US" sz="2000" dirty="0" smtClean="0"/>
-              <a:t>Frontend: After the data being retrieved in python, we have displayed the data in a user friendly manner using HTML, CSS and JavaScript.HTML</a:t>
+              <a:t>After the data being retrieved in python, we have displayed the data in a user friendly manner using HTML, CSS and JavaScript</a:t>
+            </a:r>
+            <a:r>
+              <a:rPr lang="en-US" sz="2000" dirty="0" smtClean="0"/>
+              <a:t>. HTML</a:t>
             </a:r>
             <a:r>
               <a:rPr lang="en-US" sz="2000" dirty="0"/>
-              <a:t>, gives user the provision to give the input to the application by either selecting year, selecting genre, sliding the lower and upper bound of the IMDB Score etc. </a:t>
+              <a:t>, gives user the provision to give the input to the application by either selecting year, selecting genre, sliding the lower and upper bound of the </a:t>
+            </a:r>
+            <a:r>
+              <a:rPr lang="en-US" sz="2000" dirty="0" smtClean="0"/>
+              <a:t>IMDb Score range </a:t>
+            </a:r>
+            <a:r>
+              <a:rPr lang="en-US" sz="2000" dirty="0"/>
+              <a:t>etc. </a:t>
             </a:r>
             <a:endParaRPr lang="en-US" sz="2000" dirty="0" smtClean="0"/>
           </a:p>
           <a:p>
             <a:pPr algn="just"/>
             <a:r>
+              <a:rPr lang="en-US" sz="2000" b="1" dirty="0" smtClean="0"/>
+              <a:t>Backend: </a:t>
+            </a:r>
+            <a:r>
               <a:rPr lang="en-US" sz="2000" dirty="0" smtClean="0"/>
-              <a:t>Backend: we have used </a:t>
+              <a:t>we have used </a:t>
             </a:r>
             <a:r>
               <a:rPr lang="en-US" sz="2000" dirty="0"/>
@@ -6993,8 +7434,12 @@
           <a:p>
             <a:pPr algn="just"/>
             <a:r>
+              <a:rPr lang="en-US" sz="2000" b="1" dirty="0" smtClean="0"/>
+              <a:t>Middleware: </a:t>
+            </a:r>
+            <a:r>
               <a:rPr lang="en-US" sz="2000" dirty="0" smtClean="0"/>
-              <a:t>Middleware: To wrap the whole project and create a connection we have used micro-framework “</a:t>
+              <a:t>To wrap the whole project and create a connection we have used micro-framework “</a:t>
             </a:r>
             <a:r>
               <a:rPr lang="en-US" sz="2000" b="1" dirty="0" smtClean="0"/>
@@ -7010,12 +7455,12 @@
       </p:sp>
       <p:sp>
         <p:nvSpPr>
-          <p:cNvPr id="6" name="Footer Placeholder 5"/>
-          <p:cNvSpPr>
-            <a:spLocks noGrp="1"/>
-          </p:cNvSpPr>
-          <p:nvPr>
-            <p:ph type="ftr" sz="quarter" idx="11"/>
+          <p:cNvPr id="4" name="Date Placeholder 3"/>
+          <p:cNvSpPr>
+            <a:spLocks noGrp="1"/>
+          </p:cNvSpPr>
+          <p:nvPr>
+            <p:ph type="dt" sz="half" idx="10"/>
           </p:nvPr>
         </p:nvSpPr>
         <p:spPr/>
@@ -7023,32 +7468,9 @@
           <a:bodyPr/>
           <a:lstStyle/>
           <a:p>
-            <a:r>
-              <a:rPr lang="en-US" smtClean="0"/>
-              <a:t>CS532 - Database System Project - 3 | IMDB Data Analysis</a:t>
-            </a:r>
-            <a:endParaRPr lang="en-US" dirty="0"/>
-          </a:p>
-        </p:txBody>
-      </p:sp>
-      <p:sp>
-        <p:nvSpPr>
-          <p:cNvPr id="7" name="Slide Number Placeholder 6"/>
-          <p:cNvSpPr>
-            <a:spLocks noGrp="1"/>
-          </p:cNvSpPr>
-          <p:nvPr>
-            <p:ph type="sldNum" sz="quarter" idx="12"/>
-          </p:nvPr>
-        </p:nvSpPr>
-        <p:spPr/>
-        <p:txBody>
-          <a:bodyPr/>
-          <a:lstStyle/>
-          <a:p>
-            <a:fld id="{401CF334-2D5C-4859-84A6-CA7E6E43FAEB}" type="slidenum">
-              <a:rPr lang="en-US" smtClean="0"/>
-              <a:t>3</a:t>
+            <a:fld id="{574201E7-2D91-4E48-8CA5-C2E9EEB90228}" type="datetime1">
+              <a:rPr lang="en-US" smtClean="0"/>
+              <a:t>4/24/2020</a:t>
             </a:fld>
             <a:endParaRPr lang="en-US"/>
           </a:p>
@@ -7056,12 +7478,12 @@
       </p:sp>
       <p:sp>
         <p:nvSpPr>
-          <p:cNvPr id="8" name="Date Placeholder 7"/>
-          <p:cNvSpPr>
-            <a:spLocks noGrp="1"/>
-          </p:cNvSpPr>
-          <p:nvPr>
-            <p:ph type="dt" sz="half" idx="10"/>
+          <p:cNvPr id="5" name="Footer Placeholder 4"/>
+          <p:cNvSpPr>
+            <a:spLocks noGrp="1"/>
+          </p:cNvSpPr>
+          <p:nvPr>
+            <p:ph type="ftr" sz="quarter" idx="11"/>
           </p:nvPr>
         </p:nvSpPr>
         <p:spPr/>
@@ -7069,9 +7491,32 @@
           <a:bodyPr/>
           <a:lstStyle/>
           <a:p>
-            <a:fld id="{E2D52A79-7C7D-4B80-A73D-C719B728589D}" type="datetime1">
-              <a:rPr lang="en-US" smtClean="0"/>
-              <a:t>4/23/2020</a:t>
+            <a:r>
+              <a:rPr lang="en-US" smtClean="0"/>
+              <a:t>CS532 - Database System Project - 3 | IMDB Data Analysis</a:t>
+            </a:r>
+            <a:endParaRPr lang="en-US" dirty="0"/>
+          </a:p>
+        </p:txBody>
+      </p:sp>
+      <p:sp>
+        <p:nvSpPr>
+          <p:cNvPr id="9" name="Slide Number Placeholder 8"/>
+          <p:cNvSpPr>
+            <a:spLocks noGrp="1"/>
+          </p:cNvSpPr>
+          <p:nvPr>
+            <p:ph type="sldNum" sz="quarter" idx="12"/>
+          </p:nvPr>
+        </p:nvSpPr>
+        <p:spPr/>
+        <p:txBody>
+          <a:bodyPr/>
+          <a:lstStyle/>
+          <a:p>
+            <a:fld id="{401CF334-2D5C-4859-84A6-CA7E6E43FAEB}" type="slidenum">
+              <a:rPr lang="en-US" smtClean="0"/>
+              <a:t>3</a:t>
             </a:fld>
             <a:endParaRPr lang="en-US"/>
           </a:p>
@@ -7180,28 +7625,88 @@
             </a:r>
             <a:r>
               <a:rPr lang="en-US" sz="2000" dirty="0"/>
-              <a:t>have done following things to clean and purify the data: </a:t>
+              <a:t>have done following things to clean and purify the </a:t>
+            </a:r>
+            <a:r>
+              <a:rPr lang="en-US" sz="2000" dirty="0" smtClean="0"/>
+              <a:t>data so that all the results are proper and valid: </a:t>
             </a:r>
             <a:endParaRPr lang="en-IN" sz="2000" dirty="0"/>
           </a:p>
           <a:p>
             <a:r>
               <a:rPr lang="en-US" sz="2000" dirty="0"/>
-              <a:t>For the Null values in the column with Number as Data type, we have filled it with Average of the column. </a:t>
+              <a:t>For the Null values in the column with </a:t>
+            </a:r>
+            <a:r>
+              <a:rPr lang="en-US" sz="2000" dirty="0" smtClean="0"/>
+              <a:t>number </a:t>
+            </a:r>
+            <a:r>
+              <a:rPr lang="en-US" sz="2000" dirty="0"/>
+              <a:t>as </a:t>
+            </a:r>
+            <a:r>
+              <a:rPr lang="en-US" sz="2000" dirty="0" smtClean="0"/>
+              <a:t>datatype</a:t>
+            </a:r>
+            <a:r>
+              <a:rPr lang="en-US" sz="2000" dirty="0"/>
+              <a:t>, we have filled it with </a:t>
+            </a:r>
+            <a:r>
+              <a:rPr lang="en-US" sz="2000" dirty="0" smtClean="0"/>
+              <a:t>average </a:t>
+            </a:r>
+            <a:r>
+              <a:rPr lang="en-US" sz="2000" dirty="0"/>
+              <a:t>of </a:t>
+            </a:r>
+            <a:r>
+              <a:rPr lang="en-US" sz="2000" dirty="0" smtClean="0"/>
+              <a:t>that column</a:t>
+            </a:r>
+            <a:r>
+              <a:rPr lang="en-US" sz="2000" dirty="0"/>
+              <a:t>. </a:t>
             </a:r>
             <a:endParaRPr lang="en-IN" sz="2000" dirty="0"/>
           </a:p>
           <a:p>
             <a:r>
               <a:rPr lang="en-US" sz="2000" dirty="0"/>
-              <a:t>For the Columns of Revenue, we have generated the random number between the specific ranges to fill out null values. </a:t>
+              <a:t>For the </a:t>
+            </a:r>
+            <a:r>
+              <a:rPr lang="en-US" sz="2000" dirty="0" smtClean="0"/>
+              <a:t>columns </a:t>
+            </a:r>
+            <a:r>
+              <a:rPr lang="en-US" sz="2000" dirty="0"/>
+              <a:t>of </a:t>
+            </a:r>
+            <a:r>
+              <a:rPr lang="en-US" sz="2000" dirty="0" smtClean="0"/>
+              <a:t>consisting of data related to r</a:t>
+            </a:r>
+            <a:r>
+              <a:rPr lang="en-US" sz="2000" dirty="0" smtClean="0"/>
+              <a:t>evenue</a:t>
+            </a:r>
+            <a:r>
+              <a:rPr lang="en-US" sz="2000" dirty="0"/>
+              <a:t>, we have generated the random number between the specific ranges to fill out null values. </a:t>
             </a:r>
             <a:endParaRPr lang="en-IN" sz="2000" dirty="0"/>
           </a:p>
           <a:p>
             <a:r>
+              <a:rPr lang="en-US" sz="2000" dirty="0" smtClean="0"/>
+              <a:t>Excel formulas are used </a:t>
+            </a:r>
+            <a:r>
               <a:rPr lang="en-US" sz="2000" dirty="0"/>
-              <a:t>Use of Excel formulas to trim and remove the </a:t>
+              <a:t>to trim and remove the </a:t>
             </a:r>
             <a:r>
               <a:rPr lang="en-US" sz="2000" dirty="0" smtClean="0"/>
@@ -7209,33 +7714,49 @@
             </a:r>
             <a:r>
               <a:rPr lang="en-US" sz="2000" dirty="0"/>
-              <a:t>blanks spaces in between the words and at the end</a:t>
+              <a:t>blanks spaces in between the words and at the </a:t>
+            </a:r>
+            <a:r>
+              <a:rPr lang="en-US" sz="2000" dirty="0" smtClean="0"/>
+              <a:t>end of the word.</a:t>
+            </a:r>
+            <a:endParaRPr lang="en-IN" sz="2000" dirty="0"/>
+          </a:p>
+          <a:p>
+            <a:r>
+              <a:rPr lang="en-US" sz="2000" dirty="0"/>
+              <a:t>For null values in the columns with the string datatype we have </a:t>
+            </a:r>
+            <a:r>
+              <a:rPr lang="en-US" sz="2000" dirty="0" smtClean="0"/>
+              <a:t>replaced </a:t>
+            </a:r>
+            <a:r>
+              <a:rPr lang="en-US" sz="2000" dirty="0"/>
+              <a:t>it with </a:t>
+            </a:r>
+            <a:r>
+              <a:rPr lang="en-US" sz="2000" dirty="0" smtClean="0"/>
+              <a:t>dummy </a:t>
+            </a:r>
+            <a:r>
+              <a:rPr lang="en-US" sz="2000" dirty="0"/>
+              <a:t>string</a:t>
             </a:r>
             <a:r>
               <a:rPr lang="en-US" sz="2000" dirty="0" smtClean="0"/>
               <a:t>.</a:t>
             </a:r>
+            <a:endParaRPr lang="en-US" sz="2000" dirty="0"/>
+          </a:p>
+          <a:p>
             <a:endParaRPr lang="en-IN" sz="2000" dirty="0"/>
           </a:p>
-          <a:p>
-            <a:r>
-              <a:rPr lang="en-US" sz="2000" dirty="0"/>
-              <a:t>For null values in the columns with the string datatype we have replace it with the dummy string</a:t>
-            </a:r>
-            <a:r>
-              <a:rPr lang="en-US" sz="2000" dirty="0" smtClean="0"/>
-              <a:t>.</a:t>
-            </a:r>
-            <a:endParaRPr lang="en-US" sz="2000" dirty="0"/>
-          </a:p>
-          <a:p>
-            <a:endParaRPr lang="en-IN" sz="2000" dirty="0"/>
-          </a:p>
-        </p:txBody>
-      </p:sp>
-      <p:sp>
-        <p:nvSpPr>
-          <p:cNvPr id="4" name="Date Placeholder 3"/>
+        </p:txBody>
+      </p:sp>
+      <p:sp>
+        <p:nvSpPr>
+          <p:cNvPr id="7" name="Date Placeholder 6"/>
           <p:cNvSpPr>
             <a:spLocks noGrp="1"/>
           </p:cNvSpPr>
@@ -7248,9 +7769,9 @@
           <a:bodyPr/>
           <a:lstStyle/>
           <a:p>
-            <a:fld id="{6962C5E1-6D18-4673-85A9-B84F9A603C62}" type="datetime1">
-              <a:rPr lang="en-US" smtClean="0"/>
-              <a:t>4/23/2020</a:t>
+            <a:fld id="{8E3813F9-AF13-455A-9B73-0A379D46769D}" type="datetime1">
+              <a:rPr lang="en-US" smtClean="0"/>
+              <a:t>4/24/2020</a:t>
             </a:fld>
             <a:endParaRPr lang="en-US"/>
           </a:p>
@@ -7258,7 +7779,7 @@
       </p:sp>
       <p:sp>
         <p:nvSpPr>
-          <p:cNvPr id="5" name="Footer Placeholder 4"/>
+          <p:cNvPr id="8" name="Footer Placeholder 7"/>
           <p:cNvSpPr>
             <a:spLocks noGrp="1"/>
           </p:cNvSpPr>
@@ -7281,7 +7802,7 @@
       </p:sp>
       <p:sp>
         <p:nvSpPr>
-          <p:cNvPr id="6" name="Slide Number Placeholder 5"/>
+          <p:cNvPr id="9" name="Slide Number Placeholder 8"/>
           <p:cNvSpPr>
             <a:spLocks noGrp="1"/>
           </p:cNvSpPr>
@@ -7434,7 +7955,11 @@
             <a:pPr algn="just"/>
             <a:r>
               <a:rPr lang="en-US" sz="2000" dirty="0" smtClean="0"/>
-              <a:t>These operations is facilitated by the mongo query ‘</a:t>
+              <a:t>The search or select operation is </a:t>
+            </a:r>
+            <a:r>
+              <a:rPr lang="en-US" sz="2000" dirty="0" smtClean="0"/>
+              <a:t>facilitated by the mongo query ‘</a:t>
             </a:r>
             <a:r>
               <a:rPr lang="en-US" sz="2000" b="1" dirty="0" smtClean="0"/>
@@ -7442,28 +7967,16 @@
             </a:r>
             <a:r>
               <a:rPr lang="en-US" sz="2000" dirty="0" smtClean="0"/>
-              <a:t>’.</a:t>
-            </a:r>
+              <a:t>’ in a MongoDB.</a:t>
+            </a:r>
+            <a:endParaRPr lang="en-US" sz="2000" dirty="0" smtClean="0"/>
           </a:p>
           <a:p>
             <a:pPr algn="just"/>
             <a:r>
               <a:rPr lang="en-US" sz="2000" dirty="0" smtClean="0"/>
-              <a:t>Following </a:t>
-            </a:r>
-            <a:r>
-              <a:rPr lang="en-US" sz="2000" dirty="0" smtClean="0"/>
-              <a:t>slides describe the </a:t>
-            </a:r>
-            <a:r>
-              <a:rPr lang="en-US" sz="2000" dirty="0" smtClean="0"/>
-              <a:t>queries supported by this </a:t>
-            </a:r>
-            <a:r>
-              <a:rPr lang="en-US" sz="2000" dirty="0" smtClean="0"/>
-              <a:t>application</a:t>
-            </a:r>
-            <a:endParaRPr lang="en-US" sz="2000" dirty="0" smtClean="0"/>
+              <a:t>Following slides describe the queries supported by this application</a:t>
+            </a:r>
           </a:p>
           <a:p>
             <a:pPr marL="0" indent="0" algn="just">
@@ -7475,12 +7988,12 @@
       </p:sp>
       <p:sp>
         <p:nvSpPr>
-          <p:cNvPr id="6" name="Footer Placeholder 5"/>
-          <p:cNvSpPr>
-            <a:spLocks noGrp="1"/>
-          </p:cNvSpPr>
-          <p:nvPr>
-            <p:ph type="ftr" sz="quarter" idx="11"/>
+          <p:cNvPr id="4" name="Date Placeholder 3"/>
+          <p:cNvSpPr>
+            <a:spLocks noGrp="1"/>
+          </p:cNvSpPr>
+          <p:nvPr>
+            <p:ph type="dt" sz="half" idx="10"/>
           </p:nvPr>
         </p:nvSpPr>
         <p:spPr/>
@@ -7488,32 +8001,9 @@
           <a:bodyPr/>
           <a:lstStyle/>
           <a:p>
-            <a:r>
-              <a:rPr lang="en-US" smtClean="0"/>
-              <a:t>CS532 - Database System Project - 3 | IMDB Data Analysis</a:t>
-            </a:r>
-            <a:endParaRPr lang="en-US" dirty="0"/>
-          </a:p>
-        </p:txBody>
-      </p:sp>
-      <p:sp>
-        <p:nvSpPr>
-          <p:cNvPr id="7" name="Slide Number Placeholder 6"/>
-          <p:cNvSpPr>
-            <a:spLocks noGrp="1"/>
-          </p:cNvSpPr>
-          <p:nvPr>
-            <p:ph type="sldNum" sz="quarter" idx="12"/>
-          </p:nvPr>
-        </p:nvSpPr>
-        <p:spPr/>
-        <p:txBody>
-          <a:bodyPr/>
-          <a:lstStyle/>
-          <a:p>
-            <a:fld id="{401CF334-2D5C-4859-84A6-CA7E6E43FAEB}" type="slidenum">
-              <a:rPr lang="en-US" smtClean="0"/>
-              <a:t>5</a:t>
+            <a:fld id="{86D2231B-258F-4B39-A39F-B8BE42CCD0AF}" type="datetime1">
+              <a:rPr lang="en-US" smtClean="0"/>
+              <a:t>4/24/2020</a:t>
             </a:fld>
             <a:endParaRPr lang="en-US"/>
           </a:p>
@@ -7521,12 +8011,12 @@
       </p:sp>
       <p:sp>
         <p:nvSpPr>
-          <p:cNvPr id="8" name="Date Placeholder 7"/>
-          <p:cNvSpPr>
-            <a:spLocks noGrp="1"/>
-          </p:cNvSpPr>
-          <p:nvPr>
-            <p:ph type="dt" sz="half" idx="10"/>
+          <p:cNvPr id="5" name="Footer Placeholder 4"/>
+          <p:cNvSpPr>
+            <a:spLocks noGrp="1"/>
+          </p:cNvSpPr>
+          <p:nvPr>
+            <p:ph type="ftr" sz="quarter" idx="11"/>
           </p:nvPr>
         </p:nvSpPr>
         <p:spPr/>
@@ -7534,9 +8024,32 @@
           <a:bodyPr/>
           <a:lstStyle/>
           <a:p>
-            <a:fld id="{390AC118-7456-492B-801C-EBDCE8D827CC}" type="datetime1">
-              <a:rPr lang="en-US" smtClean="0"/>
-              <a:t>4/23/2020</a:t>
+            <a:r>
+              <a:rPr lang="en-US" smtClean="0"/>
+              <a:t>CS532 - Database System Project - 3 | IMDB Data Analysis</a:t>
+            </a:r>
+            <a:endParaRPr lang="en-US" dirty="0"/>
+          </a:p>
+        </p:txBody>
+      </p:sp>
+      <p:sp>
+        <p:nvSpPr>
+          <p:cNvPr id="9" name="Slide Number Placeholder 8"/>
+          <p:cNvSpPr>
+            <a:spLocks noGrp="1"/>
+          </p:cNvSpPr>
+          <p:nvPr>
+            <p:ph type="sldNum" sz="quarter" idx="12"/>
+          </p:nvPr>
+        </p:nvSpPr>
+        <p:spPr/>
+        <p:txBody>
+          <a:bodyPr/>
+          <a:lstStyle/>
+          <a:p>
+            <a:fld id="{401CF334-2D5C-4859-84A6-CA7E6E43FAEB}" type="slidenum">
+              <a:rPr lang="en-US" smtClean="0"/>
+              <a:t>5</a:t>
             </a:fld>
             <a:endParaRPr lang="en-US"/>
           </a:p>
@@ -7680,7 +8193,15 @@
             </a:r>
             <a:r>
               <a:rPr lang="en-US" sz="2000" dirty="0"/>
-              <a:t>” as an input from the user via a drop down menu. After he clicks submit, we fire a select query in the MongoDB Database to fetch all the movies released in that particular year. </a:t>
+              <a:t>” as an input from the user via </a:t>
+            </a:r>
+            <a:r>
+              <a:rPr lang="en-US" sz="2000" dirty="0" smtClean="0"/>
+              <a:t>drop </a:t>
+            </a:r>
+            <a:r>
+              <a:rPr lang="en-US" sz="2000" dirty="0"/>
+              <a:t>down menu. After he clicks submit, we fire a select query in the MongoDB Database to fetch all the movies released in that particular year. </a:t>
             </a:r>
           </a:p>
         </p:txBody>
@@ -7731,12 +8252,12 @@
       </p:pic>
       <p:sp>
         <p:nvSpPr>
-          <p:cNvPr id="7" name="Footer Placeholder 6"/>
-          <p:cNvSpPr>
-            <a:spLocks noGrp="1"/>
-          </p:cNvSpPr>
-          <p:nvPr>
-            <p:ph type="ftr" sz="quarter" idx="11"/>
+          <p:cNvPr id="4" name="Date Placeholder 3"/>
+          <p:cNvSpPr>
+            <a:spLocks noGrp="1"/>
+          </p:cNvSpPr>
+          <p:nvPr>
+            <p:ph type="dt" sz="half" idx="10"/>
           </p:nvPr>
         </p:nvSpPr>
         <p:spPr/>
@@ -7744,32 +8265,9 @@
           <a:bodyPr/>
           <a:lstStyle/>
           <a:p>
-            <a:r>
-              <a:rPr lang="en-US" smtClean="0"/>
-              <a:t>CS532 - Database System Project - 3 | IMDB Data Analysis</a:t>
-            </a:r>
-            <a:endParaRPr lang="en-US" dirty="0"/>
-          </a:p>
-        </p:txBody>
-      </p:sp>
-      <p:sp>
-        <p:nvSpPr>
-          <p:cNvPr id="8" name="Slide Number Placeholder 7"/>
-          <p:cNvSpPr>
-            <a:spLocks noGrp="1"/>
-          </p:cNvSpPr>
-          <p:nvPr>
-            <p:ph type="sldNum" sz="quarter" idx="12"/>
-          </p:nvPr>
-        </p:nvSpPr>
-        <p:spPr/>
-        <p:txBody>
-          <a:bodyPr/>
-          <a:lstStyle/>
-          <a:p>
-            <a:fld id="{401CF334-2D5C-4859-84A6-CA7E6E43FAEB}" type="slidenum">
-              <a:rPr lang="en-US" smtClean="0"/>
-              <a:t>6</a:t>
+            <a:fld id="{70F8495F-272E-42EC-A78B-83964073C9EE}" type="datetime1">
+              <a:rPr lang="en-US" smtClean="0"/>
+              <a:t>4/24/2020</a:t>
             </a:fld>
             <a:endParaRPr lang="en-US"/>
           </a:p>
@@ -7777,12 +8275,12 @@
       </p:sp>
       <p:sp>
         <p:nvSpPr>
-          <p:cNvPr id="9" name="Date Placeholder 8"/>
-          <p:cNvSpPr>
-            <a:spLocks noGrp="1"/>
-          </p:cNvSpPr>
-          <p:nvPr>
-            <p:ph type="dt" sz="half" idx="10"/>
+          <p:cNvPr id="6" name="Footer Placeholder 5"/>
+          <p:cNvSpPr>
+            <a:spLocks noGrp="1"/>
+          </p:cNvSpPr>
+          <p:nvPr>
+            <p:ph type="ftr" sz="quarter" idx="11"/>
           </p:nvPr>
         </p:nvSpPr>
         <p:spPr/>
@@ -7790,9 +8288,32 @@
           <a:bodyPr/>
           <a:lstStyle/>
           <a:p>
-            <a:fld id="{31982ADD-F0FA-4DBB-817F-97207B31F2BA}" type="datetime1">
-              <a:rPr lang="en-US" smtClean="0"/>
-              <a:t>4/23/2020</a:t>
+            <a:r>
+              <a:rPr lang="en-US" smtClean="0"/>
+              <a:t>CS532 - Database System Project - 3 | IMDB Data Analysis</a:t>
+            </a:r>
+            <a:endParaRPr lang="en-US" dirty="0"/>
+          </a:p>
+        </p:txBody>
+      </p:sp>
+      <p:sp>
+        <p:nvSpPr>
+          <p:cNvPr id="10" name="Slide Number Placeholder 9"/>
+          <p:cNvSpPr>
+            <a:spLocks noGrp="1"/>
+          </p:cNvSpPr>
+          <p:nvPr>
+            <p:ph type="sldNum" sz="quarter" idx="12"/>
+          </p:nvPr>
+        </p:nvSpPr>
+        <p:spPr/>
+        <p:txBody>
+          <a:bodyPr/>
+          <a:lstStyle/>
+          <a:p>
+            <a:fld id="{401CF334-2D5C-4859-84A6-CA7E6E43FAEB}" type="slidenum">
+              <a:rPr lang="en-US" smtClean="0"/>
+              <a:t>6</a:t>
             </a:fld>
             <a:endParaRPr lang="en-US"/>
           </a:p>
@@ -7871,11 +8392,7 @@
           <a:p>
             <a:r>
               <a:rPr lang="en-US" sz="2800" dirty="0" smtClean="0"/>
-              <a:t>Query </a:t>
-            </a:r>
-            <a:r>
-              <a:rPr lang="en-US" sz="2800" dirty="0" smtClean="0"/>
-              <a:t>2:</a:t>
+              <a:t>Query 2:</a:t>
             </a:r>
             <a:r>
               <a:rPr lang="en-US" sz="2800" dirty="0"/>
@@ -7888,7 +8405,6 @@
               <a:rPr lang="en-US" sz="2800" dirty="0"/>
               <a:t>List of movies based on genre</a:t>
             </a:r>
-            <a:endParaRPr lang="en-US" sz="2800" dirty="0"/>
           </a:p>
         </p:txBody>
       </p:sp>
@@ -7945,9 +8461,24 @@
             </a:r>
             <a:r>
               <a:rPr lang="en-US" sz="2000" dirty="0"/>
-              <a:t>” as an input from the user via a drop down menu. After he clicks submit, we fire a select query in the MongoDB database to fetch all the movies released in that particular year and search movies in that year based on genre. </a:t>
-            </a:r>
-            <a:endParaRPr lang="en-US" sz="2000" dirty="0"/>
+              <a:t>” as an input from the user </a:t>
+            </a:r>
+            <a:r>
+              <a:rPr lang="en-US" sz="2000" dirty="0" smtClean="0"/>
+              <a:t>via drop </a:t>
+            </a:r>
+            <a:r>
+              <a:rPr lang="en-US" sz="2000" dirty="0"/>
+              <a:t>down menu. After he clicks submit, we fire a select query in the MongoDB database to fetch all the movies released in that particular year and </a:t>
+            </a:r>
+            <a:r>
+              <a:rPr lang="en-US" sz="2000" dirty="0" smtClean="0"/>
+              <a:t>filter the movies </a:t>
+            </a:r>
+            <a:r>
+              <a:rPr lang="en-US" sz="2000" dirty="0"/>
+              <a:t>in that year based on genre. </a:t>
+            </a:r>
           </a:p>
         </p:txBody>
       </p:sp>
@@ -7997,12 +8528,12 @@
       </p:pic>
       <p:sp>
         <p:nvSpPr>
-          <p:cNvPr id="8" name="Footer Placeholder 7"/>
-          <p:cNvSpPr>
-            <a:spLocks noGrp="1"/>
-          </p:cNvSpPr>
-          <p:nvPr>
-            <p:ph type="ftr" sz="quarter" idx="11"/>
+          <p:cNvPr id="5" name="Date Placeholder 4"/>
+          <p:cNvSpPr>
+            <a:spLocks noGrp="1"/>
+          </p:cNvSpPr>
+          <p:nvPr>
+            <p:ph type="dt" sz="half" idx="10"/>
           </p:nvPr>
         </p:nvSpPr>
         <p:spPr/>
@@ -8010,32 +8541,9 @@
           <a:bodyPr/>
           <a:lstStyle/>
           <a:p>
-            <a:r>
-              <a:rPr lang="en-US" smtClean="0"/>
-              <a:t>CS532 - Database System Project - 3 | IMDB Data Analysis</a:t>
-            </a:r>
-            <a:endParaRPr lang="en-US" dirty="0"/>
-          </a:p>
-        </p:txBody>
-      </p:sp>
-      <p:sp>
-        <p:nvSpPr>
-          <p:cNvPr id="9" name="Slide Number Placeholder 8"/>
-          <p:cNvSpPr>
-            <a:spLocks noGrp="1"/>
-          </p:cNvSpPr>
-          <p:nvPr>
-            <p:ph type="sldNum" sz="quarter" idx="12"/>
-          </p:nvPr>
-        </p:nvSpPr>
-        <p:spPr/>
-        <p:txBody>
-          <a:bodyPr/>
-          <a:lstStyle/>
-          <a:p>
-            <a:fld id="{401CF334-2D5C-4859-84A6-CA7E6E43FAEB}" type="slidenum">
-              <a:rPr lang="en-US" smtClean="0"/>
-              <a:t>7</a:t>
+            <a:fld id="{D9D85EE8-B9B6-4705-A6D2-7DF8365859EE}" type="datetime1">
+              <a:rPr lang="en-US" smtClean="0"/>
+              <a:t>4/24/2020</a:t>
             </a:fld>
             <a:endParaRPr lang="en-US"/>
           </a:p>
@@ -8043,12 +8551,12 @@
       </p:sp>
       <p:sp>
         <p:nvSpPr>
-          <p:cNvPr id="10" name="Date Placeholder 9"/>
-          <p:cNvSpPr>
-            <a:spLocks noGrp="1"/>
-          </p:cNvSpPr>
-          <p:nvPr>
-            <p:ph type="dt" sz="half" idx="10"/>
+          <p:cNvPr id="6" name="Footer Placeholder 5"/>
+          <p:cNvSpPr>
+            <a:spLocks noGrp="1"/>
+          </p:cNvSpPr>
+          <p:nvPr>
+            <p:ph type="ftr" sz="quarter" idx="11"/>
           </p:nvPr>
         </p:nvSpPr>
         <p:spPr/>
@@ -8056,9 +8564,32 @@
           <a:bodyPr/>
           <a:lstStyle/>
           <a:p>
-            <a:fld id="{3B319C02-F2E5-45B7-89A7-029BAB0ED498}" type="datetime1">
-              <a:rPr lang="en-US" smtClean="0"/>
-              <a:t>4/23/2020</a:t>
+            <a:r>
+              <a:rPr lang="en-US" smtClean="0"/>
+              <a:t>CS532 - Database System Project - 3 | IMDB Data Analysis</a:t>
+            </a:r>
+            <a:endParaRPr lang="en-US" dirty="0"/>
+          </a:p>
+        </p:txBody>
+      </p:sp>
+      <p:sp>
+        <p:nvSpPr>
+          <p:cNvPr id="7" name="Slide Number Placeholder 6"/>
+          <p:cNvSpPr>
+            <a:spLocks noGrp="1"/>
+          </p:cNvSpPr>
+          <p:nvPr>
+            <p:ph type="sldNum" sz="quarter" idx="12"/>
+          </p:nvPr>
+        </p:nvSpPr>
+        <p:spPr/>
+        <p:txBody>
+          <a:bodyPr/>
+          <a:lstStyle/>
+          <a:p>
+            <a:fld id="{401CF334-2D5C-4859-84A6-CA7E6E43FAEB}" type="slidenum">
+              <a:rPr lang="en-US" smtClean="0"/>
+              <a:t>7</a:t>
             </a:fld>
             <a:endParaRPr lang="en-US"/>
           </a:p>
@@ -8115,7 +8646,7 @@
       </p:grpSpPr>
       <p:sp>
         <p:nvSpPr>
-          <p:cNvPr id="3" name="Title 2"/>
+          <p:cNvPr id="2" name="Title 1"/>
           <p:cNvSpPr>
             <a:spLocks noGrp="1"/>
           </p:cNvSpPr>
@@ -8123,12 +8654,7 @@
             <p:ph type="title"/>
           </p:nvPr>
         </p:nvSpPr>
-        <p:spPr>
-          <a:xfrm>
-            <a:off x="609600" y="665783"/>
-            <a:ext cx="10972800" cy="1143000"/>
-          </a:xfrm>
-        </p:spPr>
+        <p:spPr/>
         <p:txBody>
           <a:bodyPr>
             <a:noAutofit/>
@@ -8136,85 +8662,79 @@
           <a:lstStyle/>
           <a:p>
             <a:r>
-              <a:rPr lang="en-US" sz="2800" dirty="0" smtClean="0"/>
-              <a:t>Query </a:t>
-            </a:r>
-            <a:r>
               <a:rPr lang="en-US" sz="2800" dirty="0"/>
-              <a:t>3</a:t>
-            </a:r>
-            <a:r>
-              <a:rPr lang="en-US" sz="2800" dirty="0" smtClean="0"/>
-              <a:t>:</a:t>
-            </a:r>
-            <a:r>
-              <a:rPr lang="en-US" sz="2800" dirty="0"/>
-              <a:t/>
+              <a:t>Query 3:</a:t>
             </a:r>
             <a:br>
               <a:rPr lang="en-US" sz="2800" dirty="0"/>
             </a:br>
             <a:r>
               <a:rPr lang="en-US" sz="2800" dirty="0"/>
-              <a:t>List of actors and number of movies starred by the actor</a:t>
-            </a:r>
-            <a:endParaRPr lang="en-US" sz="2800" dirty="0"/>
-          </a:p>
-        </p:txBody>
-      </p:sp>
-      <p:sp>
-        <p:nvSpPr>
-          <p:cNvPr id="2" name="Content Placeholder 1"/>
-          <p:cNvSpPr>
-            <a:spLocks noGrp="1"/>
-          </p:cNvSpPr>
-          <p:nvPr>
-            <p:ph idx="1"/>
-          </p:nvPr>
-        </p:nvSpPr>
-        <p:spPr>
-          <a:xfrm>
-            <a:off x="609600" y="1808783"/>
-            <a:ext cx="10972800" cy="1567574"/>
-          </a:xfrm>
-        </p:spPr>
+              <a:t>List of actors and number of movies starred by </a:t>
+            </a:r>
+            <a:r>
+              <a:rPr lang="en-US" sz="2800" dirty="0" smtClean="0"/>
+              <a:t>that </a:t>
+            </a:r>
+            <a:r>
+              <a:rPr lang="en-US" sz="2800" dirty="0"/>
+              <a:t>actor</a:t>
+            </a:r>
+            <a:endParaRPr lang="en-IN" sz="2400" dirty="0"/>
+          </a:p>
+        </p:txBody>
+      </p:sp>
+      <p:sp>
+        <p:nvSpPr>
+          <p:cNvPr id="3" name="Content Placeholder 2"/>
+          <p:cNvSpPr>
+            <a:spLocks noGrp="1"/>
+          </p:cNvSpPr>
+          <p:nvPr>
+            <p:ph sz="half" idx="1"/>
+          </p:nvPr>
+        </p:nvSpPr>
+        <p:spPr/>
         <p:txBody>
           <a:bodyPr>
-            <a:normAutofit fontScale="92500" lnSpcReduction="10000"/>
+            <a:normAutofit/>
           </a:bodyPr>
           <a:lstStyle/>
           <a:p>
             <a:pPr algn="just"/>
             <a:r>
               <a:rPr lang="en-US" sz="2000" dirty="0"/>
-              <a:t>This query help us to list the all actors and number of movies they starred in the tabular format. </a:t>
-            </a:r>
-            <a:endParaRPr lang="en-US" sz="2000" dirty="0" smtClean="0"/>
+              <a:t>This query help us to list the all actors and </a:t>
+            </a:r>
+            <a:r>
+              <a:rPr lang="en-US" sz="2000" dirty="0" smtClean="0"/>
+              <a:t>get the count of number </a:t>
+            </a:r>
+            <a:r>
+              <a:rPr lang="en-US" sz="2000" dirty="0"/>
+              <a:t>of movies they </a:t>
+            </a:r>
+            <a:r>
+              <a:rPr lang="en-US" sz="2000" dirty="0" smtClean="0"/>
+              <a:t>have starred, </a:t>
+            </a:r>
+            <a:r>
+              <a:rPr lang="en-US" sz="2000" dirty="0"/>
+              <a:t>in the tabular format. </a:t>
+            </a:r>
           </a:p>
           <a:p>
             <a:pPr algn="just"/>
             <a:r>
-              <a:rPr lang="en-US" sz="2000" dirty="0" smtClean="0"/>
-              <a:t>We </a:t>
-            </a:r>
-            <a:r>
               <a:rPr lang="en-US" sz="2000" dirty="0"/>
-              <a:t>fire a select query in the MongoDB database to fetch all the actors from the dataset, we have 3 columns for the name of </a:t>
-            </a:r>
-            <a:r>
-              <a:rPr lang="en-US" sz="2000" dirty="0" smtClean="0"/>
-              <a:t>actors. </a:t>
+              <a:t>We fire a select query in the MongoDB database to fetch all the actors from the dataset, we have 3 columns for the name of actors. </a:t>
             </a:r>
           </a:p>
           <a:p>
             <a:pPr algn="just"/>
             <a:r>
-              <a:rPr lang="en-US" sz="2000" dirty="0" smtClean="0"/>
-              <a:t>Firstly, </a:t>
-            </a:r>
-            <a:r>
               <a:rPr lang="en-US" sz="2000" dirty="0"/>
-              <a:t>we get all the actors and then we count the number of movies they starred in to get the actual count. </a:t>
+              <a:t>Firstly, we get all the actors and then we count the number of movies they starred in to get the actual count. </a:t>
             </a:r>
             <a:endParaRPr lang="en-US" sz="2000" dirty="0"/>
           </a:p>
@@ -8222,14 +8742,16 @@
       </p:sp>
       <p:pic>
         <p:nvPicPr>
-          <p:cNvPr id="5" name="Picture 4"/>
+          <p:cNvPr id="6" name="Content Placeholder 5"/>
           <p:cNvPicPr>
-            <a:picLocks noChangeAspect="1"/>
+            <a:picLocks noGrp="1" noChangeAspect="1"/>
           </p:cNvPicPr>
-          <p:nvPr/>
+          <p:nvPr>
+            <p:ph sz="half" idx="2"/>
+          </p:nvPr>
         </p:nvPicPr>
         <p:blipFill>
-          <a:blip r:embed="rId2">
+          <a:blip r:embed="rId2" cstate="print">
             <a:extLst>
               <a:ext uri="{28A0092B-C50C-407E-A947-70E740481C1C}">
                 <a14:useLocalDpi xmlns:a14="http://schemas.microsoft.com/office/drawing/2010/main" val="0"/>
@@ -8242,8 +8764,8 @@
         </p:blipFill>
         <p:spPr>
           <a:xfrm>
-            <a:off x="2308359" y="3376357"/>
-            <a:ext cx="7686541" cy="2967068"/>
+            <a:off x="6596984" y="1920875"/>
+            <a:ext cx="4586031" cy="4433888"/>
           </a:xfrm>
           <a:prstGeom prst="rect">
             <a:avLst/>
@@ -8266,7 +8788,30 @@
       </p:pic>
       <p:sp>
         <p:nvSpPr>
-          <p:cNvPr id="8" name="Footer Placeholder 7"/>
+          <p:cNvPr id="7" name="Date Placeholder 6"/>
+          <p:cNvSpPr>
+            <a:spLocks noGrp="1"/>
+          </p:cNvSpPr>
+          <p:nvPr>
+            <p:ph type="dt" sz="half" idx="10"/>
+          </p:nvPr>
+        </p:nvSpPr>
+        <p:spPr/>
+        <p:txBody>
+          <a:bodyPr/>
+          <a:lstStyle/>
+          <a:p>
+            <a:fld id="{2036F581-1E20-4060-9CCD-EBA3CCC4EA5F}" type="datetime1">
+              <a:rPr lang="en-US" smtClean="0"/>
+              <a:t>4/24/2020</a:t>
+            </a:fld>
+            <a:endParaRPr lang="en-US"/>
+          </a:p>
+        </p:txBody>
+      </p:sp>
+      <p:sp>
+        <p:nvSpPr>
+          <p:cNvPr id="11" name="Footer Placeholder 10"/>
           <p:cNvSpPr>
             <a:spLocks noGrp="1"/>
           </p:cNvSpPr>
@@ -8289,7 +8834,7 @@
       </p:sp>
       <p:sp>
         <p:nvSpPr>
-          <p:cNvPr id="9" name="Slide Number Placeholder 8"/>
+          <p:cNvPr id="12" name="Slide Number Placeholder 11"/>
           <p:cNvSpPr>
             <a:spLocks noGrp="1"/>
           </p:cNvSpPr>
@@ -8310,33 +8855,10 @@
           </a:p>
         </p:txBody>
       </p:sp>
-      <p:sp>
-        <p:nvSpPr>
-          <p:cNvPr id="10" name="Date Placeholder 9"/>
-          <p:cNvSpPr>
-            <a:spLocks noGrp="1"/>
-          </p:cNvSpPr>
-          <p:nvPr>
-            <p:ph type="dt" sz="half" idx="10"/>
-          </p:nvPr>
-        </p:nvSpPr>
-        <p:spPr/>
-        <p:txBody>
-          <a:bodyPr/>
-          <a:lstStyle/>
-          <a:p>
-            <a:fld id="{A434FC06-D5C2-41A0-B390-14CDDE16EBA5}" type="datetime1">
-              <a:rPr lang="en-US" smtClean="0"/>
-              <a:t>4/23/2020</a:t>
-            </a:fld>
-            <a:endParaRPr lang="en-US"/>
-          </a:p>
-        </p:txBody>
-      </p:sp>
     </p:spTree>
     <p:extLst>
       <p:ext uri="{BB962C8B-B14F-4D97-AF65-F5344CB8AC3E}">
-        <p14:creationId xmlns:p14="http://schemas.microsoft.com/office/powerpoint/2010/main" val="1629039456"/>
+        <p14:creationId xmlns:p14="http://schemas.microsoft.com/office/powerpoint/2010/main" val="3131279299"/>
       </p:ext>
     </p:extLst>
   </p:cSld>
@@ -8355,13 +8877,6 @@
       </p:transition>
     </mc:Fallback>
   </mc:AlternateContent>
-  <p:timing>
-    <p:tnLst>
-      <p:par>
-        <p:cTn id="1" dur="indefinite" restart="never" nodeType="tmRoot"/>
-      </p:par>
-    </p:tnLst>
-  </p:timing>
 </p:sld>
 </file>
 
@@ -8432,10 +8947,6 @@
           <a:lstStyle/>
           <a:p>
             <a:pPr algn="just"/>
-            <a:endParaRPr lang="en-US" sz="2000" dirty="0" smtClean="0"/>
-          </a:p>
-          <a:p>
-            <a:pPr algn="just"/>
             <a:r>
               <a:rPr lang="en-US" sz="2000" dirty="0" smtClean="0"/>
               <a:t>With </a:t>
@@ -8449,14 +8960,30 @@
             <a:pPr algn="just"/>
             <a:r>
               <a:rPr lang="en-US" sz="2000" dirty="0"/>
-              <a:t>We take the “year” as an input from the user via a drop down menu. </a:t>
+              <a:t>We take the “</a:t>
+            </a:r>
+            <a:r>
+              <a:rPr lang="en-US" sz="2000" b="1" dirty="0"/>
+              <a:t>year</a:t>
+            </a:r>
+            <a:r>
+              <a:rPr lang="en-US" sz="2000" dirty="0"/>
+              <a:t>” as an input from the user via a drop down menu. </a:t>
             </a:r>
           </a:p>
           <a:p>
             <a:pPr algn="just"/>
             <a:r>
               <a:rPr lang="en-US" sz="2000" dirty="0"/>
-              <a:t>We fire a select query in the MongoDB database to fetch all the movies released in that particular year and select the only top 10 of them and give a graph in a user friendly format. We select the top 10 movies based on the IMDB score that we have for the movie in the dataset. </a:t>
+              <a:t>We fire a select query in the MongoDB database to fetch all the movies released in that particular year and select the only top 10 of them and give a graph in a user friendly format. We select the top 10 movies based on the </a:t>
+            </a:r>
+            <a:r>
+              <a:rPr lang="en-US" sz="2000" dirty="0" smtClean="0"/>
+              <a:t>IMDb </a:t>
+            </a:r>
+            <a:r>
+              <a:rPr lang="en-US" sz="2000" dirty="0"/>
+              <a:t>score that we have for the movie in the dataset. </a:t>
             </a:r>
           </a:p>
           <a:p>
@@ -8513,7 +9040,30 @@
       </p:pic>
       <p:sp>
         <p:nvSpPr>
-          <p:cNvPr id="8" name="Footer Placeholder 7"/>
+          <p:cNvPr id="4" name="Date Placeholder 3"/>
+          <p:cNvSpPr>
+            <a:spLocks noGrp="1"/>
+          </p:cNvSpPr>
+          <p:nvPr>
+            <p:ph type="dt" sz="half" idx="10"/>
+          </p:nvPr>
+        </p:nvSpPr>
+        <p:spPr/>
+        <p:txBody>
+          <a:bodyPr/>
+          <a:lstStyle/>
+          <a:p>
+            <a:fld id="{E9799C96-3132-4768-847E-1CC4894B1768}" type="datetime1">
+              <a:rPr lang="en-US" smtClean="0"/>
+              <a:t>4/24/2020</a:t>
+            </a:fld>
+            <a:endParaRPr lang="en-US"/>
+          </a:p>
+        </p:txBody>
+      </p:sp>
+      <p:sp>
+        <p:nvSpPr>
+          <p:cNvPr id="6" name="Footer Placeholder 5"/>
           <p:cNvSpPr>
             <a:spLocks noGrp="1"/>
           </p:cNvSpPr>
@@ -8536,7 +9086,7 @@
       </p:sp>
       <p:sp>
         <p:nvSpPr>
-          <p:cNvPr id="9" name="Slide Number Placeholder 8"/>
+          <p:cNvPr id="7" name="Slide Number Placeholder 6"/>
           <p:cNvSpPr>
             <a:spLocks noGrp="1"/>
           </p:cNvSpPr>
@@ -8557,33 +9107,10 @@
           </a:p>
         </p:txBody>
       </p:sp>
-      <p:sp>
-        <p:nvSpPr>
-          <p:cNvPr id="10" name="Date Placeholder 9"/>
-          <p:cNvSpPr>
-            <a:spLocks noGrp="1"/>
-          </p:cNvSpPr>
-          <p:nvPr>
-            <p:ph type="dt" sz="half" idx="10"/>
-          </p:nvPr>
-        </p:nvSpPr>
-        <p:spPr/>
-        <p:txBody>
-          <a:bodyPr/>
-          <a:lstStyle/>
-          <a:p>
-            <a:fld id="{D2D2B03B-3ED3-4FD4-B020-613C4959E7E1}" type="datetime1">
-              <a:rPr lang="en-US" smtClean="0"/>
-              <a:t>4/23/2020</a:t>
-            </a:fld>
-            <a:endParaRPr lang="en-US"/>
-          </a:p>
-        </p:txBody>
-      </p:sp>
     </p:spTree>
     <p:extLst>
       <p:ext uri="{BB962C8B-B14F-4D97-AF65-F5344CB8AC3E}">
-        <p14:creationId xmlns:p14="http://schemas.microsoft.com/office/powerpoint/2010/main" val="3131279299"/>
+        <p14:creationId xmlns:p14="http://schemas.microsoft.com/office/powerpoint/2010/main" val="627885782"/>
       </p:ext>
     </p:extLst>
   </p:cSld>

</xml_diff>

<commit_message>
finalized Presentation file to upload
</commit_message>
<xml_diff>
--- a/Project-03/docs/saraf-yudhoatmojo_Presentation.pptx
+++ b/Project-03/docs/saraf-yudhoatmojo_Presentation.pptx
@@ -128,6 +128,9 @@
     <p:ext uri="{EFAFB233-063F-42B5-8137-9DF3F51BA10A}">
       <p15:sldGuideLst xmlns:p15="http://schemas.microsoft.com/office/powerpoint/2012/main"/>
     </p:ext>
+    <p:ext uri="{2D200454-40CA-4A62-9FC3-DE9A4176ACB9}">
+      <p15:notesGuideLst xmlns:p15="http://schemas.microsoft.com/office/powerpoint/2012/main"/>
+    </p:ext>
   </p:extLst>
 </p:presentation>
 </file>
@@ -218,7 +221,7 @@
           <a:p>
             <a:fld id="{4F6186B4-3FB3-46D6-874B-58076C6098A9}" type="datetime1">
               <a:rPr lang="en-US" smtClean="0"/>
-              <a:t>4/26/2020</a:t>
+              <a:t>4/29/2020</a:t>
             </a:fld>
             <a:endParaRPr lang="en-IN"/>
           </a:p>
@@ -392,7 +395,7 @@
           <a:p>
             <a:fld id="{0665733B-B9B5-4E83-8951-1FFECEAB30DF}" type="datetime1">
               <a:rPr lang="en-US" smtClean="0"/>
-              <a:t>4/26/2020</a:t>
+              <a:t>4/29/2020</a:t>
             </a:fld>
             <a:endParaRPr lang="en-US"/>
           </a:p>
@@ -1163,7 +1166,7 @@
           <a:p>
             <a:fld id="{C0D4128C-B8E9-47D1-8DE0-24EA99F27F0A}" type="datetime1">
               <a:rPr lang="en-US" smtClean="0"/>
-              <a:t>4/26/2020</a:t>
+              <a:t>4/29/2020</a:t>
             </a:fld>
             <a:endParaRPr lang="en-US"/>
           </a:p>
@@ -1349,7 +1352,7 @@
           <a:p>
             <a:fld id="{09981723-2B87-454E-A014-B98B1D82C799}" type="datetime1">
               <a:rPr lang="en-US" smtClean="0"/>
-              <a:t>4/26/2020</a:t>
+              <a:t>4/29/2020</a:t>
             </a:fld>
             <a:endParaRPr lang="en-US"/>
           </a:p>
@@ -1545,7 +1548,7 @@
           <a:p>
             <a:fld id="{3CA06807-7B99-4354-9869-6A6DA32E8684}" type="datetime1">
               <a:rPr lang="en-US" smtClean="0"/>
-              <a:t>4/26/2020</a:t>
+              <a:t>4/29/2020</a:t>
             </a:fld>
             <a:endParaRPr lang="en-US"/>
           </a:p>
@@ -1731,7 +1734,7 @@
           <a:p>
             <a:fld id="{0A6783A3-C3FD-4578-80AB-7B6E59F46289}" type="datetime1">
               <a:rPr lang="en-US" smtClean="0"/>
-              <a:t>4/26/2020</a:t>
+              <a:t>4/29/2020</a:t>
             </a:fld>
             <a:endParaRPr lang="en-US"/>
           </a:p>
@@ -1980,7 +1983,7 @@
           <a:p>
             <a:fld id="{AE659408-5014-4FA5-B9F5-BD3DE31FB4A2}" type="datetime1">
               <a:rPr lang="en-US" smtClean="0"/>
-              <a:t>4/26/2020</a:t>
+              <a:t>4/29/2020</a:t>
             </a:fld>
             <a:endParaRPr lang="en-US"/>
           </a:p>
@@ -2265,7 +2268,7 @@
           <a:p>
             <a:fld id="{9AA76B7E-222D-45A7-BAD6-169BDA6CA23A}" type="datetime1">
               <a:rPr lang="en-US" smtClean="0"/>
-              <a:t>4/26/2020</a:t>
+              <a:t>4/29/2020</a:t>
             </a:fld>
             <a:endParaRPr lang="en-US"/>
           </a:p>
@@ -2664,7 +2667,7 @@
           <a:p>
             <a:fld id="{42883884-83F4-46C5-B4D3-C0D13F7262C5}" type="datetime1">
               <a:rPr lang="en-US" smtClean="0"/>
-              <a:t>4/26/2020</a:t>
+              <a:t>4/29/2020</a:t>
             </a:fld>
             <a:endParaRPr lang="en-US"/>
           </a:p>
@@ -2835,7 +2838,7 @@
           <a:p>
             <a:fld id="{9350B137-7A2B-4D2D-869F-B6C115E987F3}" type="datetime1">
               <a:rPr lang="en-US" smtClean="0"/>
-              <a:t>4/26/2020</a:t>
+              <a:t>4/29/2020</a:t>
             </a:fld>
             <a:endParaRPr lang="en-US"/>
           </a:p>
@@ -2946,7 +2949,7 @@
           <a:p>
             <a:fld id="{83A71A27-7B97-4708-A97E-140C76AA9D40}" type="datetime1">
               <a:rPr lang="en-US" smtClean="0"/>
-              <a:t>4/26/2020</a:t>
+              <a:t>4/29/2020</a:t>
             </a:fld>
             <a:endParaRPr lang="en-US"/>
           </a:p>
@@ -3228,7 +3231,7 @@
           <a:p>
             <a:fld id="{0017520E-B78D-4C38-B0C9-4C0F499751B4}" type="datetime1">
               <a:rPr lang="en-US" smtClean="0"/>
-              <a:t>4/26/2020</a:t>
+              <a:t>4/29/2020</a:t>
             </a:fld>
             <a:endParaRPr lang="en-US"/>
           </a:p>
@@ -3583,7 +3586,7 @@
           <a:p>
             <a:fld id="{11305D97-2459-46A2-B942-BB1E0A50733A}" type="datetime1">
               <a:rPr lang="en-US" smtClean="0"/>
-              <a:t>4/26/2020</a:t>
+              <a:t>4/29/2020</a:t>
             </a:fld>
             <a:endParaRPr lang="en-US"/>
           </a:p>
@@ -4617,7 +4620,7 @@
           <a:p>
             <a:fld id="{9F377E4A-ED13-4D26-8C93-0036F8381BB5}" type="datetime1">
               <a:rPr lang="en-US" smtClean="0"/>
-              <a:t>4/26/2020</a:t>
+              <a:t>4/29/2020</a:t>
             </a:fld>
             <a:endParaRPr lang="en-US" dirty="0"/>
           </a:p>
@@ -5151,7 +5154,7 @@
           <a:p>
             <a:fld id="{7B14216D-831D-4088-B04A-51E7E29755E3}" type="datetime1">
               <a:rPr lang="en-US" smtClean="0"/>
-              <a:t>4/26/2020</a:t>
+              <a:t>4/29/2020</a:t>
             </a:fld>
             <a:endParaRPr lang="en-US"/>
           </a:p>
@@ -5458,19 +5461,30 @@
             </a:r>
             <a:r>
               <a:rPr lang="en-US" sz="1400" dirty="0"/>
-              <a:t>” as the input from the year so generate the scenario for that particular year</a:t>
+              <a:t>” as the input from the </a:t>
+            </a:r>
+            <a:r>
+              <a:rPr lang="en-US" sz="1400" dirty="0" smtClean="0"/>
+              <a:t>user and </a:t>
+            </a:r>
+            <a:r>
+              <a:rPr lang="en-US" sz="1400" dirty="0"/>
+              <a:t>generate the scenario for that particular year</a:t>
             </a:r>
             <a:r>
               <a:rPr lang="en-US" sz="1400" dirty="0" smtClean="0"/>
               <a:t>. </a:t>
             </a:r>
-            <a:endParaRPr lang="en-US" sz="1400" dirty="0" smtClean="0"/>
           </a:p>
           <a:p>
             <a:pPr algn="just"/>
             <a:r>
+              <a:rPr lang="en-US" sz="1400" b="1" dirty="0" smtClean="0"/>
+              <a:t>Query</a:t>
+            </a:r>
+            <a:r>
               <a:rPr lang="en-US" sz="1400" dirty="0" smtClean="0"/>
-              <a:t>Query:</a:t>
+              <a:t>:</a:t>
             </a:r>
           </a:p>
           <a:p>
@@ -5501,7 +5515,6 @@
               <a:rPr lang="en-IN" sz="1400" dirty="0"/>
               <a:t>(year)})</a:t>
             </a:r>
-            <a:endParaRPr lang="en-IN" sz="1400" dirty="0"/>
           </a:p>
         </p:txBody>
       </p:sp>
@@ -5522,7 +5535,7 @@
           <a:p>
             <a:fld id="{CF8428C4-0B35-4B9B-BE23-7825C781AF85}" type="datetime1">
               <a:rPr lang="en-US" smtClean="0"/>
-              <a:t>4/26/2020</a:t>
+              <a:t>4/29/2020</a:t>
             </a:fld>
             <a:endParaRPr lang="en-US"/>
           </a:p>
@@ -5596,6 +5609,13 @@
       </p:transition>
     </mc:Fallback>
   </mc:AlternateContent>
+  <p:timing>
+    <p:tnLst>
+      <p:par>
+        <p:cTn id="1" dur="indefinite" restart="never" nodeType="tmRoot"/>
+      </p:par>
+    </p:tnLst>
+  </p:timing>
 </p:sld>
 </file>
 
@@ -5818,7 +5838,6 @@
               <a:rPr lang="en-IN" sz="1600" dirty="0"/>
               <a:t>": "$gross"}}}, {"$sort": {"_id": 1}}])</a:t>
             </a:r>
-            <a:endParaRPr lang="en-IN" sz="1600" dirty="0"/>
           </a:p>
         </p:txBody>
       </p:sp>
@@ -5885,7 +5904,7 @@
           <a:p>
             <a:fld id="{CC224B6E-8436-431D-A20C-7858D9EA0252}" type="datetime1">
               <a:rPr lang="en-US" smtClean="0"/>
-              <a:t>4/26/2020</a:t>
+              <a:t>4/29/2020</a:t>
             </a:fld>
             <a:endParaRPr lang="en-US"/>
           </a:p>
@@ -5959,6 +5978,13 @@
       </p:transition>
     </mc:Fallback>
   </mc:AlternateContent>
+  <p:timing>
+    <p:tnLst>
+      <p:par>
+        <p:cTn id="1" dur="indefinite" restart="never" nodeType="tmRoot"/>
+      </p:par>
+    </p:tnLst>
+  </p:timing>
 </p:sld>
 </file>
 
@@ -6111,15 +6137,15 @@
             </a:r>
             <a:r>
               <a:rPr lang="en-US" sz="1600" dirty="0"/>
-              <a:t>only those </a:t>
+              <a:t>only </a:t>
             </a:r>
             <a:r>
               <a:rPr lang="en-US" sz="1600" dirty="0" smtClean="0"/>
-              <a:t>IMDb </a:t>
+              <a:t>those, </a:t>
             </a:r>
             <a:r>
               <a:rPr lang="en-US" sz="1600" dirty="0" smtClean="0"/>
-              <a:t>score </a:t>
+              <a:t>IMDb score </a:t>
             </a:r>
             <a:r>
               <a:rPr lang="en-US" sz="1600" dirty="0"/>
@@ -6129,7 +6155,6 @@
               <a:rPr lang="en-US" sz="1600" dirty="0" smtClean="0"/>
               <a:t>range. </a:t>
             </a:r>
-            <a:endParaRPr lang="en-US" sz="1600" dirty="0" smtClean="0"/>
           </a:p>
           <a:p>
             <a:pPr algn="just"/>
@@ -6274,7 +6299,7 @@
           <a:p>
             <a:fld id="{961C0C2C-E2F9-497A-A5E7-5518848AECA7}" type="datetime1">
               <a:rPr lang="en-US" smtClean="0"/>
-              <a:t>4/26/2020</a:t>
+              <a:t>4/29/2020</a:t>
             </a:fld>
             <a:endParaRPr lang="en-US"/>
           </a:p>
@@ -6348,6 +6373,13 @@
       </p:transition>
     </mc:Fallback>
   </mc:AlternateContent>
+  <p:timing>
+    <p:tnLst>
+      <p:par>
+        <p:cTn id="1" dur="indefinite" restart="never" nodeType="tmRoot"/>
+      </p:par>
+    </p:tnLst>
+  </p:timing>
 </p:sld>
 </file>
 
@@ -6563,7 +6595,6 @@
               <a:rPr lang="en-IN" sz="1600" dirty="0"/>
               <a:t>", "count": {"$sum": 1}}},{"$sort": {"_id": 1}}])</a:t>
             </a:r>
-            <a:endParaRPr lang="en-IN" sz="1600" dirty="0"/>
           </a:p>
         </p:txBody>
       </p:sp>
@@ -6630,7 +6661,7 @@
           <a:p>
             <a:fld id="{CE1300D4-61C6-480F-8B8B-768ECD3A482D}" type="datetime1">
               <a:rPr lang="en-US" smtClean="0"/>
-              <a:t>4/26/2020</a:t>
+              <a:t>4/29/2020</a:t>
             </a:fld>
             <a:endParaRPr lang="en-US"/>
           </a:p>
@@ -6704,6 +6735,13 @@
       </p:transition>
     </mc:Fallback>
   </mc:AlternateContent>
+  <p:timing>
+    <p:tnLst>
+      <p:par>
+        <p:cTn id="1" dur="indefinite" restart="never" nodeType="tmRoot"/>
+      </p:par>
+    </p:tnLst>
+  </p:timing>
 </p:sld>
 </file>
 
@@ -6743,7 +6781,7 @@
           <a:p>
             <a:r>
               <a:rPr lang="en-IN" sz="3600" dirty="0" smtClean="0"/>
-              <a:t>References</a:t>
+              <a:t>References:</a:t>
             </a:r>
             <a:endParaRPr lang="en-IN" sz="3600" dirty="0"/>
           </a:p>
@@ -7012,7 +7050,7 @@
           <a:p>
             <a:fld id="{02B52437-C628-4DCA-8358-96AA8D496272}" type="datetime1">
               <a:rPr lang="en-US" smtClean="0"/>
-              <a:t>4/26/2020</a:t>
+              <a:t>4/29/2020</a:t>
             </a:fld>
             <a:endParaRPr lang="en-US"/>
           </a:p>
@@ -7086,6 +7124,13 @@
       </p:transition>
     </mc:Fallback>
   </mc:AlternateContent>
+  <p:timing>
+    <p:tnLst>
+      <p:par>
+        <p:cTn id="1" dur="indefinite" restart="never" nodeType="tmRoot"/>
+      </p:par>
+    </p:tnLst>
+  </p:timing>
 </p:sld>
 </file>
 
@@ -7123,7 +7168,7 @@
           <a:p>
             <a:fld id="{0D742F6D-E454-43E2-B71D-428A4BACBF3E}" type="datetime1">
               <a:rPr lang="en-US" smtClean="0"/>
-              <a:t>4/26/2020</a:t>
+              <a:t>4/29/2020</a:t>
             </a:fld>
             <a:endParaRPr lang="en-US"/>
           </a:p>
@@ -7227,6 +7272,13 @@
       </p:transition>
     </mc:Fallback>
   </mc:AlternateContent>
+  <p:timing>
+    <p:tnLst>
+      <p:par>
+        <p:cTn id="1" dur="indefinite" restart="never" nodeType="tmRoot"/>
+      </p:par>
+    </p:tnLst>
+  </p:timing>
 </p:sld>
 </file>
 
@@ -7358,7 +7410,7 @@
           <a:p>
             <a:fld id="{B33F192F-CDE5-49C2-A5EC-DADC21DDB97D}" type="datetime1">
               <a:rPr lang="en-US" smtClean="0"/>
-              <a:t>4/26/2020</a:t>
+              <a:t>4/29/2020</a:t>
             </a:fld>
             <a:endParaRPr lang="en-US"/>
           </a:p>
@@ -7649,7 +7701,7 @@
           <a:p>
             <a:fld id="{7DEDC3A1-BEFC-494D-82C9-AC0E7A8F9FC6}" type="datetime1">
               <a:rPr lang="en-US" smtClean="0"/>
-              <a:t>4/26/2020</a:t>
+              <a:t>4/29/2020</a:t>
             </a:fld>
             <a:endParaRPr lang="en-US"/>
           </a:p>
@@ -7769,12 +7821,13 @@
           <a:p>
             <a:r>
               <a:rPr lang="en-IN" sz="3600" dirty="0" smtClean="0"/>
-              <a:t>Data Cleaning Proces</a:t>
-            </a:r>
-            <a:r>
-              <a:rPr lang="en-IN" sz="3600" dirty="0"/>
-              <a:t>s</a:t>
-            </a:r>
+              <a:t>Data Cleaning </a:t>
+            </a:r>
+            <a:r>
+              <a:rPr lang="en-IN" sz="3600" dirty="0" smtClean="0"/>
+              <a:t>Process:</a:t>
+            </a:r>
+            <a:endParaRPr lang="en-IN" sz="3600" dirty="0"/>
           </a:p>
         </p:txBody>
       </p:sp>
@@ -7946,7 +7999,7 @@
           <a:p>
             <a:fld id="{8CDDDD97-EF5D-44A4-BBFC-0B312DD46FEF}" type="datetime1">
               <a:rPr lang="en-US" smtClean="0"/>
-              <a:t>4/26/2020</a:t>
+              <a:t>4/29/2020</a:t>
             </a:fld>
             <a:endParaRPr lang="en-US"/>
           </a:p>
@@ -8112,7 +8165,19 @@
               <a:rPr lang="en-US" sz="2000" dirty="0" smtClean="0">
                 <a:sym typeface="Wingdings" panose="05000000000000000000" pitchFamily="2" charset="2"/>
               </a:rPr>
-              <a:t> year of the movie released</a:t>
+              <a:t> </a:t>
+            </a:r>
+            <a:r>
+              <a:rPr lang="en-US" sz="2000" dirty="0" smtClean="0">
+                <a:sym typeface="Wingdings" panose="05000000000000000000" pitchFamily="2" charset="2"/>
+              </a:rPr>
+              <a:t>Year </a:t>
+            </a:r>
+            <a:r>
+              <a:rPr lang="en-US" sz="2000" dirty="0" smtClean="0">
+                <a:sym typeface="Wingdings" panose="05000000000000000000" pitchFamily="2" charset="2"/>
+              </a:rPr>
+              <a:t>of the movie released</a:t>
             </a:r>
           </a:p>
           <a:p>
@@ -8180,7 +8245,7 @@
           <a:p>
             <a:fld id="{612E9893-5FCF-4FFB-9FCD-729A65E9B2C9}" type="datetime1">
               <a:rPr lang="en-US" smtClean="0"/>
-              <a:t>4/26/2020</a:t>
+              <a:t>4/29/2020</a:t>
             </a:fld>
             <a:endParaRPr lang="en-US"/>
           </a:p>
@@ -8452,7 +8517,6 @@
               <a:rPr lang="en-US" sz="1600" dirty="0"/>
               <a:t>': 1})</a:t>
             </a:r>
-            <a:endParaRPr lang="en-US" sz="1600" dirty="0"/>
           </a:p>
         </p:txBody>
       </p:sp>
@@ -8473,7 +8537,7 @@
           <a:p>
             <a:fld id="{422293D6-3002-4345-9C8E-E964AC3D68D6}" type="datetime1">
               <a:rPr lang="en-US" smtClean="0"/>
-              <a:t>4/26/2020</a:t>
+              <a:t>4/29/2020</a:t>
             </a:fld>
             <a:endParaRPr lang="en-US"/>
           </a:p>
@@ -8771,7 +8835,7 @@
           <a:p>
             <a:fld id="{422293D6-3002-4345-9C8E-E964AC3D68D6}" type="datetime1">
               <a:rPr lang="en-US" smtClean="0"/>
-              <a:t>4/26/2020</a:t>
+              <a:t>4/29/2020</a:t>
             </a:fld>
             <a:endParaRPr lang="en-US"/>
           </a:p>
@@ -9095,7 +9159,6 @@
               <a:rPr lang="en-US" sz="1600" dirty="0"/>
               <a:t>': 1}).count()</a:t>
             </a:r>
-            <a:endParaRPr lang="en-US" sz="1600" dirty="0"/>
           </a:p>
         </p:txBody>
       </p:sp>
@@ -9162,7 +9225,7 @@
           <a:p>
             <a:fld id="{422293D6-3002-4345-9C8E-E964AC3D68D6}" type="datetime1">
               <a:rPr lang="en-US" smtClean="0"/>
-              <a:t>4/26/2020</a:t>
+              <a:t>4/29/2020</a:t>
             </a:fld>
             <a:endParaRPr lang="en-US"/>
           </a:p>
@@ -9462,7 +9525,7 @@
           <a:p>
             <a:fld id="{9BEB930B-2DBE-48A0-9F8F-F3FA6BE2BAB7}" type="datetime1">
               <a:rPr lang="en-US" smtClean="0"/>
-              <a:t>4/26/2020</a:t>
+              <a:t>4/29/2020</a:t>
             </a:fld>
             <a:endParaRPr lang="en-US"/>
           </a:p>

</xml_diff>